<commit_message>
Updated the article method section and the presentations
</commit_message>
<xml_diff>
--- a/Poster and Presentation/Campbell_Scott_Variance_Reduction.pptx
+++ b/Poster and Presentation/Campbell_Scott_Variance_Reduction.pptx
@@ -5,19 +5,20 @@
     <p:sldMasterId id="2147483648" r:id="rId1"/>
   </p:sldMasterIdLst>
   <p:notesMasterIdLst>
-    <p:notesMasterId r:id="rId9"/>
+    <p:notesMasterId r:id="rId10"/>
   </p:notesMasterIdLst>
   <p:handoutMasterIdLst>
-    <p:handoutMasterId r:id="rId10"/>
+    <p:handoutMasterId r:id="rId11"/>
   </p:handoutMasterIdLst>
   <p:sldIdLst>
-    <p:sldId id="256" r:id="rId2"/>
-    <p:sldId id="257" r:id="rId3"/>
-    <p:sldId id="258" r:id="rId4"/>
-    <p:sldId id="259" r:id="rId5"/>
-    <p:sldId id="260" r:id="rId6"/>
-    <p:sldId id="261" r:id="rId7"/>
-    <p:sldId id="262" r:id="rId8"/>
+    <p:sldId id="263" r:id="rId2"/>
+    <p:sldId id="264" r:id="rId3"/>
+    <p:sldId id="257" r:id="rId4"/>
+    <p:sldId id="258" r:id="rId5"/>
+    <p:sldId id="259" r:id="rId6"/>
+    <p:sldId id="260" r:id="rId7"/>
+    <p:sldId id="261" r:id="rId8"/>
+    <p:sldId id="262" r:id="rId9"/>
   </p:sldIdLst>
   <p:sldSz cx="9144000" cy="5715000" type="screen16x10"/>
   <p:notesSz cx="6858000" cy="9144000"/>
@@ -217,7 +218,7 @@
           <a:p>
             <a:fld id="{2BFC5B56-155A-8A4F-A200-15510EAC000D}" type="datetime1">
               <a:rPr lang="en-US" smtClean="0"/>
-              <a:t>8/2/19</a:t>
+              <a:t>8/6/19</a:t>
             </a:fld>
             <a:endParaRPr lang="en-US"/>
           </a:p>
@@ -386,7 +387,7 @@
           <a:p>
             <a:fld id="{420232FE-02A3-6D41-B422-B15757ACBFED}" type="datetime1">
               <a:rPr lang="en-US" smtClean="0"/>
-              <a:t>8/2/19</a:t>
+              <a:t>8/6/19</a:t>
             </a:fld>
             <a:endParaRPr lang="en-US"/>
           </a:p>
@@ -899,14 +900,14 @@
           </a:ln>
           <a:extLst>
             <a:ext uri="{909E8E84-426E-40dd-AFC4-6F175D3DCCD1}">
-              <a14:hiddenFill xmlns:a14="http://schemas.microsoft.com/office/drawing/2010/main" xmlns="">
+              <a14:hiddenFill xmlns="" xmlns:a14="http://schemas.microsoft.com/office/drawing/2010/main">
                 <a:solidFill>
                   <a:srgbClr val="FFFFFF"/>
                 </a:solidFill>
               </a14:hiddenFill>
             </a:ext>
             <a:ext uri="{91240B29-F687-4f45-9708-019B960494DF}">
-              <a14:hiddenLine xmlns:a14="http://schemas.microsoft.com/office/drawing/2010/main" xmlns="" w="9525">
+              <a14:hiddenLine xmlns="" xmlns:a14="http://schemas.microsoft.com/office/drawing/2010/main" w="9525">
                 <a:solidFill>
                   <a:srgbClr val="000000"/>
                 </a:solidFill>
@@ -1248,14 +1249,14 @@
           </a:ln>
           <a:extLst>
             <a:ext uri="{909E8E84-426E-40dd-AFC4-6F175D3DCCD1}">
-              <a14:hiddenFill xmlns:a14="http://schemas.microsoft.com/office/drawing/2010/main" xmlns="">
+              <a14:hiddenFill xmlns="" xmlns:a14="http://schemas.microsoft.com/office/drawing/2010/main">
                 <a:solidFill>
                   <a:srgbClr val="FFFFFF"/>
                 </a:solidFill>
               </a14:hiddenFill>
             </a:ext>
             <a:ext uri="{91240B29-F687-4f45-9708-019B960494DF}">
-              <a14:hiddenLine xmlns:a14="http://schemas.microsoft.com/office/drawing/2010/main" xmlns="" w="9525">
+              <a14:hiddenLine xmlns="" xmlns:a14="http://schemas.microsoft.com/office/drawing/2010/main" w="9525">
                 <a:solidFill>
                   <a:srgbClr val="000000"/>
                 </a:solidFill>
@@ -2483,14 +2484,14 @@
             </a:ln>
             <a:extLst>
               <a:ext uri="{909E8E84-426E-40dd-AFC4-6F175D3DCCD1}">
-                <a14:hiddenFill xmlns:a14="http://schemas.microsoft.com/office/drawing/2010/main" xmlns="">
+                <a14:hiddenFill xmlns="" xmlns:a14="http://schemas.microsoft.com/office/drawing/2010/main">
                   <a:solidFill>
                     <a:srgbClr val="FFFFFF"/>
                   </a:solidFill>
                 </a14:hiddenFill>
               </a:ext>
               <a:ext uri="{91240B29-F687-4f45-9708-019B960494DF}">
-                <a14:hiddenLine xmlns:a14="http://schemas.microsoft.com/office/drawing/2010/main" xmlns="" w="9525">
+                <a14:hiddenLine xmlns="" xmlns:a14="http://schemas.microsoft.com/office/drawing/2010/main" w="9525">
                   <a:solidFill>
                     <a:srgbClr val="000000"/>
                   </a:solidFill>
@@ -2827,7 +2828,7 @@
           <a:p>
             <a:fld id="{FDFC695E-3847-284B-804A-F0C0441E204C}" type="datetime1">
               <a:rPr lang="en-US" smtClean="0"/>
-              <a:t>8/2/19</a:t>
+              <a:t>8/6/19</a:t>
             </a:fld>
             <a:r>
               <a:rPr lang="en-US" dirty="0"/>
@@ -3196,7 +3197,7 @@
           <a:p>
             <a:fld id="{D3CA6442-326F-BF43-9512-C754596C1A34}" type="datetime1">
               <a:rPr lang="en-US" smtClean="0"/>
-              <a:t>8/2/19</a:t>
+              <a:t>8/6/19</a:t>
             </a:fld>
             <a:r>
               <a:rPr lang="en-US"/>
@@ -3351,7 +3352,7 @@
           <a:p>
             <a:fld id="{3BB050BD-D5D4-004B-87E1-382D8D28594F}" type="datetime1">
               <a:rPr lang="en-US" smtClean="0"/>
-              <a:t>8/2/19</a:t>
+              <a:t>8/6/19</a:t>
             </a:fld>
             <a:r>
               <a:rPr lang="en-US" dirty="0"/>
@@ -3563,7 +3564,7 @@
           <a:p>
             <a:fld id="{E497D45A-E2C2-5444-8727-94AA467EBF1A}" type="datetime1">
               <a:rPr lang="en-US" smtClean="0"/>
-              <a:t>8/2/19</a:t>
+              <a:t>8/6/19</a:t>
             </a:fld>
             <a:r>
               <a:rPr lang="en-US"/>
@@ -3760,7 +3761,7 @@
           <a:p>
             <a:fld id="{3BCD5A60-AEBD-CD41-AE13-C139EF5F076B}" type="datetime1">
               <a:rPr lang="en-US" smtClean="0"/>
-              <a:t>8/2/19</a:t>
+              <a:t>8/6/19</a:t>
             </a:fld>
             <a:r>
               <a:rPr lang="en-US"/>
@@ -4484,7 +4485,7 @@
             <a:fld id="{33415E80-817E-41B3-A1DB-15C0B125CF72}" type="datetime1">
               <a:rPr lang="en-US" smtClean="0"/>
               <a:pPr/>
-              <a:t>8/2/19</a:t>
+              <a:t>8/6/19</a:t>
             </a:fld>
             <a:r>
               <a:rPr lang="en-US" dirty="0"/>
@@ -5159,180 +5160,28 @@
           <a:chExt cx="0" cy="0"/>
         </a:xfrm>
       </p:grpSpPr>
-      <p:sp>
-        <p:nvSpPr>
-          <p:cNvPr id="2" name="Title 1">
-            <a:extLst>
-              <a:ext uri="{FF2B5EF4-FFF2-40B4-BE49-F238E27FC236}">
-                <a16:creationId xmlns:a16="http://schemas.microsoft.com/office/drawing/2014/main" id="{92C809EB-75D7-4548-B39F-E3F4489EA12A}"/>
-              </a:ext>
-            </a:extLst>
-          </p:cNvPr>
-          <p:cNvSpPr>
-            <a:spLocks noGrp="1"/>
-          </p:cNvSpPr>
-          <p:nvPr>
-            <p:ph type="ctrTitle"/>
-          </p:nvPr>
-        </p:nvSpPr>
-        <p:spPr>
-          <a:xfrm>
-            <a:off x="768096" y="-94999"/>
-            <a:ext cx="8071104" cy="1361134"/>
-          </a:xfrm>
-        </p:spPr>
-        <p:txBody>
-          <a:bodyPr/>
-          <a:lstStyle/>
-          <a:p>
-            <a:r>
-              <a:rPr lang="en-US" sz="3400" dirty="0"/>
-              <a:t>Variance Reduction at Scale</a:t>
-            </a:r>
-          </a:p>
-        </p:txBody>
-      </p:sp>
-      <p:sp>
-        <p:nvSpPr>
-          <p:cNvPr id="3" name="Text Placeholder 2">
-            <a:extLst>
-              <a:ext uri="{FF2B5EF4-FFF2-40B4-BE49-F238E27FC236}">
-                <a16:creationId xmlns:a16="http://schemas.microsoft.com/office/drawing/2014/main" id="{C941FFEE-1B99-A341-82E9-A7B774EE35DF}"/>
-              </a:ext>
-            </a:extLst>
-          </p:cNvPr>
-          <p:cNvSpPr>
-            <a:spLocks noGrp="1"/>
-          </p:cNvSpPr>
-          <p:nvPr>
-            <p:ph type="body" sz="quarter" idx="11"/>
-          </p:nvPr>
-        </p:nvSpPr>
-        <p:spPr/>
-        <p:txBody>
-          <a:bodyPr/>
-          <a:lstStyle/>
-          <a:p>
-            <a:r>
-              <a:rPr lang="en-US" dirty="0"/>
-              <a:t>Scott Campbell</a:t>
-            </a:r>
-          </a:p>
-        </p:txBody>
-      </p:sp>
-      <p:sp>
-        <p:nvSpPr>
-          <p:cNvPr id="4" name="Text Placeholder 3">
-            <a:extLst>
-              <a:ext uri="{FF2B5EF4-FFF2-40B4-BE49-F238E27FC236}">
-                <a16:creationId xmlns:a16="http://schemas.microsoft.com/office/drawing/2014/main" id="{EAF51E33-4D3B-BE4B-B59B-B536F57D1CAE}"/>
-              </a:ext>
-            </a:extLst>
-          </p:cNvPr>
-          <p:cNvSpPr>
-            <a:spLocks noGrp="1"/>
-          </p:cNvSpPr>
-          <p:nvPr>
-            <p:ph type="body" sz="quarter" idx="12"/>
-          </p:nvPr>
-        </p:nvSpPr>
-        <p:spPr>
-          <a:xfrm>
-            <a:off x="5143500" y="3858311"/>
-            <a:ext cx="3543300" cy="627160"/>
-          </a:xfrm>
-        </p:spPr>
-        <p:txBody>
-          <a:bodyPr/>
-          <a:lstStyle/>
-          <a:p>
-            <a:r>
-              <a:rPr lang="en-US" sz="1600" dirty="0"/>
-              <a:t>Gonzaga University</a:t>
-            </a:r>
-          </a:p>
-          <a:p>
-            <a:r>
-              <a:rPr lang="en-US" sz="1200" dirty="0"/>
-              <a:t> Physics &amp; Math-Computer Science</a:t>
-            </a:r>
-          </a:p>
-        </p:txBody>
-      </p:sp>
-      <p:sp>
-        <p:nvSpPr>
-          <p:cNvPr id="5" name="Text Placeholder 4">
-            <a:extLst>
-              <a:ext uri="{FF2B5EF4-FFF2-40B4-BE49-F238E27FC236}">
-                <a16:creationId xmlns:a16="http://schemas.microsoft.com/office/drawing/2014/main" id="{1AF06B1F-D1E5-DE4E-8780-59161412FE22}"/>
-              </a:ext>
-            </a:extLst>
-          </p:cNvPr>
-          <p:cNvSpPr>
-            <a:spLocks noGrp="1"/>
-          </p:cNvSpPr>
-          <p:nvPr>
-            <p:ph type="body" sz="quarter" idx="13"/>
-          </p:nvPr>
-        </p:nvSpPr>
-        <p:spPr>
-          <a:xfrm>
-            <a:off x="1182624" y="1434287"/>
-            <a:ext cx="7857744" cy="907423"/>
-          </a:xfrm>
-        </p:spPr>
-        <p:txBody>
-          <a:bodyPr/>
-          <a:lstStyle/>
-          <a:p>
-            <a:r>
-              <a:rPr lang="en-US" sz="2200" dirty="0"/>
-              <a:t>Improving IMC variance reduction methods</a:t>
-            </a:r>
-          </a:p>
-          <a:p>
-            <a:r>
-              <a:rPr lang="en-US" sz="2200" dirty="0"/>
-              <a:t> for thermal transport problems</a:t>
-            </a:r>
-          </a:p>
-        </p:txBody>
-      </p:sp>
-      <p:sp>
-        <p:nvSpPr>
-          <p:cNvPr id="6" name="Text Placeholder 5">
-            <a:extLst>
-              <a:ext uri="{FF2B5EF4-FFF2-40B4-BE49-F238E27FC236}">
-                <a16:creationId xmlns:a16="http://schemas.microsoft.com/office/drawing/2014/main" id="{13A0D12F-3FBF-9F42-BF41-44062C1A8E1C}"/>
-              </a:ext>
-            </a:extLst>
-          </p:cNvPr>
-          <p:cNvSpPr>
-            <a:spLocks noGrp="1"/>
-          </p:cNvSpPr>
-          <p:nvPr>
-            <p:ph type="body" sz="quarter" idx="14"/>
-          </p:nvPr>
-        </p:nvSpPr>
-        <p:spPr/>
-        <p:txBody>
-          <a:bodyPr/>
-          <a:lstStyle/>
-          <a:p>
-            <a:endParaRPr lang="en-US"/>
-          </a:p>
-        </p:txBody>
-      </p:sp>
     </p:spTree>
     <p:extLst>
       <p:ext uri="{BB962C8B-B14F-4D97-AF65-F5344CB8AC3E}">
-        <p14:creationId xmlns:p14="http://schemas.microsoft.com/office/powerpoint/2010/main" val="2727960961"/>
+        <p14:creationId xmlns:p14="http://schemas.microsoft.com/office/powerpoint/2010/main" val="496177921"/>
       </p:ext>
     </p:extLst>
   </p:cSld>
   <p:clrMapOvr>
     <a:masterClrMapping/>
   </p:clrMapOvr>
+  <mc:AlternateContent xmlns:mc="http://schemas.openxmlformats.org/markup-compatibility/2006" xmlns:p14="http://schemas.microsoft.com/office/powerpoint/2010/main">
+    <mc:Choice Requires="p14">
+      <p:transition spd="med" p14:dur="700">
+        <p:fade/>
+      </p:transition>
+    </mc:Choice>
+    <mc:Fallback xmlns="">
+      <p:transition xmlns:p14="http://schemas.microsoft.com/office/powerpoint/2010/main" spd="med">
+        <p:fade/>
+      </p:transition>
+    </mc:Fallback>
+  </mc:AlternateContent>
 </p:sld>
 </file>
 
@@ -5355,10 +5204,29 @@
       </p:grpSpPr>
       <p:sp>
         <p:nvSpPr>
-          <p:cNvPr id="2" name="Title 1">
+          <p:cNvPr id="10" name="Text Placeholder 9"/>
+          <p:cNvSpPr>
+            <a:spLocks noGrp="1"/>
+          </p:cNvSpPr>
+          <p:nvPr>
+            <p:ph type="body" sz="quarter" idx="14"/>
+          </p:nvPr>
+        </p:nvSpPr>
+        <p:spPr/>
+        <p:txBody>
+          <a:bodyPr/>
+          <a:lstStyle/>
+          <a:p>
+            <a:endParaRPr lang="en-US" dirty="0"/>
+          </a:p>
+        </p:txBody>
+      </p:sp>
+      <p:sp>
+        <p:nvSpPr>
+          <p:cNvPr id="12" name="Title 1">
             <a:extLst>
               <a:ext uri="{FF2B5EF4-FFF2-40B4-BE49-F238E27FC236}">
-                <a16:creationId xmlns:a16="http://schemas.microsoft.com/office/drawing/2014/main" id="{111F79BD-8853-EC46-B6FA-D39ABD181585}"/>
+                <a16:creationId xmlns:a16="http://schemas.microsoft.com/office/drawing/2014/main" id="{5272D73F-9BF4-8D4D-9E6B-4C62DDE39887}"/>
               </a:ext>
             </a:extLst>
           </p:cNvPr>
@@ -5366,27 +5234,208 @@
             <a:spLocks noGrp="1"/>
           </p:cNvSpPr>
           <p:nvPr>
-            <p:ph type="title"/>
+            <p:ph type="ctrTitle"/>
           </p:nvPr>
         </p:nvSpPr>
-        <p:spPr/>
+        <p:spPr>
+          <a:xfrm>
+            <a:off x="768096" y="-94999"/>
+            <a:ext cx="8071104" cy="1361134"/>
+          </a:xfrm>
+        </p:spPr>
         <p:txBody>
           <a:bodyPr/>
           <a:lstStyle/>
           <a:p>
             <a:r>
-              <a:rPr lang="en-US" dirty="0"/>
-              <a:t>Introduction &amp; Theory</a:t>
-            </a:r>
-          </a:p>
-        </p:txBody>
-      </p:sp>
-      <p:sp>
-        <p:nvSpPr>
-          <p:cNvPr id="3" name="Date Placeholder 2">
+              <a:rPr lang="en-US" sz="3400" dirty="0"/>
+              <a:t>Variance Reduction at Scale</a:t>
+            </a:r>
+          </a:p>
+        </p:txBody>
+      </p:sp>
+      <p:sp>
+        <p:nvSpPr>
+          <p:cNvPr id="13" name="Text Placeholder 4">
             <a:extLst>
               <a:ext uri="{FF2B5EF4-FFF2-40B4-BE49-F238E27FC236}">
-                <a16:creationId xmlns:a16="http://schemas.microsoft.com/office/drawing/2014/main" id="{6303EE71-FB58-4F44-B1BF-9C57CB8EF42B}"/>
+                <a16:creationId xmlns:a16="http://schemas.microsoft.com/office/drawing/2014/main" id="{149E8FE8-C971-BC4B-B245-E947B06FEF75}"/>
+              </a:ext>
+            </a:extLst>
+          </p:cNvPr>
+          <p:cNvSpPr txBox="1">
+            <a:spLocks/>
+          </p:cNvSpPr>
+          <p:nvPr/>
+        </p:nvSpPr>
+        <p:spPr>
+          <a:xfrm>
+            <a:off x="1182624" y="1434287"/>
+            <a:ext cx="7857744" cy="907423"/>
+          </a:xfrm>
+          <a:prstGeom prst="rect">
+            <a:avLst/>
+          </a:prstGeom>
+        </p:spPr>
+        <p:txBody>
+          <a:bodyPr vert="horz" lIns="91433" tIns="45717" rIns="91433" bIns="45717"/>
+          <a:lstStyle>
+            <a:lvl1pPr marL="0" indent="0" algn="r" defTabSz="457200" rtl="0" eaLnBrk="1" latinLnBrk="0" hangingPunct="1">
+              <a:spcBef>
+                <a:spcPct val="20000"/>
+              </a:spcBef>
+              <a:buFont typeface="Arial"/>
+              <a:buNone/>
+              <a:defRPr sz="2400" b="1" kern="1200">
+                <a:solidFill>
+                  <a:schemeClr val="tx1"/>
+                </a:solidFill>
+                <a:latin typeface="+mn-lt"/>
+                <a:ea typeface="+mn-ea"/>
+                <a:cs typeface="+mn-cs"/>
+              </a:defRPr>
+            </a:lvl1pPr>
+            <a:lvl2pPr marL="457164" indent="0" algn="r" defTabSz="457200" rtl="0" eaLnBrk="1" latinLnBrk="0" hangingPunct="1">
+              <a:spcBef>
+                <a:spcPct val="20000"/>
+              </a:spcBef>
+              <a:buFont typeface="Arial"/>
+              <a:buNone/>
+              <a:defRPr sz="3600" kern="1200">
+                <a:solidFill>
+                  <a:schemeClr val="tx1"/>
+                </a:solidFill>
+                <a:latin typeface="+mn-lt"/>
+                <a:ea typeface="+mn-ea"/>
+                <a:cs typeface="+mn-cs"/>
+              </a:defRPr>
+            </a:lvl2pPr>
+            <a:lvl3pPr marL="914327" indent="0" algn="r" defTabSz="457200" rtl="0" eaLnBrk="1" latinLnBrk="0" hangingPunct="1">
+              <a:spcBef>
+                <a:spcPct val="20000"/>
+              </a:spcBef>
+              <a:buFont typeface="Arial"/>
+              <a:buNone/>
+              <a:defRPr sz="3600" kern="1200">
+                <a:solidFill>
+                  <a:schemeClr val="tx1"/>
+                </a:solidFill>
+                <a:latin typeface="+mn-lt"/>
+                <a:ea typeface="+mn-ea"/>
+                <a:cs typeface="+mn-cs"/>
+              </a:defRPr>
+            </a:lvl3pPr>
+            <a:lvl4pPr marL="1371491" indent="0" algn="r" defTabSz="457200" rtl="0" eaLnBrk="1" latinLnBrk="0" hangingPunct="1">
+              <a:spcBef>
+                <a:spcPct val="20000"/>
+              </a:spcBef>
+              <a:buFont typeface="Arial"/>
+              <a:buNone/>
+              <a:defRPr sz="3600" kern="1200">
+                <a:solidFill>
+                  <a:schemeClr val="tx1"/>
+                </a:solidFill>
+                <a:latin typeface="+mn-lt"/>
+                <a:ea typeface="+mn-ea"/>
+                <a:cs typeface="+mn-cs"/>
+              </a:defRPr>
+            </a:lvl4pPr>
+            <a:lvl5pPr marL="1828654" indent="0" algn="r" defTabSz="457200" rtl="0" eaLnBrk="1" latinLnBrk="0" hangingPunct="1">
+              <a:spcBef>
+                <a:spcPct val="20000"/>
+              </a:spcBef>
+              <a:buFont typeface="Arial"/>
+              <a:buNone/>
+              <a:defRPr sz="3600" kern="1200">
+                <a:solidFill>
+                  <a:schemeClr val="tx1"/>
+                </a:solidFill>
+                <a:latin typeface="+mn-lt"/>
+                <a:ea typeface="+mn-ea"/>
+                <a:cs typeface="+mn-cs"/>
+              </a:defRPr>
+            </a:lvl5pPr>
+            <a:lvl6pPr marL="2514600" indent="-228600" algn="l" defTabSz="457200" rtl="0" eaLnBrk="1" latinLnBrk="0" hangingPunct="1">
+              <a:spcBef>
+                <a:spcPct val="20000"/>
+              </a:spcBef>
+              <a:buFont typeface="Arial"/>
+              <a:buChar char="•"/>
+              <a:defRPr sz="2000" kern="1200">
+                <a:solidFill>
+                  <a:schemeClr val="tx1"/>
+                </a:solidFill>
+                <a:latin typeface="+mn-lt"/>
+                <a:ea typeface="+mn-ea"/>
+                <a:cs typeface="+mn-cs"/>
+              </a:defRPr>
+            </a:lvl6pPr>
+            <a:lvl7pPr marL="2971800" indent="-228600" algn="l" defTabSz="457200" rtl="0" eaLnBrk="1" latinLnBrk="0" hangingPunct="1">
+              <a:spcBef>
+                <a:spcPct val="20000"/>
+              </a:spcBef>
+              <a:buFont typeface="Arial"/>
+              <a:buChar char="•"/>
+              <a:defRPr sz="2000" kern="1200">
+                <a:solidFill>
+                  <a:schemeClr val="tx1"/>
+                </a:solidFill>
+                <a:latin typeface="+mn-lt"/>
+                <a:ea typeface="+mn-ea"/>
+                <a:cs typeface="+mn-cs"/>
+              </a:defRPr>
+            </a:lvl7pPr>
+            <a:lvl8pPr marL="3429000" indent="-228600" algn="l" defTabSz="457200" rtl="0" eaLnBrk="1" latinLnBrk="0" hangingPunct="1">
+              <a:spcBef>
+                <a:spcPct val="20000"/>
+              </a:spcBef>
+              <a:buFont typeface="Arial"/>
+              <a:buChar char="•"/>
+              <a:defRPr sz="2000" kern="1200">
+                <a:solidFill>
+                  <a:schemeClr val="tx1"/>
+                </a:solidFill>
+                <a:latin typeface="+mn-lt"/>
+                <a:ea typeface="+mn-ea"/>
+                <a:cs typeface="+mn-cs"/>
+              </a:defRPr>
+            </a:lvl8pPr>
+            <a:lvl9pPr marL="3886200" indent="-228600" algn="l" defTabSz="457200" rtl="0" eaLnBrk="1" latinLnBrk="0" hangingPunct="1">
+              <a:spcBef>
+                <a:spcPct val="20000"/>
+              </a:spcBef>
+              <a:buFont typeface="Arial"/>
+              <a:buChar char="•"/>
+              <a:defRPr sz="2000" kern="1200">
+                <a:solidFill>
+                  <a:schemeClr val="tx1"/>
+                </a:solidFill>
+                <a:latin typeface="+mn-lt"/>
+                <a:ea typeface="+mn-ea"/>
+                <a:cs typeface="+mn-cs"/>
+              </a:defRPr>
+            </a:lvl9pPr>
+          </a:lstStyle>
+          <a:p>
+            <a:r>
+              <a:rPr lang="en-US" sz="2200" dirty="0"/>
+              <a:t>Improving IMC variance reduction methods</a:t>
+            </a:r>
+          </a:p>
+          <a:p>
+            <a:r>
+              <a:rPr lang="en-US" sz="2200" dirty="0"/>
+              <a:t> for thermal transport problems</a:t>
+            </a:r>
+          </a:p>
+        </p:txBody>
+      </p:sp>
+      <p:sp>
+        <p:nvSpPr>
+          <p:cNvPr id="14" name="Text Placeholder 2">
+            <a:extLst>
+              <a:ext uri="{FF2B5EF4-FFF2-40B4-BE49-F238E27FC236}">
+                <a16:creationId xmlns:a16="http://schemas.microsoft.com/office/drawing/2014/main" id="{71BB7DCA-0B6B-2549-978B-7DF7982AA694}"/>
               </a:ext>
             </a:extLst>
           </p:cNvPr>
@@ -5394,36 +5443,32 @@
             <a:spLocks noGrp="1"/>
           </p:cNvSpPr>
           <p:nvPr>
-            <p:ph type="dt" sz="half" idx="10"/>
+            <p:ph type="body" sz="quarter" idx="11"/>
           </p:nvPr>
         </p:nvSpPr>
-        <p:spPr/>
+        <p:spPr>
+          <a:xfrm>
+            <a:off x="5111496" y="3143513"/>
+            <a:ext cx="3543300" cy="606908"/>
+          </a:xfrm>
+        </p:spPr>
         <p:txBody>
           <a:bodyPr/>
           <a:lstStyle/>
           <a:p>
-            <a:fld id="{3BB050BD-D5D4-004B-87E1-382D8D28594F}" type="datetime1">
-              <a:rPr lang="en-US" smtClean="0"/>
-              <a:t>8/2/19</a:t>
-            </a:fld>
-            <a:r>
-              <a:rPr lang="en-US"/>
-              <a:t>   |   </a:t>
-            </a:r>
-            <a:fld id="{5D01E7E5-6465-7A46-A26D-BAABC2D34D38}" type="slidenum">
-              <a:rPr lang="en-US" smtClean="0"/>
-              <a:t>2</a:t>
-            </a:fld>
-            <a:endParaRPr lang="en-US" dirty="0"/>
-          </a:p>
-        </p:txBody>
-      </p:sp>
-      <p:sp>
-        <p:nvSpPr>
-          <p:cNvPr id="4" name="Footer Placeholder 3">
+            <a:r>
+              <a:rPr lang="en-US" dirty="0"/>
+              <a:t>Scott Campbell</a:t>
+            </a:r>
+          </a:p>
+        </p:txBody>
+      </p:sp>
+      <p:sp>
+        <p:nvSpPr>
+          <p:cNvPr id="15" name="Text Placeholder 8">
             <a:extLst>
               <a:ext uri="{FF2B5EF4-FFF2-40B4-BE49-F238E27FC236}">
-                <a16:creationId xmlns:a16="http://schemas.microsoft.com/office/drawing/2014/main" id="{867C4327-6A53-1240-9772-0B5A57D4302D}"/>
+                <a16:creationId xmlns:a16="http://schemas.microsoft.com/office/drawing/2014/main" id="{353DDD9C-7565-F54D-82C8-BCA85B1D2F14}"/>
               </a:ext>
             </a:extLst>
           </p:cNvPr>
@@ -5431,83 +5476,36 @@
             <a:spLocks noGrp="1"/>
           </p:cNvSpPr>
           <p:nvPr>
-            <p:ph type="ftr" sz="quarter" idx="11"/>
+            <p:ph type="body" sz="quarter" idx="12"/>
           </p:nvPr>
         </p:nvSpPr>
-        <p:spPr/>
+        <p:spPr>
+          <a:xfrm>
+            <a:off x="5271516" y="3893157"/>
+            <a:ext cx="3383280" cy="1086415"/>
+          </a:xfrm>
+        </p:spPr>
         <p:txBody>
           <a:bodyPr/>
           <a:lstStyle/>
           <a:p>
             <a:r>
-              <a:rPr lang="en-US"/>
-              <a:t>Los Alamos National Laboratory</a:t>
-            </a:r>
-            <a:endParaRPr lang="en-US" dirty="0"/>
-          </a:p>
-        </p:txBody>
-      </p:sp>
-      <p:sp>
-        <p:nvSpPr>
-          <p:cNvPr id="5" name="Content Placeholder 4">
-            <a:extLst>
-              <a:ext uri="{FF2B5EF4-FFF2-40B4-BE49-F238E27FC236}">
-                <a16:creationId xmlns:a16="http://schemas.microsoft.com/office/drawing/2014/main" id="{5B61F8F5-7260-8343-A766-8B64C80CF172}"/>
-              </a:ext>
-            </a:extLst>
-          </p:cNvPr>
-          <p:cNvSpPr>
-            <a:spLocks noGrp="1"/>
-          </p:cNvSpPr>
-          <p:nvPr>
-            <p:ph idx="1"/>
-          </p:nvPr>
-        </p:nvSpPr>
-        <p:spPr/>
-        <p:txBody>
-          <a:bodyPr/>
-          <a:lstStyle/>
-          <a:p>
-            <a:endParaRPr lang="en-US" dirty="0"/>
-          </a:p>
-        </p:txBody>
-      </p:sp>
-      <p:sp>
-        <p:nvSpPr>
-          <p:cNvPr id="6" name="TextBox 5">
-            <a:extLst>
-              <a:ext uri="{FF2B5EF4-FFF2-40B4-BE49-F238E27FC236}">
-                <a16:creationId xmlns:a16="http://schemas.microsoft.com/office/drawing/2014/main" id="{4F42F0E1-D0BC-AC45-AA30-E2DC4F13BF5A}"/>
-              </a:ext>
-            </a:extLst>
-          </p:cNvPr>
-          <p:cNvSpPr txBox="1"/>
-          <p:nvPr/>
-        </p:nvSpPr>
-        <p:spPr>
-          <a:xfrm>
-            <a:off x="5961413" y="415636"/>
-            <a:ext cx="184731" cy="369332"/>
-          </a:xfrm>
-          <a:prstGeom prst="rect">
-            <a:avLst/>
-          </a:prstGeom>
-          <a:noFill/>
-        </p:spPr>
-        <p:txBody>
-          <a:bodyPr wrap="none" rtlCol="0">
-            <a:spAutoFit/>
-          </a:bodyPr>
-          <a:lstStyle/>
-          <a:p>
-            <a:endParaRPr lang="en-US" dirty="0"/>
+              <a:rPr lang="en-US" sz="1600" dirty="0"/>
+              <a:t>Gonzaga University</a:t>
+            </a:r>
+          </a:p>
+          <a:p>
+            <a:r>
+              <a:rPr lang="en-US" sz="1400" dirty="0"/>
+              <a:t>Physics &amp; Math-Computer Science</a:t>
+            </a:r>
           </a:p>
         </p:txBody>
       </p:sp>
     </p:spTree>
     <p:extLst>
       <p:ext uri="{BB962C8B-B14F-4D97-AF65-F5344CB8AC3E}">
-        <p14:creationId xmlns:p14="http://schemas.microsoft.com/office/powerpoint/2010/main" val="431363943"/>
+        <p14:creationId xmlns:p14="http://schemas.microsoft.com/office/powerpoint/2010/main" val="1456565641"/>
       </p:ext>
     </p:extLst>
   </p:cSld>
@@ -5557,7 +5555,7 @@
           <a:p>
             <a:r>
               <a:rPr lang="en-US" dirty="0"/>
-              <a:t>Description of Research &amp; Objective</a:t>
+              <a:t>Introduction &amp; Theory</a:t>
             </a:r>
           </a:p>
         </p:txBody>
@@ -5585,7 +5583,7 @@
           <a:p>
             <a:fld id="{3BB050BD-D5D4-004B-87E1-382D8D28594F}" type="datetime1">
               <a:rPr lang="en-US" smtClean="0"/>
-              <a:t>8/2/19</a:t>
+              <a:t>8/6/19</a:t>
             </a:fld>
             <a:r>
               <a:rPr lang="en-US"/>
@@ -5653,10 +5651,42 @@
           </a:p>
         </p:txBody>
       </p:sp>
+      <p:sp>
+        <p:nvSpPr>
+          <p:cNvPr id="6" name="TextBox 5">
+            <a:extLst>
+              <a:ext uri="{FF2B5EF4-FFF2-40B4-BE49-F238E27FC236}">
+                <a16:creationId xmlns:a16="http://schemas.microsoft.com/office/drawing/2014/main" id="{4F42F0E1-D0BC-AC45-AA30-E2DC4F13BF5A}"/>
+              </a:ext>
+            </a:extLst>
+          </p:cNvPr>
+          <p:cNvSpPr txBox="1"/>
+          <p:nvPr/>
+        </p:nvSpPr>
+        <p:spPr>
+          <a:xfrm>
+            <a:off x="5961413" y="415636"/>
+            <a:ext cx="184731" cy="369332"/>
+          </a:xfrm>
+          <a:prstGeom prst="rect">
+            <a:avLst/>
+          </a:prstGeom>
+          <a:noFill/>
+        </p:spPr>
+        <p:txBody>
+          <a:bodyPr wrap="none" rtlCol="0">
+            <a:spAutoFit/>
+          </a:bodyPr>
+          <a:lstStyle/>
+          <a:p>
+            <a:endParaRPr lang="en-US" dirty="0"/>
+          </a:p>
+        </p:txBody>
+      </p:sp>
     </p:spTree>
     <p:extLst>
       <p:ext uri="{BB962C8B-B14F-4D97-AF65-F5344CB8AC3E}">
-        <p14:creationId xmlns:p14="http://schemas.microsoft.com/office/powerpoint/2010/main" val="1556736215"/>
+        <p14:creationId xmlns:p14="http://schemas.microsoft.com/office/powerpoint/2010/main" val="431363943"/>
       </p:ext>
     </p:extLst>
   </p:cSld>
@@ -5706,7 +5736,7 @@
           <a:p>
             <a:r>
               <a:rPr lang="en-US" dirty="0"/>
-              <a:t>Methodology</a:t>
+              <a:t>Description of Research &amp; Objective</a:t>
             </a:r>
           </a:p>
         </p:txBody>
@@ -5734,7 +5764,7 @@
           <a:p>
             <a:fld id="{3BB050BD-D5D4-004B-87E1-382D8D28594F}" type="datetime1">
               <a:rPr lang="en-US" smtClean="0"/>
-              <a:t>8/2/19</a:t>
+              <a:t>8/6/19</a:t>
             </a:fld>
             <a:r>
               <a:rPr lang="en-US"/>
@@ -5805,7 +5835,7 @@
     </p:spTree>
     <p:extLst>
       <p:ext uri="{BB962C8B-B14F-4D97-AF65-F5344CB8AC3E}">
-        <p14:creationId xmlns:p14="http://schemas.microsoft.com/office/powerpoint/2010/main" val="3540597825"/>
+        <p14:creationId xmlns:p14="http://schemas.microsoft.com/office/powerpoint/2010/main" val="1556736215"/>
       </p:ext>
     </p:extLst>
   </p:cSld>
@@ -5855,7 +5885,7 @@
           <a:p>
             <a:r>
               <a:rPr lang="en-US" dirty="0"/>
-              <a:t>Results</a:t>
+              <a:t>Methodology</a:t>
             </a:r>
           </a:p>
         </p:txBody>
@@ -5883,7 +5913,7 @@
           <a:p>
             <a:fld id="{3BB050BD-D5D4-004B-87E1-382D8D28594F}" type="datetime1">
               <a:rPr lang="en-US" smtClean="0"/>
-              <a:t>8/2/19</a:t>
+              <a:t>8/6/19</a:t>
             </a:fld>
             <a:r>
               <a:rPr lang="en-US"/>
@@ -5954,7 +5984,7 @@
     </p:spTree>
     <p:extLst>
       <p:ext uri="{BB962C8B-B14F-4D97-AF65-F5344CB8AC3E}">
-        <p14:creationId xmlns:p14="http://schemas.microsoft.com/office/powerpoint/2010/main" val="4112433492"/>
+        <p14:creationId xmlns:p14="http://schemas.microsoft.com/office/powerpoint/2010/main" val="3540597825"/>
       </p:ext>
     </p:extLst>
   </p:cSld>
@@ -6004,7 +6034,7 @@
           <a:p>
             <a:r>
               <a:rPr lang="en-US" dirty="0"/>
-              <a:t>Conclusions</a:t>
+              <a:t>Results</a:t>
             </a:r>
           </a:p>
         </p:txBody>
@@ -6032,7 +6062,7 @@
           <a:p>
             <a:fld id="{3BB050BD-D5D4-004B-87E1-382D8D28594F}" type="datetime1">
               <a:rPr lang="en-US" smtClean="0"/>
-              <a:t>8/2/19</a:t>
+              <a:t>8/6/19</a:t>
             </a:fld>
             <a:r>
               <a:rPr lang="en-US"/>
@@ -6103,7 +6133,7 @@
     </p:spTree>
     <p:extLst>
       <p:ext uri="{BB962C8B-B14F-4D97-AF65-F5344CB8AC3E}">
-        <p14:creationId xmlns:p14="http://schemas.microsoft.com/office/powerpoint/2010/main" val="229612411"/>
+        <p14:creationId xmlns:p14="http://schemas.microsoft.com/office/powerpoint/2010/main" val="4112433492"/>
       </p:ext>
     </p:extLst>
   </p:cSld>
@@ -6153,7 +6183,7 @@
           <a:p>
             <a:r>
               <a:rPr lang="en-US" dirty="0"/>
-              <a:t>Acknowledgements</a:t>
+              <a:t>Conclusions</a:t>
             </a:r>
           </a:p>
         </p:txBody>
@@ -6181,7 +6211,7 @@
           <a:p>
             <a:fld id="{3BB050BD-D5D4-004B-87E1-382D8D28594F}" type="datetime1">
               <a:rPr lang="en-US" smtClean="0"/>
-              <a:t>8/2/19</a:t>
+              <a:t>8/6/19</a:t>
             </a:fld>
             <a:r>
               <a:rPr lang="en-US"/>
@@ -6190,6 +6220,155 @@
             <a:fld id="{5D01E7E5-6465-7A46-A26D-BAABC2D34D38}" type="slidenum">
               <a:rPr lang="en-US" smtClean="0"/>
               <a:t>7</a:t>
+            </a:fld>
+            <a:endParaRPr lang="en-US" dirty="0"/>
+          </a:p>
+        </p:txBody>
+      </p:sp>
+      <p:sp>
+        <p:nvSpPr>
+          <p:cNvPr id="4" name="Footer Placeholder 3">
+            <a:extLst>
+              <a:ext uri="{FF2B5EF4-FFF2-40B4-BE49-F238E27FC236}">
+                <a16:creationId xmlns:a16="http://schemas.microsoft.com/office/drawing/2014/main" id="{867C4327-6A53-1240-9772-0B5A57D4302D}"/>
+              </a:ext>
+            </a:extLst>
+          </p:cNvPr>
+          <p:cNvSpPr>
+            <a:spLocks noGrp="1"/>
+          </p:cNvSpPr>
+          <p:nvPr>
+            <p:ph type="ftr" sz="quarter" idx="11"/>
+          </p:nvPr>
+        </p:nvSpPr>
+        <p:spPr/>
+        <p:txBody>
+          <a:bodyPr/>
+          <a:lstStyle/>
+          <a:p>
+            <a:r>
+              <a:rPr lang="en-US"/>
+              <a:t>Los Alamos National Laboratory</a:t>
+            </a:r>
+            <a:endParaRPr lang="en-US" dirty="0"/>
+          </a:p>
+        </p:txBody>
+      </p:sp>
+      <p:sp>
+        <p:nvSpPr>
+          <p:cNvPr id="5" name="Content Placeholder 4">
+            <a:extLst>
+              <a:ext uri="{FF2B5EF4-FFF2-40B4-BE49-F238E27FC236}">
+                <a16:creationId xmlns:a16="http://schemas.microsoft.com/office/drawing/2014/main" id="{5B61F8F5-7260-8343-A766-8B64C80CF172}"/>
+              </a:ext>
+            </a:extLst>
+          </p:cNvPr>
+          <p:cNvSpPr>
+            <a:spLocks noGrp="1"/>
+          </p:cNvSpPr>
+          <p:nvPr>
+            <p:ph idx="1"/>
+          </p:nvPr>
+        </p:nvSpPr>
+        <p:spPr/>
+        <p:txBody>
+          <a:bodyPr/>
+          <a:lstStyle/>
+          <a:p>
+            <a:endParaRPr lang="en-US" dirty="0"/>
+          </a:p>
+        </p:txBody>
+      </p:sp>
+    </p:spTree>
+    <p:extLst>
+      <p:ext uri="{BB962C8B-B14F-4D97-AF65-F5344CB8AC3E}">
+        <p14:creationId xmlns:p14="http://schemas.microsoft.com/office/powerpoint/2010/main" val="229612411"/>
+      </p:ext>
+    </p:extLst>
+  </p:cSld>
+  <p:clrMapOvr>
+    <a:masterClrMapping/>
+  </p:clrMapOvr>
+</p:sld>
+</file>
+
+<file path=ppt/slides/slide8.xml><?xml version="1.0" encoding="utf-8"?>
+<p:sld xmlns:a="http://schemas.openxmlformats.org/drawingml/2006/main" xmlns:r="http://schemas.openxmlformats.org/officeDocument/2006/relationships" xmlns:p="http://schemas.openxmlformats.org/presentationml/2006/main">
+  <p:cSld>
+    <p:spTree>
+      <p:nvGrpSpPr>
+        <p:cNvPr id="1" name=""/>
+        <p:cNvGrpSpPr/>
+        <p:nvPr/>
+      </p:nvGrpSpPr>
+      <p:grpSpPr>
+        <a:xfrm>
+          <a:off x="0" y="0"/>
+          <a:ext cx="0" cy="0"/>
+          <a:chOff x="0" y="0"/>
+          <a:chExt cx="0" cy="0"/>
+        </a:xfrm>
+      </p:grpSpPr>
+      <p:sp>
+        <p:nvSpPr>
+          <p:cNvPr id="2" name="Title 1">
+            <a:extLst>
+              <a:ext uri="{FF2B5EF4-FFF2-40B4-BE49-F238E27FC236}">
+                <a16:creationId xmlns:a16="http://schemas.microsoft.com/office/drawing/2014/main" id="{111F79BD-8853-EC46-B6FA-D39ABD181585}"/>
+              </a:ext>
+            </a:extLst>
+          </p:cNvPr>
+          <p:cNvSpPr>
+            <a:spLocks noGrp="1"/>
+          </p:cNvSpPr>
+          <p:nvPr>
+            <p:ph type="title"/>
+          </p:nvPr>
+        </p:nvSpPr>
+        <p:spPr/>
+        <p:txBody>
+          <a:bodyPr/>
+          <a:lstStyle/>
+          <a:p>
+            <a:r>
+              <a:rPr lang="en-US" dirty="0"/>
+              <a:t>Acknowledgements</a:t>
+            </a:r>
+          </a:p>
+        </p:txBody>
+      </p:sp>
+      <p:sp>
+        <p:nvSpPr>
+          <p:cNvPr id="3" name="Date Placeholder 2">
+            <a:extLst>
+              <a:ext uri="{FF2B5EF4-FFF2-40B4-BE49-F238E27FC236}">
+                <a16:creationId xmlns:a16="http://schemas.microsoft.com/office/drawing/2014/main" id="{6303EE71-FB58-4F44-B1BF-9C57CB8EF42B}"/>
+              </a:ext>
+            </a:extLst>
+          </p:cNvPr>
+          <p:cNvSpPr>
+            <a:spLocks noGrp="1"/>
+          </p:cNvSpPr>
+          <p:nvPr>
+            <p:ph type="dt" sz="half" idx="10"/>
+          </p:nvPr>
+        </p:nvSpPr>
+        <p:spPr/>
+        <p:txBody>
+          <a:bodyPr/>
+          <a:lstStyle/>
+          <a:p>
+            <a:fld id="{3BB050BD-D5D4-004B-87E1-382D8D28594F}" type="datetime1">
+              <a:rPr lang="en-US" smtClean="0"/>
+              <a:t>8/6/19</a:t>
+            </a:fld>
+            <a:r>
+              <a:rPr lang="en-US"/>
+              <a:t>   |   </a:t>
+            </a:r>
+            <a:fld id="{5D01E7E5-6465-7A46-A26D-BAABC2D34D38}" type="slidenum">
+              <a:rPr lang="en-US" smtClean="0"/>
+              <a:t>8</a:t>
             </a:fld>
             <a:endParaRPr lang="en-US" dirty="0"/>
           </a:p>

</xml_diff>

<commit_message>
Updated the CCS2 presentation PPT
</commit_message>
<xml_diff>
--- a/Poster and Presentation/Campbell_Scott_Variance_Reduction.pptx
+++ b/Poster and Presentation/Campbell_Scott_Variance_Reduction.pptx
@@ -5,20 +5,22 @@
     <p:sldMasterId id="2147483648" r:id="rId1"/>
   </p:sldMasterIdLst>
   <p:notesMasterIdLst>
-    <p:notesMasterId r:id="rId10"/>
+    <p:notesMasterId r:id="rId12"/>
   </p:notesMasterIdLst>
   <p:handoutMasterIdLst>
-    <p:handoutMasterId r:id="rId11"/>
+    <p:handoutMasterId r:id="rId13"/>
   </p:handoutMasterIdLst>
   <p:sldIdLst>
     <p:sldId id="263" r:id="rId2"/>
     <p:sldId id="264" r:id="rId3"/>
     <p:sldId id="257" r:id="rId4"/>
-    <p:sldId id="258" r:id="rId5"/>
-    <p:sldId id="259" r:id="rId6"/>
-    <p:sldId id="260" r:id="rId7"/>
-    <p:sldId id="261" r:id="rId8"/>
-    <p:sldId id="262" r:id="rId9"/>
+    <p:sldId id="265" r:id="rId5"/>
+    <p:sldId id="258" r:id="rId6"/>
+    <p:sldId id="259" r:id="rId7"/>
+    <p:sldId id="266" r:id="rId8"/>
+    <p:sldId id="260" r:id="rId9"/>
+    <p:sldId id="261" r:id="rId10"/>
+    <p:sldId id="262" r:id="rId11"/>
   </p:sldIdLst>
   <p:sldSz cx="9144000" cy="5715000" type="screen16x10"/>
   <p:notesSz cx="6858000" cy="9144000"/>
@@ -5185,6 +5187,271 @@
 </p:sld>
 </file>
 
+<file path=ppt/slides/slide10.xml><?xml version="1.0" encoding="utf-8"?>
+<p:sld xmlns:a="http://schemas.openxmlformats.org/drawingml/2006/main" xmlns:r="http://schemas.openxmlformats.org/officeDocument/2006/relationships" xmlns:p="http://schemas.openxmlformats.org/presentationml/2006/main">
+  <p:cSld>
+    <p:spTree>
+      <p:nvGrpSpPr>
+        <p:cNvPr id="1" name=""/>
+        <p:cNvGrpSpPr/>
+        <p:nvPr/>
+      </p:nvGrpSpPr>
+      <p:grpSpPr>
+        <a:xfrm>
+          <a:off x="0" y="0"/>
+          <a:ext cx="0" cy="0"/>
+          <a:chOff x="0" y="0"/>
+          <a:chExt cx="0" cy="0"/>
+        </a:xfrm>
+      </p:grpSpPr>
+      <p:sp>
+        <p:nvSpPr>
+          <p:cNvPr id="2" name="Title 1">
+            <a:extLst>
+              <a:ext uri="{FF2B5EF4-FFF2-40B4-BE49-F238E27FC236}">
+                <a16:creationId xmlns:a16="http://schemas.microsoft.com/office/drawing/2014/main" id="{111F79BD-8853-EC46-B6FA-D39ABD181585}"/>
+              </a:ext>
+            </a:extLst>
+          </p:cNvPr>
+          <p:cNvSpPr>
+            <a:spLocks noGrp="1"/>
+          </p:cNvSpPr>
+          <p:nvPr>
+            <p:ph type="title"/>
+          </p:nvPr>
+        </p:nvSpPr>
+        <p:spPr/>
+        <p:txBody>
+          <a:bodyPr/>
+          <a:lstStyle/>
+          <a:p>
+            <a:r>
+              <a:rPr lang="en-US" dirty="0"/>
+              <a:t>Acknowledgements &amp; References</a:t>
+            </a:r>
+          </a:p>
+        </p:txBody>
+      </p:sp>
+      <p:sp>
+        <p:nvSpPr>
+          <p:cNvPr id="3" name="Date Placeholder 2">
+            <a:extLst>
+              <a:ext uri="{FF2B5EF4-FFF2-40B4-BE49-F238E27FC236}">
+                <a16:creationId xmlns:a16="http://schemas.microsoft.com/office/drawing/2014/main" id="{6303EE71-FB58-4F44-B1BF-9C57CB8EF42B}"/>
+              </a:ext>
+            </a:extLst>
+          </p:cNvPr>
+          <p:cNvSpPr>
+            <a:spLocks noGrp="1"/>
+          </p:cNvSpPr>
+          <p:nvPr>
+            <p:ph type="dt" sz="half" idx="10"/>
+          </p:nvPr>
+        </p:nvSpPr>
+        <p:spPr/>
+        <p:txBody>
+          <a:bodyPr/>
+          <a:lstStyle/>
+          <a:p>
+            <a:fld id="{3BB050BD-D5D4-004B-87E1-382D8D28594F}" type="datetime1">
+              <a:rPr lang="en-US" smtClean="0"/>
+              <a:t>8/6/19</a:t>
+            </a:fld>
+            <a:r>
+              <a:rPr lang="en-US"/>
+              <a:t>   |   </a:t>
+            </a:r>
+            <a:fld id="{5D01E7E5-6465-7A46-A26D-BAABC2D34D38}" type="slidenum">
+              <a:rPr lang="en-US" smtClean="0"/>
+              <a:t>10</a:t>
+            </a:fld>
+            <a:endParaRPr lang="en-US" dirty="0"/>
+          </a:p>
+        </p:txBody>
+      </p:sp>
+      <p:sp>
+        <p:nvSpPr>
+          <p:cNvPr id="4" name="Footer Placeholder 3">
+            <a:extLst>
+              <a:ext uri="{FF2B5EF4-FFF2-40B4-BE49-F238E27FC236}">
+                <a16:creationId xmlns:a16="http://schemas.microsoft.com/office/drawing/2014/main" id="{867C4327-6A53-1240-9772-0B5A57D4302D}"/>
+              </a:ext>
+            </a:extLst>
+          </p:cNvPr>
+          <p:cNvSpPr>
+            <a:spLocks noGrp="1"/>
+          </p:cNvSpPr>
+          <p:nvPr>
+            <p:ph type="ftr" sz="quarter" idx="11"/>
+          </p:nvPr>
+        </p:nvSpPr>
+        <p:spPr/>
+        <p:txBody>
+          <a:bodyPr/>
+          <a:lstStyle/>
+          <a:p>
+            <a:r>
+              <a:rPr lang="en-US"/>
+              <a:t>Los Alamos National Laboratory</a:t>
+            </a:r>
+            <a:endParaRPr lang="en-US" dirty="0"/>
+          </a:p>
+        </p:txBody>
+      </p:sp>
+      <p:sp>
+        <p:nvSpPr>
+          <p:cNvPr id="5" name="Content Placeholder 4">
+            <a:extLst>
+              <a:ext uri="{FF2B5EF4-FFF2-40B4-BE49-F238E27FC236}">
+                <a16:creationId xmlns:a16="http://schemas.microsoft.com/office/drawing/2014/main" id="{5B61F8F5-7260-8343-A766-8B64C80CF172}"/>
+              </a:ext>
+            </a:extLst>
+          </p:cNvPr>
+          <p:cNvSpPr>
+            <a:spLocks noGrp="1"/>
+          </p:cNvSpPr>
+          <p:nvPr>
+            <p:ph idx="1"/>
+          </p:nvPr>
+        </p:nvSpPr>
+        <p:spPr>
+          <a:xfrm>
+            <a:off x="203200" y="943030"/>
+            <a:ext cx="8712200" cy="4328440"/>
+          </a:xfrm>
+        </p:spPr>
+        <p:txBody>
+          <a:bodyPr/>
+          <a:lstStyle/>
+          <a:p>
+            <a:r>
+              <a:rPr lang="en-US" dirty="0"/>
+              <a:t>Acknowledgements</a:t>
+            </a:r>
+          </a:p>
+          <a:p>
+            <a:pPr lvl="2"/>
+            <a:r>
+              <a:rPr lang="en-US" dirty="0"/>
+              <a:t>We would like to thank the XCP Summer Computational Physics Workshop, its directors, and its mentors for the opportunity, time, and mentorship.</a:t>
+            </a:r>
+          </a:p>
+          <a:p>
+            <a:pPr marL="0" indent="0">
+              <a:buNone/>
+            </a:pPr>
+            <a:endParaRPr lang="en-US" dirty="0"/>
+          </a:p>
+          <a:p>
+            <a:pPr marL="0" indent="0">
+              <a:buNone/>
+            </a:pPr>
+            <a:endParaRPr lang="en-US" dirty="0"/>
+          </a:p>
+          <a:p>
+            <a:pPr marL="0" indent="0">
+              <a:buNone/>
+            </a:pPr>
+            <a:endParaRPr lang="en-US" dirty="0"/>
+          </a:p>
+          <a:p>
+            <a:r>
+              <a:rPr lang="en-US" dirty="0"/>
+              <a:t>References</a:t>
+            </a:r>
+          </a:p>
+          <a:p>
+            <a:endParaRPr lang="en-US" sz="1000" dirty="0"/>
+          </a:p>
+          <a:p>
+            <a:pPr marL="0" indent="0">
+              <a:buNone/>
+            </a:pPr>
+            <a:r>
+              <a:rPr lang="en-US" sz="1200" dirty="0"/>
+              <a:t>[1]	J.A. Fleck, Jr. and J.D. Cummings, Jr., “An implicit Monte Carlo scheme for calculating time and frequency dependent		 nonlinear radiation transport,” </a:t>
+            </a:r>
+            <a:r>
+              <a:rPr lang="en-US" sz="1200" i="1" dirty="0"/>
+              <a:t>J. Comp. Phys. </a:t>
+            </a:r>
+            <a:r>
+              <a:rPr lang="en-US" sz="1200" dirty="0"/>
+              <a:t>8, pp. 313–342, (1971). </a:t>
+            </a:r>
+          </a:p>
+          <a:p>
+            <a:pPr marL="0" indent="0">
+              <a:buNone/>
+            </a:pPr>
+            <a:r>
+              <a:rPr lang="en-US" sz="1200" dirty="0"/>
+              <a:t>[2]	J.T. Landman, “Variance reduction strategies for implicit Monte Carlo simulations,” PhD thesis, Texas A&amp;M University,		 </a:t>
+            </a:r>
+            <a:r>
+              <a:rPr lang="en-US" sz="1200" i="1" dirty="0"/>
+              <a:t>Texas A&amp;M University</a:t>
+            </a:r>
+            <a:r>
+              <a:rPr lang="en-US" sz="1200" dirty="0"/>
+              <a:t>, (2016). </a:t>
+            </a:r>
+          </a:p>
+          <a:p>
+            <a:pPr marL="0" indent="0">
+              <a:buNone/>
+            </a:pPr>
+            <a:r>
+              <a:rPr lang="en-US" sz="1200" dirty="0"/>
+              <a:t>[3]	W.T. Dailey, “Ray next-event estimator transport of primary and secondary gamma rays,” PhD thesis, Air Force Institute		 of Technology, </a:t>
+            </a:r>
+            <a:r>
+              <a:rPr lang="en-US" sz="1200" i="1" dirty="0"/>
+              <a:t>Air Force Institute of Technology</a:t>
+            </a:r>
+            <a:r>
+              <a:rPr lang="en-US" sz="1200" dirty="0"/>
+              <a:t>, 2011. </a:t>
+            </a:r>
+          </a:p>
+          <a:p>
+            <a:pPr marL="0" indent="0">
+              <a:buNone/>
+            </a:pPr>
+            <a:r>
+              <a:rPr lang="en-US" sz="1200" dirty="0"/>
+              <a:t>[4] 	T.J. Moriya, S.I. Blinnikov, N. Tominaga et al., “Light-curve modelling of superluminous supernova 2006gy: collision			 between supernova ejecta and a dense circumstellar medium,” </a:t>
+            </a:r>
+            <a:r>
+              <a:rPr lang="en-US" sz="1200" i="1" dirty="0"/>
+              <a:t>MNRAS </a:t>
+            </a:r>
+            <a:r>
+              <a:rPr lang="en-US" sz="1200" dirty="0"/>
+              <a:t>428, pp. 1020–1035,	 (2013). </a:t>
+            </a:r>
+          </a:p>
+          <a:p>
+            <a:pPr marL="0" indent="0">
+              <a:buNone/>
+            </a:pPr>
+            <a:endParaRPr lang="en-US" sz="1200" dirty="0"/>
+          </a:p>
+        </p:txBody>
+      </p:sp>
+    </p:spTree>
+    <p:extLst>
+      <p:ext uri="{BB962C8B-B14F-4D97-AF65-F5344CB8AC3E}">
+        <p14:creationId xmlns:p14="http://schemas.microsoft.com/office/powerpoint/2010/main" val="2063819716"/>
+      </p:ext>
+    </p:extLst>
+  </p:cSld>
+  <p:clrMapOvr>
+    <a:masterClrMapping/>
+  </p:clrMapOvr>
+</p:sld>
+</file>
+
 <file path=ppt/slides/slide2.xml><?xml version="1.0" encoding="utf-8"?>
 <p:sld xmlns:a="http://schemas.openxmlformats.org/drawingml/2006/main" xmlns:r="http://schemas.openxmlformats.org/officeDocument/2006/relationships" xmlns:p="http://schemas.openxmlformats.org/presentationml/2006/main">
   <p:cSld>
@@ -5626,31 +5893,1453 @@
           </a:p>
         </p:txBody>
       </p:sp>
-      <p:sp>
-        <p:nvSpPr>
-          <p:cNvPr id="5" name="Content Placeholder 4">
-            <a:extLst>
-              <a:ext uri="{FF2B5EF4-FFF2-40B4-BE49-F238E27FC236}">
-                <a16:creationId xmlns:a16="http://schemas.microsoft.com/office/drawing/2014/main" id="{5B61F8F5-7260-8343-A766-8B64C80CF172}"/>
-              </a:ext>
-            </a:extLst>
-          </p:cNvPr>
-          <p:cNvSpPr>
-            <a:spLocks noGrp="1"/>
-          </p:cNvSpPr>
-          <p:nvPr>
-            <p:ph idx="1"/>
-          </p:nvPr>
-        </p:nvSpPr>
-        <p:spPr/>
-        <p:txBody>
-          <a:bodyPr/>
-          <a:lstStyle/>
-          <a:p>
-            <a:endParaRPr lang="en-US" dirty="0"/>
-          </a:p>
-        </p:txBody>
-      </p:sp>
+      <mc:AlternateContent xmlns:mc="http://schemas.openxmlformats.org/markup-compatibility/2006">
+        <mc:Choice xmlns:a14="http://schemas.microsoft.com/office/drawing/2010/main" Requires="a14">
+          <p:sp>
+            <p:nvSpPr>
+              <p:cNvPr id="5" name="Content Placeholder 4">
+                <a:extLst>
+                  <a:ext uri="{FF2B5EF4-FFF2-40B4-BE49-F238E27FC236}">
+                    <a16:creationId xmlns:a16="http://schemas.microsoft.com/office/drawing/2014/main" id="{5B61F8F5-7260-8343-A766-8B64C80CF172}"/>
+                  </a:ext>
+                </a:extLst>
+              </p:cNvPr>
+              <p:cNvSpPr>
+                <a:spLocks noGrp="1"/>
+              </p:cNvSpPr>
+              <p:nvPr>
+                <p:ph idx="1"/>
+              </p:nvPr>
+            </p:nvSpPr>
+            <p:spPr>
+              <a:xfrm>
+                <a:off x="457200" y="943030"/>
+                <a:ext cx="8229600" cy="4328440"/>
+              </a:xfrm>
+            </p:spPr>
+            <p:txBody>
+              <a:bodyPr/>
+              <a:lstStyle/>
+              <a:p>
+                <a:pPr marL="0" indent="0">
+                  <a:buNone/>
+                </a:pPr>
+                <a:r>
+                  <a:rPr lang="en-US" dirty="0"/>
+                  <a:t>Thermal Radiative Transport (TRT)</a:t>
+                </a:r>
+              </a:p>
+              <a:p>
+                <a:pPr lvl="2"/>
+                <a14:m>
+                  <m:oMath xmlns:m="http://schemas.openxmlformats.org/officeDocument/2006/math">
+                    <m:eqArr>
+                      <m:eqArrPr>
+                        <m:ctrlPr>
+                          <a:rPr lang="en-US" b="0" i="1" dirty="0" smtClean="0">
+                            <a:latin typeface="Cambria Math" panose="02040503050406030204" pitchFamily="18" charset="0"/>
+                          </a:rPr>
+                        </m:ctrlPr>
+                      </m:eqArrPr>
+                      <m:e>
+                        <m:r>
+                          <a:rPr lang="en-US" b="0" i="1" dirty="0" smtClean="0">
+                            <a:latin typeface="Cambria Math" panose="02040503050406030204" pitchFamily="18" charset="0"/>
+                          </a:rPr>
+                          <m:t> </m:t>
+                        </m:r>
+                        <m:f>
+                          <m:fPr>
+                            <m:ctrlPr>
+                              <a:rPr lang="en-US" b="0" i="1" smtClean="0">
+                                <a:latin typeface="Cambria Math" panose="02040503050406030204" pitchFamily="18" charset="0"/>
+                              </a:rPr>
+                            </m:ctrlPr>
+                          </m:fPr>
+                          <m:num>
+                            <m:r>
+                              <a:rPr lang="en-US" b="0" i="1" smtClean="0">
+                                <a:latin typeface="Cambria Math" panose="02040503050406030204" pitchFamily="18" charset="0"/>
+                              </a:rPr>
+                              <m:t>1</m:t>
+                            </m:r>
+                          </m:num>
+                          <m:den>
+                            <m:r>
+                              <a:rPr lang="en-US" b="0" i="1" smtClean="0">
+                                <a:latin typeface="Cambria Math" panose="02040503050406030204" pitchFamily="18" charset="0"/>
+                              </a:rPr>
+                              <m:t>𝑐</m:t>
+                            </m:r>
+                          </m:den>
+                        </m:f>
+                        <m:f>
+                          <m:fPr>
+                            <m:ctrlPr>
+                              <a:rPr lang="en-US" b="0" i="1" smtClean="0">
+                                <a:latin typeface="Cambria Math" panose="02040503050406030204" pitchFamily="18" charset="0"/>
+                              </a:rPr>
+                            </m:ctrlPr>
+                          </m:fPr>
+                          <m:num>
+                            <m:r>
+                              <a:rPr lang="en-US" b="0" i="1" smtClean="0">
+                                <a:latin typeface="Cambria Math" panose="02040503050406030204" pitchFamily="18" charset="0"/>
+                              </a:rPr>
+                              <m:t>𝜕</m:t>
+                            </m:r>
+                            <m:r>
+                              <a:rPr lang="en-US" b="0" i="1" smtClean="0">
+                                <a:latin typeface="Cambria Math" panose="02040503050406030204" pitchFamily="18" charset="0"/>
+                              </a:rPr>
+                              <m:t>𝐼</m:t>
+                            </m:r>
+                          </m:num>
+                          <m:den>
+                            <m:r>
+                              <a:rPr lang="en-US" b="0" i="1" smtClean="0">
+                                <a:latin typeface="Cambria Math" panose="02040503050406030204" pitchFamily="18" charset="0"/>
+                              </a:rPr>
+                              <m:t>𝜕</m:t>
+                            </m:r>
+                            <m:r>
+                              <a:rPr lang="en-US" b="0" i="1" smtClean="0">
+                                <a:latin typeface="Cambria Math" panose="02040503050406030204" pitchFamily="18" charset="0"/>
+                              </a:rPr>
+                              <m:t>𝑡</m:t>
+                            </m:r>
+                          </m:den>
+                        </m:f>
+                        <m:d>
+                          <m:dPr>
+                            <m:ctrlPr>
+                              <a:rPr lang="en-US" b="0" i="1" smtClean="0">
+                                <a:latin typeface="Cambria Math" panose="02040503050406030204" pitchFamily="18" charset="0"/>
+                              </a:rPr>
+                            </m:ctrlPr>
+                          </m:dPr>
+                          <m:e>
+                            <m:acc>
+                              <m:accPr>
+                                <m:chr m:val="⃗"/>
+                                <m:ctrlPr>
+                                  <a:rPr lang="en-US" b="0" i="1" smtClean="0">
+                                    <a:latin typeface="Cambria Math" panose="02040503050406030204" pitchFamily="18" charset="0"/>
+                                  </a:rPr>
+                                </m:ctrlPr>
+                              </m:accPr>
+                              <m:e>
+                                <m:r>
+                                  <a:rPr lang="en-US" b="0" i="1" smtClean="0">
+                                    <a:latin typeface="Cambria Math" panose="02040503050406030204" pitchFamily="18" charset="0"/>
+                                  </a:rPr>
+                                  <m:t>𝑟</m:t>
+                                </m:r>
+                              </m:e>
+                            </m:acc>
+                            <m:r>
+                              <a:rPr lang="en-US" b="0" i="1" smtClean="0">
+                                <a:latin typeface="Cambria Math" panose="02040503050406030204" pitchFamily="18" charset="0"/>
+                              </a:rPr>
+                              <m:t>,</m:t>
+                            </m:r>
+                            <m:acc>
+                              <m:accPr>
+                                <m:chr m:val="⃗"/>
+                                <m:ctrlPr>
+                                  <a:rPr lang="en-US" b="0" i="1" smtClean="0">
+                                    <a:latin typeface="Cambria Math" panose="02040503050406030204" pitchFamily="18" charset="0"/>
+                                  </a:rPr>
+                                </m:ctrlPr>
+                              </m:accPr>
+                              <m:e>
+                                <m:r>
+                                  <m:rPr>
+                                    <m:sty m:val="p"/>
+                                  </m:rPr>
+                                  <a:rPr lang="en-US" b="0" i="0" smtClean="0">
+                                    <a:latin typeface="Cambria Math" panose="02040503050406030204" pitchFamily="18" charset="0"/>
+                                  </a:rPr>
+                                  <m:t>Ω</m:t>
+                                </m:r>
+                              </m:e>
+                            </m:acc>
+                            <m:r>
+                              <a:rPr lang="en-US" b="0" i="1" smtClean="0">
+                                <a:latin typeface="Cambria Math" panose="02040503050406030204" pitchFamily="18" charset="0"/>
+                              </a:rPr>
+                              <m:t>,</m:t>
+                            </m:r>
+                            <m:r>
+                              <a:rPr lang="en-US" b="0" i="1" smtClean="0">
+                                <a:latin typeface="Cambria Math" panose="02040503050406030204" pitchFamily="18" charset="0"/>
+                              </a:rPr>
+                              <m:t>𝜈</m:t>
+                            </m:r>
+                            <m:r>
+                              <a:rPr lang="en-US" b="0" i="1" smtClean="0">
+                                <a:latin typeface="Cambria Math" panose="02040503050406030204" pitchFamily="18" charset="0"/>
+                              </a:rPr>
+                              <m:t>,</m:t>
+                            </m:r>
+                            <m:r>
+                              <a:rPr lang="en-US" b="0" i="1" smtClean="0">
+                                <a:latin typeface="Cambria Math" panose="02040503050406030204" pitchFamily="18" charset="0"/>
+                              </a:rPr>
+                              <m:t>𝑡</m:t>
+                            </m:r>
+                          </m:e>
+                        </m:d>
+                        <m:r>
+                          <a:rPr lang="en-US" b="0" i="1" smtClean="0">
+                            <a:latin typeface="Cambria Math" panose="02040503050406030204" pitchFamily="18" charset="0"/>
+                          </a:rPr>
+                          <m:t>+</m:t>
+                        </m:r>
+                        <m:acc>
+                          <m:accPr>
+                            <m:chr m:val="⃗"/>
+                            <m:ctrlPr>
+                              <a:rPr lang="en-US" b="0" i="1" smtClean="0">
+                                <a:latin typeface="Cambria Math" panose="02040503050406030204" pitchFamily="18" charset="0"/>
+                              </a:rPr>
+                            </m:ctrlPr>
+                          </m:accPr>
+                          <m:e>
+                            <m:r>
+                              <m:rPr>
+                                <m:sty m:val="p"/>
+                              </m:rPr>
+                              <a:rPr lang="en-US" b="0" i="0" smtClean="0">
+                                <a:latin typeface="Cambria Math" panose="02040503050406030204" pitchFamily="18" charset="0"/>
+                              </a:rPr>
+                              <m:t>Ω</m:t>
+                            </m:r>
+                          </m:e>
+                        </m:acc>
+                        <m:f>
+                          <m:fPr>
+                            <m:ctrlPr>
+                              <a:rPr lang="en-US" b="0" i="1" dirty="0" smtClean="0">
+                                <a:latin typeface="Cambria Math" panose="02040503050406030204" pitchFamily="18" charset="0"/>
+                              </a:rPr>
+                            </m:ctrlPr>
+                          </m:fPr>
+                          <m:num>
+                            <m:r>
+                              <a:rPr lang="en-US" b="0" i="1" dirty="0" smtClean="0">
+                                <a:latin typeface="Cambria Math" panose="02040503050406030204" pitchFamily="18" charset="0"/>
+                              </a:rPr>
+                              <m:t>𝜕</m:t>
+                            </m:r>
+                            <m:r>
+                              <a:rPr lang="en-US" b="0" i="1" dirty="0" smtClean="0">
+                                <a:latin typeface="Cambria Math" panose="02040503050406030204" pitchFamily="18" charset="0"/>
+                              </a:rPr>
+                              <m:t>𝐼</m:t>
+                            </m:r>
+                          </m:num>
+                          <m:den>
+                            <m:r>
+                              <a:rPr lang="en-US" b="0" i="1" dirty="0" smtClean="0">
+                                <a:latin typeface="Cambria Math" panose="02040503050406030204" pitchFamily="18" charset="0"/>
+                              </a:rPr>
+                              <m:t>𝜕</m:t>
+                            </m:r>
+                            <m:acc>
+                              <m:accPr>
+                                <m:chr m:val="⃗"/>
+                                <m:ctrlPr>
+                                  <a:rPr lang="en-US" b="0" i="1" dirty="0" smtClean="0">
+                                    <a:latin typeface="Cambria Math" panose="02040503050406030204" pitchFamily="18" charset="0"/>
+                                  </a:rPr>
+                                </m:ctrlPr>
+                              </m:accPr>
+                              <m:e>
+                                <m:r>
+                                  <a:rPr lang="en-US" b="0" i="1" dirty="0" smtClean="0">
+                                    <a:latin typeface="Cambria Math" panose="02040503050406030204" pitchFamily="18" charset="0"/>
+                                  </a:rPr>
+                                  <m:t>𝑟</m:t>
+                                </m:r>
+                              </m:e>
+                            </m:acc>
+                          </m:den>
+                        </m:f>
+                        <m:d>
+                          <m:dPr>
+                            <m:ctrlPr>
+                              <a:rPr lang="en-US" b="0" i="1" dirty="0" smtClean="0">
+                                <a:latin typeface="Cambria Math" panose="02040503050406030204" pitchFamily="18" charset="0"/>
+                              </a:rPr>
+                            </m:ctrlPr>
+                          </m:dPr>
+                          <m:e>
+                            <m:acc>
+                              <m:accPr>
+                                <m:chr m:val="⃗"/>
+                                <m:ctrlPr>
+                                  <a:rPr lang="en-US" b="0" i="1" dirty="0" smtClean="0">
+                                    <a:latin typeface="Cambria Math" panose="02040503050406030204" pitchFamily="18" charset="0"/>
+                                  </a:rPr>
+                                </m:ctrlPr>
+                              </m:accPr>
+                              <m:e>
+                                <m:r>
+                                  <a:rPr lang="en-US" b="0" i="1" dirty="0" smtClean="0">
+                                    <a:latin typeface="Cambria Math" panose="02040503050406030204" pitchFamily="18" charset="0"/>
+                                  </a:rPr>
+                                  <m:t>𝑟</m:t>
+                                </m:r>
+                              </m:e>
+                            </m:acc>
+                            <m:r>
+                              <a:rPr lang="en-US" b="0" i="1" dirty="0" smtClean="0">
+                                <a:latin typeface="Cambria Math" panose="02040503050406030204" pitchFamily="18" charset="0"/>
+                              </a:rPr>
+                              <m:t>,</m:t>
+                            </m:r>
+                            <m:acc>
+                              <m:accPr>
+                                <m:chr m:val="⃗"/>
+                                <m:ctrlPr>
+                                  <a:rPr lang="en-US" b="0" i="1" dirty="0" smtClean="0">
+                                    <a:latin typeface="Cambria Math" panose="02040503050406030204" pitchFamily="18" charset="0"/>
+                                  </a:rPr>
+                                </m:ctrlPr>
+                              </m:accPr>
+                              <m:e>
+                                <m:r>
+                                  <m:rPr>
+                                    <m:sty m:val="p"/>
+                                  </m:rPr>
+                                  <a:rPr lang="en-US" b="0" i="0" dirty="0" smtClean="0">
+                                    <a:latin typeface="Cambria Math" panose="02040503050406030204" pitchFamily="18" charset="0"/>
+                                  </a:rPr>
+                                  <m:t>Ω</m:t>
+                                </m:r>
+                              </m:e>
+                            </m:acc>
+                            <m:r>
+                              <a:rPr lang="en-US" b="0" i="1" dirty="0" smtClean="0">
+                                <a:latin typeface="Cambria Math" panose="02040503050406030204" pitchFamily="18" charset="0"/>
+                              </a:rPr>
+                              <m:t>,</m:t>
+                            </m:r>
+                            <m:r>
+                              <a:rPr lang="en-US" b="0" i="1" dirty="0" smtClean="0">
+                                <a:latin typeface="Cambria Math" panose="02040503050406030204" pitchFamily="18" charset="0"/>
+                              </a:rPr>
+                              <m:t>𝜈</m:t>
+                            </m:r>
+                            <m:r>
+                              <a:rPr lang="en-US" b="0" i="1" dirty="0" smtClean="0">
+                                <a:latin typeface="Cambria Math" panose="02040503050406030204" pitchFamily="18" charset="0"/>
+                              </a:rPr>
+                              <m:t>,</m:t>
+                            </m:r>
+                            <m:r>
+                              <a:rPr lang="en-US" b="0" i="1" dirty="0" smtClean="0">
+                                <a:latin typeface="Cambria Math" panose="02040503050406030204" pitchFamily="18" charset="0"/>
+                              </a:rPr>
+                              <m:t>𝑡</m:t>
+                            </m:r>
+                          </m:e>
+                        </m:d>
+                        <m:r>
+                          <a:rPr lang="en-US" b="0" i="1" dirty="0" smtClean="0">
+                            <a:latin typeface="Cambria Math" panose="02040503050406030204" pitchFamily="18" charset="0"/>
+                          </a:rPr>
+                          <m:t>+</m:t>
+                        </m:r>
+                        <m:sSub>
+                          <m:sSubPr>
+                            <m:ctrlPr>
+                              <a:rPr lang="en-US" b="0" i="1" dirty="0" smtClean="0">
+                                <a:latin typeface="Cambria Math" panose="02040503050406030204" pitchFamily="18" charset="0"/>
+                              </a:rPr>
+                            </m:ctrlPr>
+                          </m:sSubPr>
+                          <m:e>
+                            <m:r>
+                              <a:rPr lang="en-US" b="0" i="1" dirty="0" smtClean="0">
+                                <a:latin typeface="Cambria Math" panose="02040503050406030204" pitchFamily="18" charset="0"/>
+                              </a:rPr>
+                              <m:t>𝜎</m:t>
+                            </m:r>
+                          </m:e>
+                          <m:sub>
+                            <m:r>
+                              <a:rPr lang="en-US" b="0" i="1" dirty="0" smtClean="0">
+                                <a:latin typeface="Cambria Math" panose="02040503050406030204" pitchFamily="18" charset="0"/>
+                              </a:rPr>
+                              <m:t>𝑎</m:t>
+                            </m:r>
+                          </m:sub>
+                        </m:sSub>
+                        <m:d>
+                          <m:dPr>
+                            <m:ctrlPr>
+                              <a:rPr lang="en-US" b="0" i="1" dirty="0" smtClean="0">
+                                <a:latin typeface="Cambria Math" panose="02040503050406030204" pitchFamily="18" charset="0"/>
+                              </a:rPr>
+                            </m:ctrlPr>
+                          </m:dPr>
+                          <m:e>
+                            <m:acc>
+                              <m:accPr>
+                                <m:chr m:val="⃗"/>
+                                <m:ctrlPr>
+                                  <a:rPr lang="en-US" b="0" i="1" dirty="0" smtClean="0">
+                                    <a:latin typeface="Cambria Math" panose="02040503050406030204" pitchFamily="18" charset="0"/>
+                                  </a:rPr>
+                                </m:ctrlPr>
+                              </m:accPr>
+                              <m:e>
+                                <m:r>
+                                  <a:rPr lang="en-US" b="0" i="1" dirty="0" smtClean="0">
+                                    <a:latin typeface="Cambria Math" panose="02040503050406030204" pitchFamily="18" charset="0"/>
+                                  </a:rPr>
+                                  <m:t>𝑟</m:t>
+                                </m:r>
+                              </m:e>
+                            </m:acc>
+                            <m:r>
+                              <a:rPr lang="en-US" b="0" i="1" dirty="0" smtClean="0">
+                                <a:latin typeface="Cambria Math" panose="02040503050406030204" pitchFamily="18" charset="0"/>
+                              </a:rPr>
+                              <m:t>,</m:t>
+                            </m:r>
+                            <m:r>
+                              <a:rPr lang="en-US" b="0" i="1" dirty="0" smtClean="0">
+                                <a:latin typeface="Cambria Math" panose="02040503050406030204" pitchFamily="18" charset="0"/>
+                              </a:rPr>
+                              <m:t>𝜈</m:t>
+                            </m:r>
+                            <m:r>
+                              <a:rPr lang="en-US" b="0" i="1" dirty="0" smtClean="0">
+                                <a:latin typeface="Cambria Math" panose="02040503050406030204" pitchFamily="18" charset="0"/>
+                              </a:rPr>
+                              <m:t>,</m:t>
+                            </m:r>
+                            <m:r>
+                              <a:rPr lang="en-US" b="0" i="1" dirty="0" smtClean="0">
+                                <a:latin typeface="Cambria Math" panose="02040503050406030204" pitchFamily="18" charset="0"/>
+                              </a:rPr>
+                              <m:t>𝑇</m:t>
+                            </m:r>
+                          </m:e>
+                        </m:d>
+                        <m:r>
+                          <a:rPr lang="en-US" b="0" i="1" dirty="0" smtClean="0">
+                            <a:latin typeface="Cambria Math" panose="02040503050406030204" pitchFamily="18" charset="0"/>
+                          </a:rPr>
+                          <m:t>𝐼</m:t>
+                        </m:r>
+                        <m:d>
+                          <m:dPr>
+                            <m:ctrlPr>
+                              <a:rPr lang="en-US" b="0" i="1" dirty="0" smtClean="0">
+                                <a:latin typeface="Cambria Math" panose="02040503050406030204" pitchFamily="18" charset="0"/>
+                              </a:rPr>
+                            </m:ctrlPr>
+                          </m:dPr>
+                          <m:e>
+                            <m:acc>
+                              <m:accPr>
+                                <m:chr m:val="⃗"/>
+                                <m:ctrlPr>
+                                  <a:rPr lang="en-US" b="0" i="1" dirty="0" smtClean="0">
+                                    <a:latin typeface="Cambria Math" panose="02040503050406030204" pitchFamily="18" charset="0"/>
+                                  </a:rPr>
+                                </m:ctrlPr>
+                              </m:accPr>
+                              <m:e>
+                                <m:r>
+                                  <a:rPr lang="en-US" b="0" i="1" dirty="0" smtClean="0">
+                                    <a:latin typeface="Cambria Math" panose="02040503050406030204" pitchFamily="18" charset="0"/>
+                                  </a:rPr>
+                                  <m:t>𝑟</m:t>
+                                </m:r>
+                              </m:e>
+                            </m:acc>
+                            <m:r>
+                              <a:rPr lang="en-US" b="0" i="1" dirty="0" smtClean="0">
+                                <a:latin typeface="Cambria Math" panose="02040503050406030204" pitchFamily="18" charset="0"/>
+                              </a:rPr>
+                              <m:t>,</m:t>
+                            </m:r>
+                            <m:acc>
+                              <m:accPr>
+                                <m:chr m:val="⃗"/>
+                                <m:ctrlPr>
+                                  <a:rPr lang="en-US" b="0" i="1" dirty="0" smtClean="0">
+                                    <a:latin typeface="Cambria Math" panose="02040503050406030204" pitchFamily="18" charset="0"/>
+                                  </a:rPr>
+                                </m:ctrlPr>
+                              </m:accPr>
+                              <m:e>
+                                <m:r>
+                                  <m:rPr>
+                                    <m:sty m:val="p"/>
+                                  </m:rPr>
+                                  <a:rPr lang="en-US" b="0" i="0" dirty="0" smtClean="0">
+                                    <a:latin typeface="Cambria Math" panose="02040503050406030204" pitchFamily="18" charset="0"/>
+                                  </a:rPr>
+                                  <m:t>Ω</m:t>
+                                </m:r>
+                              </m:e>
+                            </m:acc>
+                            <m:r>
+                              <a:rPr lang="en-US" b="0" i="1" dirty="0" smtClean="0">
+                                <a:latin typeface="Cambria Math" panose="02040503050406030204" pitchFamily="18" charset="0"/>
+                              </a:rPr>
+                              <m:t>,</m:t>
+                            </m:r>
+                            <m:r>
+                              <a:rPr lang="en-US" b="0" i="1" dirty="0" smtClean="0">
+                                <a:latin typeface="Cambria Math" panose="02040503050406030204" pitchFamily="18" charset="0"/>
+                              </a:rPr>
+                              <m:t>𝜈</m:t>
+                            </m:r>
+                            <m:r>
+                              <a:rPr lang="en-US" b="0" i="1" dirty="0" smtClean="0">
+                                <a:latin typeface="Cambria Math" panose="02040503050406030204" pitchFamily="18" charset="0"/>
+                              </a:rPr>
+                              <m:t>,</m:t>
+                            </m:r>
+                            <m:r>
+                              <a:rPr lang="en-US" b="0" i="1" dirty="0" smtClean="0">
+                                <a:latin typeface="Cambria Math" panose="02040503050406030204" pitchFamily="18" charset="0"/>
+                              </a:rPr>
+                              <m:t>𝑡</m:t>
+                            </m:r>
+                          </m:e>
+                        </m:d>
+                      </m:e>
+                      <m:e>
+                        <m:r>
+                          <a:rPr lang="en-US" b="0" i="1" dirty="0" smtClean="0">
+                            <a:latin typeface="Cambria Math" panose="02040503050406030204" pitchFamily="18" charset="0"/>
+                          </a:rPr>
+                          <m:t>=2</m:t>
+                        </m:r>
+                        <m:r>
+                          <a:rPr lang="en-US" b="0" i="1" dirty="0" smtClean="0">
+                            <a:latin typeface="Cambria Math" panose="02040503050406030204" pitchFamily="18" charset="0"/>
+                          </a:rPr>
+                          <m:t>𝜋</m:t>
+                        </m:r>
+                        <m:sSub>
+                          <m:sSubPr>
+                            <m:ctrlPr>
+                              <a:rPr lang="en-US" b="0" i="1" dirty="0" smtClean="0">
+                                <a:latin typeface="Cambria Math" panose="02040503050406030204" pitchFamily="18" charset="0"/>
+                              </a:rPr>
+                            </m:ctrlPr>
+                          </m:sSubPr>
+                          <m:e>
+                            <m:r>
+                              <a:rPr lang="en-US" b="0" i="1" dirty="0" smtClean="0">
+                                <a:latin typeface="Cambria Math" panose="02040503050406030204" pitchFamily="18" charset="0"/>
+                              </a:rPr>
+                              <m:t>𝜎</m:t>
+                            </m:r>
+                          </m:e>
+                          <m:sub>
+                            <m:r>
+                              <a:rPr lang="en-US" b="0" i="1" dirty="0" smtClean="0">
+                                <a:latin typeface="Cambria Math" panose="02040503050406030204" pitchFamily="18" charset="0"/>
+                              </a:rPr>
+                              <m:t>𝑎</m:t>
+                            </m:r>
+                          </m:sub>
+                        </m:sSub>
+                        <m:d>
+                          <m:dPr>
+                            <m:ctrlPr>
+                              <a:rPr lang="en-US" b="0" i="1" dirty="0" smtClean="0">
+                                <a:latin typeface="Cambria Math" panose="02040503050406030204" pitchFamily="18" charset="0"/>
+                              </a:rPr>
+                            </m:ctrlPr>
+                          </m:dPr>
+                          <m:e>
+                            <m:acc>
+                              <m:accPr>
+                                <m:chr m:val="⃗"/>
+                                <m:ctrlPr>
+                                  <a:rPr lang="en-US" b="0" i="1" dirty="0" smtClean="0">
+                                    <a:latin typeface="Cambria Math" panose="02040503050406030204" pitchFamily="18" charset="0"/>
+                                  </a:rPr>
+                                </m:ctrlPr>
+                              </m:accPr>
+                              <m:e>
+                                <m:r>
+                                  <a:rPr lang="en-US" b="0" i="1" dirty="0" smtClean="0">
+                                    <a:latin typeface="Cambria Math" panose="02040503050406030204" pitchFamily="18" charset="0"/>
+                                  </a:rPr>
+                                  <m:t>𝑟</m:t>
+                                </m:r>
+                              </m:e>
+                            </m:acc>
+                            <m:r>
+                              <a:rPr lang="en-US" b="0" i="1" dirty="0" smtClean="0">
+                                <a:latin typeface="Cambria Math" panose="02040503050406030204" pitchFamily="18" charset="0"/>
+                              </a:rPr>
+                              <m:t>,</m:t>
+                            </m:r>
+                            <m:r>
+                              <a:rPr lang="en-US" b="0" i="1" dirty="0" smtClean="0">
+                                <a:latin typeface="Cambria Math" panose="02040503050406030204" pitchFamily="18" charset="0"/>
+                              </a:rPr>
+                              <m:t>𝜈</m:t>
+                            </m:r>
+                            <m:r>
+                              <a:rPr lang="en-US" b="0" i="1" dirty="0" smtClean="0">
+                                <a:latin typeface="Cambria Math" panose="02040503050406030204" pitchFamily="18" charset="0"/>
+                              </a:rPr>
+                              <m:t>, </m:t>
+                            </m:r>
+                            <m:r>
+                              <a:rPr lang="en-US" b="0" i="1" dirty="0" smtClean="0">
+                                <a:latin typeface="Cambria Math" panose="02040503050406030204" pitchFamily="18" charset="0"/>
+                              </a:rPr>
+                              <m:t>𝑇</m:t>
+                            </m:r>
+                          </m:e>
+                        </m:d>
+                        <m:r>
+                          <a:rPr lang="en-US" b="0" i="1" dirty="0" smtClean="0">
+                            <a:latin typeface="Cambria Math" panose="02040503050406030204" pitchFamily="18" charset="0"/>
+                          </a:rPr>
+                          <m:t>𝐵</m:t>
+                        </m:r>
+                        <m:d>
+                          <m:dPr>
+                            <m:ctrlPr>
+                              <a:rPr lang="en-US" b="0" i="1" dirty="0" smtClean="0">
+                                <a:latin typeface="Cambria Math" panose="02040503050406030204" pitchFamily="18" charset="0"/>
+                              </a:rPr>
+                            </m:ctrlPr>
+                          </m:dPr>
+                          <m:e>
+                            <m:r>
+                              <a:rPr lang="en-US" b="0" i="1" dirty="0" smtClean="0">
+                                <a:latin typeface="Cambria Math" panose="02040503050406030204" pitchFamily="18" charset="0"/>
+                              </a:rPr>
+                              <m:t>𝜈</m:t>
+                            </m:r>
+                            <m:r>
+                              <a:rPr lang="en-US" b="0" i="1" dirty="0" smtClean="0">
+                                <a:latin typeface="Cambria Math" panose="02040503050406030204" pitchFamily="18" charset="0"/>
+                              </a:rPr>
+                              <m:t>, </m:t>
+                            </m:r>
+                            <m:r>
+                              <a:rPr lang="en-US" b="0" i="1" dirty="0" smtClean="0">
+                                <a:latin typeface="Cambria Math" panose="02040503050406030204" pitchFamily="18" charset="0"/>
+                              </a:rPr>
+                              <m:t>𝑇</m:t>
+                            </m:r>
+                          </m:e>
+                        </m:d>
+                        <m:r>
+                          <a:rPr lang="en-US" b="0" i="1" dirty="0" smtClean="0">
+                            <a:latin typeface="Cambria Math" panose="02040503050406030204" pitchFamily="18" charset="0"/>
+                          </a:rPr>
+                          <m:t>+</m:t>
+                        </m:r>
+                        <m:f>
+                          <m:fPr>
+                            <m:ctrlPr>
+                              <a:rPr lang="en-US" b="0" i="1" dirty="0" smtClean="0">
+                                <a:latin typeface="Cambria Math" panose="02040503050406030204" pitchFamily="18" charset="0"/>
+                              </a:rPr>
+                            </m:ctrlPr>
+                          </m:fPr>
+                          <m:num>
+                            <m:r>
+                              <a:rPr lang="en-US" b="0" i="1" dirty="0" smtClean="0">
+                                <a:latin typeface="Cambria Math" panose="02040503050406030204" pitchFamily="18" charset="0"/>
+                              </a:rPr>
+                              <m:t>𝑄</m:t>
+                            </m:r>
+                          </m:num>
+                          <m:den>
+                            <m:r>
+                              <a:rPr lang="en-US" b="0" i="1" dirty="0" smtClean="0">
+                                <a:latin typeface="Cambria Math" panose="02040503050406030204" pitchFamily="18" charset="0"/>
+                              </a:rPr>
+                              <m:t>2</m:t>
+                            </m:r>
+                          </m:den>
+                        </m:f>
+                        <m:d>
+                          <m:dPr>
+                            <m:ctrlPr>
+                              <a:rPr lang="en-US" b="0" i="1" dirty="0" smtClean="0">
+                                <a:latin typeface="Cambria Math" panose="02040503050406030204" pitchFamily="18" charset="0"/>
+                              </a:rPr>
+                            </m:ctrlPr>
+                          </m:dPr>
+                          <m:e>
+                            <m:acc>
+                              <m:accPr>
+                                <m:chr m:val="⃗"/>
+                                <m:ctrlPr>
+                                  <a:rPr lang="en-US" b="0" i="1" dirty="0" smtClean="0">
+                                    <a:latin typeface="Cambria Math" panose="02040503050406030204" pitchFamily="18" charset="0"/>
+                                  </a:rPr>
+                                </m:ctrlPr>
+                              </m:accPr>
+                              <m:e>
+                                <m:r>
+                                  <a:rPr lang="en-US" b="0" i="1" dirty="0" smtClean="0">
+                                    <a:latin typeface="Cambria Math" panose="02040503050406030204" pitchFamily="18" charset="0"/>
+                                  </a:rPr>
+                                  <m:t>𝑟</m:t>
+                                </m:r>
+                              </m:e>
+                            </m:acc>
+                            <m:r>
+                              <a:rPr lang="en-US" b="0" i="1" dirty="0" smtClean="0">
+                                <a:latin typeface="Cambria Math" panose="02040503050406030204" pitchFamily="18" charset="0"/>
+                              </a:rPr>
+                              <m:t>,</m:t>
+                            </m:r>
+                            <m:r>
+                              <a:rPr lang="en-US" b="0" i="1" dirty="0" smtClean="0">
+                                <a:latin typeface="Cambria Math" panose="02040503050406030204" pitchFamily="18" charset="0"/>
+                              </a:rPr>
+                              <m:t>𝜈</m:t>
+                            </m:r>
+                            <m:r>
+                              <a:rPr lang="en-US" b="0" i="1" dirty="0" smtClean="0">
+                                <a:latin typeface="Cambria Math" panose="02040503050406030204" pitchFamily="18" charset="0"/>
+                              </a:rPr>
+                              <m:t>,</m:t>
+                            </m:r>
+                            <m:r>
+                              <a:rPr lang="en-US" b="0" i="1" dirty="0" smtClean="0">
+                                <a:latin typeface="Cambria Math" panose="02040503050406030204" pitchFamily="18" charset="0"/>
+                              </a:rPr>
+                              <m:t>𝑡</m:t>
+                            </m:r>
+                          </m:e>
+                        </m:d>
+                        <m:r>
+                          <a:rPr lang="en-US" b="0" i="1" dirty="0" smtClean="0">
+                            <a:latin typeface="Cambria Math" panose="02040503050406030204" pitchFamily="18" charset="0"/>
+                          </a:rPr>
+                          <m:t> #</m:t>
+                        </m:r>
+                      </m:e>
+                    </m:eqArr>
+                  </m:oMath>
+                </a14:m>
+                <a:endParaRPr lang="en-US" b="0" i="1" dirty="0">
+                  <a:latin typeface="Cambria Math" panose="02040503050406030204" pitchFamily="18" charset="0"/>
+                </a:endParaRPr>
+              </a:p>
+              <a:p>
+                <a:pPr lvl="2"/>
+                <a14:m>
+                  <m:oMath xmlns:m="http://schemas.openxmlformats.org/officeDocument/2006/math">
+                    <m:r>
+                      <a:rPr lang="en-US" b="0" i="1" dirty="0" smtClean="0">
+                        <a:latin typeface="Cambria Math" panose="02040503050406030204" pitchFamily="18" charset="0"/>
+                      </a:rPr>
+                      <m:t> </m:t>
+                    </m:r>
+                    <m:sSub>
+                      <m:sSubPr>
+                        <m:ctrlPr>
+                          <a:rPr lang="en-US" b="0" i="1" dirty="0" smtClean="0">
+                            <a:latin typeface="Cambria Math" panose="02040503050406030204" pitchFamily="18" charset="0"/>
+                          </a:rPr>
+                        </m:ctrlPr>
+                      </m:sSubPr>
+                      <m:e>
+                        <m:r>
+                          <a:rPr lang="en-US" b="0" i="1" dirty="0" smtClean="0">
+                            <a:latin typeface="Cambria Math" panose="02040503050406030204" pitchFamily="18" charset="0"/>
+                          </a:rPr>
+                          <m:t>𝑐</m:t>
+                        </m:r>
+                      </m:e>
+                      <m:sub>
+                        <m:r>
+                          <a:rPr lang="en-US" b="0" i="1" dirty="0" smtClean="0">
+                            <a:latin typeface="Cambria Math" panose="02040503050406030204" pitchFamily="18" charset="0"/>
+                          </a:rPr>
+                          <m:t>𝑣</m:t>
+                        </m:r>
+                      </m:sub>
+                    </m:sSub>
+                    <m:d>
+                      <m:dPr>
+                        <m:ctrlPr>
+                          <a:rPr lang="en-US" b="0" i="1" dirty="0" smtClean="0">
+                            <a:latin typeface="Cambria Math" panose="02040503050406030204" pitchFamily="18" charset="0"/>
+                          </a:rPr>
+                        </m:ctrlPr>
+                      </m:dPr>
+                      <m:e>
+                        <m:acc>
+                          <m:accPr>
+                            <m:chr m:val="⃗"/>
+                            <m:ctrlPr>
+                              <a:rPr lang="en-US" b="0" i="1" dirty="0" smtClean="0">
+                                <a:latin typeface="Cambria Math" panose="02040503050406030204" pitchFamily="18" charset="0"/>
+                              </a:rPr>
+                            </m:ctrlPr>
+                          </m:accPr>
+                          <m:e>
+                            <m:r>
+                              <a:rPr lang="en-US" b="0" i="1" dirty="0" smtClean="0">
+                                <a:latin typeface="Cambria Math" panose="02040503050406030204" pitchFamily="18" charset="0"/>
+                              </a:rPr>
+                              <m:t>𝑟</m:t>
+                            </m:r>
+                          </m:e>
+                        </m:acc>
+                        <m:r>
+                          <a:rPr lang="en-US" b="0" i="1" dirty="0" smtClean="0">
+                            <a:latin typeface="Cambria Math" panose="02040503050406030204" pitchFamily="18" charset="0"/>
+                          </a:rPr>
+                          <m:t>,</m:t>
+                        </m:r>
+                        <m:r>
+                          <a:rPr lang="en-US" b="0" i="1" dirty="0" smtClean="0">
+                            <a:latin typeface="Cambria Math" panose="02040503050406030204" pitchFamily="18" charset="0"/>
+                          </a:rPr>
+                          <m:t>𝑇</m:t>
+                        </m:r>
+                      </m:e>
+                    </m:d>
+                    <m:f>
+                      <m:fPr>
+                        <m:ctrlPr>
+                          <a:rPr lang="en-US" b="0" i="1" dirty="0" smtClean="0">
+                            <a:latin typeface="Cambria Math" panose="02040503050406030204" pitchFamily="18" charset="0"/>
+                          </a:rPr>
+                        </m:ctrlPr>
+                      </m:fPr>
+                      <m:num>
+                        <m:r>
+                          <a:rPr lang="en-US" b="0" i="1" dirty="0" smtClean="0">
+                            <a:latin typeface="Cambria Math" panose="02040503050406030204" pitchFamily="18" charset="0"/>
+                          </a:rPr>
+                          <m:t>𝜕</m:t>
+                        </m:r>
+                        <m:r>
+                          <a:rPr lang="en-US" b="0" i="1" dirty="0" smtClean="0">
+                            <a:latin typeface="Cambria Math" panose="02040503050406030204" pitchFamily="18" charset="0"/>
+                          </a:rPr>
+                          <m:t>𝑇</m:t>
+                        </m:r>
+                      </m:num>
+                      <m:den>
+                        <m:r>
+                          <a:rPr lang="en-US" b="0" i="1" dirty="0" smtClean="0">
+                            <a:latin typeface="Cambria Math" panose="02040503050406030204" pitchFamily="18" charset="0"/>
+                          </a:rPr>
+                          <m:t>𝜕</m:t>
+                        </m:r>
+                        <m:r>
+                          <a:rPr lang="en-US" b="0" i="1" dirty="0" smtClean="0">
+                            <a:latin typeface="Cambria Math" panose="02040503050406030204" pitchFamily="18" charset="0"/>
+                          </a:rPr>
+                          <m:t>𝑡</m:t>
+                        </m:r>
+                      </m:den>
+                    </m:f>
+                    <m:d>
+                      <m:dPr>
+                        <m:ctrlPr>
+                          <a:rPr lang="en-US" b="0" i="1" dirty="0" smtClean="0">
+                            <a:latin typeface="Cambria Math" panose="02040503050406030204" pitchFamily="18" charset="0"/>
+                          </a:rPr>
+                        </m:ctrlPr>
+                      </m:dPr>
+                      <m:e>
+                        <m:acc>
+                          <m:accPr>
+                            <m:chr m:val="⃗"/>
+                            <m:ctrlPr>
+                              <a:rPr lang="en-US" b="0" i="1" dirty="0" smtClean="0">
+                                <a:latin typeface="Cambria Math" panose="02040503050406030204" pitchFamily="18" charset="0"/>
+                              </a:rPr>
+                            </m:ctrlPr>
+                          </m:accPr>
+                          <m:e>
+                            <m:r>
+                              <a:rPr lang="en-US" b="0" i="1" dirty="0" smtClean="0">
+                                <a:latin typeface="Cambria Math" panose="02040503050406030204" pitchFamily="18" charset="0"/>
+                              </a:rPr>
+                              <m:t>𝑟</m:t>
+                            </m:r>
+                          </m:e>
+                        </m:acc>
+                        <m:r>
+                          <a:rPr lang="en-US" b="0" i="1" dirty="0" smtClean="0">
+                            <a:latin typeface="Cambria Math" panose="02040503050406030204" pitchFamily="18" charset="0"/>
+                          </a:rPr>
+                          <m:t>,</m:t>
+                        </m:r>
+                        <m:r>
+                          <a:rPr lang="en-US" b="0" i="1" dirty="0" smtClean="0">
+                            <a:latin typeface="Cambria Math" panose="02040503050406030204" pitchFamily="18" charset="0"/>
+                          </a:rPr>
+                          <m:t>𝑡</m:t>
+                        </m:r>
+                      </m:e>
+                    </m:d>
+                    <m:r>
+                      <a:rPr lang="en-US" b="0" i="1" dirty="0" smtClean="0">
+                        <a:latin typeface="Cambria Math" panose="02040503050406030204" pitchFamily="18" charset="0"/>
+                      </a:rPr>
+                      <m:t>=</m:t>
+                    </m:r>
+                    <m:nary>
+                      <m:naryPr>
+                        <m:ctrlPr>
+                          <a:rPr lang="en-US" b="0" i="1" dirty="0" smtClean="0">
+                            <a:latin typeface="Cambria Math" panose="02040503050406030204" pitchFamily="18" charset="0"/>
+                          </a:rPr>
+                        </m:ctrlPr>
+                      </m:naryPr>
+                      <m:sub>
+                        <m:r>
+                          <m:rPr>
+                            <m:brk m:alnAt="23"/>
+                          </m:rPr>
+                          <a:rPr lang="en-US" b="0" i="1" dirty="0" smtClean="0">
+                            <a:latin typeface="Cambria Math" panose="02040503050406030204" pitchFamily="18" charset="0"/>
+                          </a:rPr>
+                          <m:t>0</m:t>
+                        </m:r>
+                      </m:sub>
+                      <m:sup>
+                        <m:r>
+                          <a:rPr lang="en-US" b="0" i="1" dirty="0" smtClean="0">
+                            <a:latin typeface="Cambria Math" panose="02040503050406030204" pitchFamily="18" charset="0"/>
+                            <a:ea typeface="Cambria Math" panose="02040503050406030204" pitchFamily="18" charset="0"/>
+                          </a:rPr>
+                          <m:t>∞</m:t>
+                        </m:r>
+                      </m:sup>
+                      <m:e>
+                        <m:nary>
+                          <m:naryPr>
+                            <m:ctrlPr>
+                              <a:rPr lang="en-US" b="0" i="1" dirty="0" smtClean="0">
+                                <a:latin typeface="Cambria Math" panose="02040503050406030204" pitchFamily="18" charset="0"/>
+                              </a:rPr>
+                            </m:ctrlPr>
+                          </m:naryPr>
+                          <m:sub>
+                            <m:r>
+                              <m:rPr>
+                                <m:brk m:alnAt="23"/>
+                              </m:rPr>
+                              <a:rPr lang="en-US" b="0" i="1" dirty="0" smtClean="0">
+                                <a:latin typeface="Cambria Math" panose="02040503050406030204" pitchFamily="18" charset="0"/>
+                              </a:rPr>
+                              <m:t>−1</m:t>
+                            </m:r>
+                          </m:sub>
+                          <m:sup>
+                            <m:r>
+                              <a:rPr lang="en-US" b="0" i="1" dirty="0" smtClean="0">
+                                <a:latin typeface="Cambria Math" panose="02040503050406030204" pitchFamily="18" charset="0"/>
+                              </a:rPr>
+                              <m:t>1</m:t>
+                            </m:r>
+                          </m:sup>
+                          <m:e>
+                            <m:sSub>
+                              <m:sSubPr>
+                                <m:ctrlPr>
+                                  <a:rPr lang="en-US" b="0" i="1" dirty="0" smtClean="0">
+                                    <a:latin typeface="Cambria Math" panose="02040503050406030204" pitchFamily="18" charset="0"/>
+                                  </a:rPr>
+                                </m:ctrlPr>
+                              </m:sSubPr>
+                              <m:e>
+                                <m:r>
+                                  <a:rPr lang="en-US" b="0" i="1" dirty="0" smtClean="0">
+                                    <a:latin typeface="Cambria Math" panose="02040503050406030204" pitchFamily="18" charset="0"/>
+                                  </a:rPr>
+                                  <m:t>𝜎</m:t>
+                                </m:r>
+                              </m:e>
+                              <m:sub>
+                                <m:r>
+                                  <a:rPr lang="en-US" b="0" i="1" dirty="0" smtClean="0">
+                                    <a:latin typeface="Cambria Math" panose="02040503050406030204" pitchFamily="18" charset="0"/>
+                                  </a:rPr>
+                                  <m:t>𝑎</m:t>
+                                </m:r>
+                              </m:sub>
+                            </m:sSub>
+                            <m:d>
+                              <m:dPr>
+                                <m:ctrlPr>
+                                  <a:rPr lang="en-US" b="0" i="1" dirty="0" smtClean="0">
+                                    <a:latin typeface="Cambria Math" panose="02040503050406030204" pitchFamily="18" charset="0"/>
+                                  </a:rPr>
+                                </m:ctrlPr>
+                              </m:dPr>
+                              <m:e>
+                                <m:acc>
+                                  <m:accPr>
+                                    <m:chr m:val="⃗"/>
+                                    <m:ctrlPr>
+                                      <a:rPr lang="en-US" b="0" i="1" dirty="0" smtClean="0">
+                                        <a:latin typeface="Cambria Math" panose="02040503050406030204" pitchFamily="18" charset="0"/>
+                                      </a:rPr>
+                                    </m:ctrlPr>
+                                  </m:accPr>
+                                  <m:e>
+                                    <m:r>
+                                      <a:rPr lang="en-US" b="0" i="1" dirty="0" smtClean="0">
+                                        <a:latin typeface="Cambria Math" panose="02040503050406030204" pitchFamily="18" charset="0"/>
+                                      </a:rPr>
+                                      <m:t>𝑟</m:t>
+                                    </m:r>
+                                  </m:e>
+                                </m:acc>
+                                <m:r>
+                                  <a:rPr lang="en-US" b="0" i="1" dirty="0" smtClean="0">
+                                    <a:latin typeface="Cambria Math" panose="02040503050406030204" pitchFamily="18" charset="0"/>
+                                  </a:rPr>
+                                  <m:t>,</m:t>
+                                </m:r>
+                                <m:sSup>
+                                  <m:sSupPr>
+                                    <m:ctrlPr>
+                                      <a:rPr lang="en-US" b="0" i="1" dirty="0" smtClean="0">
+                                        <a:latin typeface="Cambria Math" panose="02040503050406030204" pitchFamily="18" charset="0"/>
+                                      </a:rPr>
+                                    </m:ctrlPr>
+                                  </m:sSupPr>
+                                  <m:e>
+                                    <m:r>
+                                      <a:rPr lang="en-US" b="0" i="1" dirty="0" smtClean="0">
+                                        <a:latin typeface="Cambria Math" panose="02040503050406030204" pitchFamily="18" charset="0"/>
+                                      </a:rPr>
+                                      <m:t>𝜈</m:t>
+                                    </m:r>
+                                  </m:e>
+                                  <m:sup>
+                                    <m:r>
+                                      <a:rPr lang="en-US" b="0" i="1" dirty="0" smtClean="0">
+                                        <a:latin typeface="Cambria Math" panose="02040503050406030204" pitchFamily="18" charset="0"/>
+                                      </a:rPr>
+                                      <m:t>′</m:t>
+                                    </m:r>
+                                  </m:sup>
+                                </m:sSup>
+                                <m:r>
+                                  <a:rPr lang="en-US" b="0" i="1" dirty="0" smtClean="0">
+                                    <a:latin typeface="Cambria Math" panose="02040503050406030204" pitchFamily="18" charset="0"/>
+                                  </a:rPr>
+                                  <m:t>,</m:t>
+                                </m:r>
+                                <m:r>
+                                  <a:rPr lang="en-US" b="0" i="1" dirty="0" smtClean="0">
+                                    <a:latin typeface="Cambria Math" panose="02040503050406030204" pitchFamily="18" charset="0"/>
+                                  </a:rPr>
+                                  <m:t>𝑇</m:t>
+                                </m:r>
+                              </m:e>
+                            </m:d>
+                            <m:d>
+                              <m:dPr>
+                                <m:begChr m:val="["/>
+                                <m:endChr m:val="]"/>
+                                <m:ctrlPr>
+                                  <a:rPr lang="en-US" b="0" i="1" dirty="0" smtClean="0">
+                                    <a:latin typeface="Cambria Math" panose="02040503050406030204" pitchFamily="18" charset="0"/>
+                                  </a:rPr>
+                                </m:ctrlPr>
+                              </m:dPr>
+                              <m:e>
+                                <m:r>
+                                  <a:rPr lang="en-US" b="0" i="1" dirty="0" smtClean="0">
+                                    <a:latin typeface="Cambria Math" panose="02040503050406030204" pitchFamily="18" charset="0"/>
+                                  </a:rPr>
+                                  <m:t>𝐼</m:t>
+                                </m:r>
+                                <m:d>
+                                  <m:dPr>
+                                    <m:ctrlPr>
+                                      <a:rPr lang="en-US" b="0" i="1" dirty="0" smtClean="0">
+                                        <a:latin typeface="Cambria Math" panose="02040503050406030204" pitchFamily="18" charset="0"/>
+                                      </a:rPr>
+                                    </m:ctrlPr>
+                                  </m:dPr>
+                                  <m:e>
+                                    <m:acc>
+                                      <m:accPr>
+                                        <m:chr m:val="⃗"/>
+                                        <m:ctrlPr>
+                                          <a:rPr lang="en-US" b="0" i="1" dirty="0" smtClean="0">
+                                            <a:latin typeface="Cambria Math" panose="02040503050406030204" pitchFamily="18" charset="0"/>
+                                          </a:rPr>
+                                        </m:ctrlPr>
+                                      </m:accPr>
+                                      <m:e>
+                                        <m:r>
+                                          <a:rPr lang="en-US" b="0" i="1" dirty="0" smtClean="0">
+                                            <a:latin typeface="Cambria Math" panose="02040503050406030204" pitchFamily="18" charset="0"/>
+                                          </a:rPr>
+                                          <m:t>𝑟</m:t>
+                                        </m:r>
+                                      </m:e>
+                                    </m:acc>
+                                    <m:r>
+                                      <a:rPr lang="en-US" b="0" i="1" dirty="0" smtClean="0">
+                                        <a:latin typeface="Cambria Math" panose="02040503050406030204" pitchFamily="18" charset="0"/>
+                                      </a:rPr>
+                                      <m:t>,</m:t>
+                                    </m:r>
+                                    <m:acc>
+                                      <m:accPr>
+                                        <m:chr m:val="⃗"/>
+                                        <m:ctrlPr>
+                                          <a:rPr lang="en-US" b="0" i="1" dirty="0" smtClean="0">
+                                            <a:latin typeface="Cambria Math" panose="02040503050406030204" pitchFamily="18" charset="0"/>
+                                          </a:rPr>
+                                        </m:ctrlPr>
+                                      </m:accPr>
+                                      <m:e>
+                                        <m:sSup>
+                                          <m:sSupPr>
+                                            <m:ctrlPr>
+                                              <a:rPr lang="en-US" b="0" i="1" dirty="0" smtClean="0">
+                                                <a:latin typeface="Cambria Math" panose="02040503050406030204" pitchFamily="18" charset="0"/>
+                                              </a:rPr>
+                                            </m:ctrlPr>
+                                          </m:sSupPr>
+                                          <m:e>
+                                            <m:r>
+                                              <m:rPr>
+                                                <m:sty m:val="p"/>
+                                              </m:rPr>
+                                              <a:rPr lang="en-US" b="0" i="0" dirty="0" smtClean="0">
+                                                <a:latin typeface="Cambria Math" panose="02040503050406030204" pitchFamily="18" charset="0"/>
+                                              </a:rPr>
+                                              <m:t>Ω</m:t>
+                                            </m:r>
+                                          </m:e>
+                                          <m:sup>
+                                            <m:r>
+                                              <a:rPr lang="en-US" b="0" i="1" dirty="0" smtClean="0">
+                                                <a:latin typeface="Cambria Math" panose="02040503050406030204" pitchFamily="18" charset="0"/>
+                                              </a:rPr>
+                                              <m:t>′</m:t>
+                                            </m:r>
+                                          </m:sup>
+                                        </m:sSup>
+                                      </m:e>
+                                    </m:acc>
+                                    <m:r>
+                                      <a:rPr lang="en-US" b="0" i="1" dirty="0" smtClean="0">
+                                        <a:latin typeface="Cambria Math" panose="02040503050406030204" pitchFamily="18" charset="0"/>
+                                      </a:rPr>
+                                      <m:t>,</m:t>
+                                    </m:r>
+                                    <m:sSup>
+                                      <m:sSupPr>
+                                        <m:ctrlPr>
+                                          <a:rPr lang="en-US" b="0" i="1" dirty="0" smtClean="0">
+                                            <a:latin typeface="Cambria Math" panose="02040503050406030204" pitchFamily="18" charset="0"/>
+                                          </a:rPr>
+                                        </m:ctrlPr>
+                                      </m:sSupPr>
+                                      <m:e>
+                                        <m:r>
+                                          <a:rPr lang="en-US" b="0" i="1" dirty="0" smtClean="0">
+                                            <a:latin typeface="Cambria Math" panose="02040503050406030204" pitchFamily="18" charset="0"/>
+                                          </a:rPr>
+                                          <m:t>𝜈</m:t>
+                                        </m:r>
+                                      </m:e>
+                                      <m:sup>
+                                        <m:r>
+                                          <a:rPr lang="en-US" b="0" i="1" dirty="0" smtClean="0">
+                                            <a:latin typeface="Cambria Math" panose="02040503050406030204" pitchFamily="18" charset="0"/>
+                                          </a:rPr>
+                                          <m:t>′</m:t>
+                                        </m:r>
+                                      </m:sup>
+                                    </m:sSup>
+                                    <m:r>
+                                      <a:rPr lang="en-US" b="0" i="1" dirty="0" smtClean="0">
+                                        <a:latin typeface="Cambria Math" panose="02040503050406030204" pitchFamily="18" charset="0"/>
+                                      </a:rPr>
+                                      <m:t>,</m:t>
+                                    </m:r>
+                                    <m:r>
+                                      <a:rPr lang="en-US" b="0" i="1" dirty="0" smtClean="0">
+                                        <a:latin typeface="Cambria Math" panose="02040503050406030204" pitchFamily="18" charset="0"/>
+                                      </a:rPr>
+                                      <m:t>𝑡</m:t>
+                                    </m:r>
+                                  </m:e>
+                                </m:d>
+                                <m:r>
+                                  <a:rPr lang="en-US" b="0" i="1" dirty="0" smtClean="0">
+                                    <a:latin typeface="Cambria Math" panose="02040503050406030204" pitchFamily="18" charset="0"/>
+                                  </a:rPr>
+                                  <m:t>−2</m:t>
+                                </m:r>
+                                <m:r>
+                                  <a:rPr lang="en-US" b="0" i="1" dirty="0" smtClean="0">
+                                    <a:latin typeface="Cambria Math" panose="02040503050406030204" pitchFamily="18" charset="0"/>
+                                  </a:rPr>
+                                  <m:t>𝜋</m:t>
+                                </m:r>
+                                <m:r>
+                                  <a:rPr lang="en-US" b="0" i="1" dirty="0" smtClean="0">
+                                    <a:latin typeface="Cambria Math" panose="02040503050406030204" pitchFamily="18" charset="0"/>
+                                  </a:rPr>
+                                  <m:t>𝐵</m:t>
+                                </m:r>
+                                <m:d>
+                                  <m:dPr>
+                                    <m:ctrlPr>
+                                      <a:rPr lang="en-US" b="0" i="1" dirty="0" smtClean="0">
+                                        <a:latin typeface="Cambria Math" panose="02040503050406030204" pitchFamily="18" charset="0"/>
+                                      </a:rPr>
+                                    </m:ctrlPr>
+                                  </m:dPr>
+                                  <m:e>
+                                    <m:sSup>
+                                      <m:sSupPr>
+                                        <m:ctrlPr>
+                                          <a:rPr lang="en-US" b="0" i="1" dirty="0" smtClean="0">
+                                            <a:latin typeface="Cambria Math" panose="02040503050406030204" pitchFamily="18" charset="0"/>
+                                          </a:rPr>
+                                        </m:ctrlPr>
+                                      </m:sSupPr>
+                                      <m:e>
+                                        <m:r>
+                                          <a:rPr lang="en-US" b="0" i="1" dirty="0" smtClean="0">
+                                            <a:latin typeface="Cambria Math" panose="02040503050406030204" pitchFamily="18" charset="0"/>
+                                          </a:rPr>
+                                          <m:t>𝜈</m:t>
+                                        </m:r>
+                                      </m:e>
+                                      <m:sup>
+                                        <m:r>
+                                          <a:rPr lang="en-US" b="0" i="1" dirty="0" smtClean="0">
+                                            <a:latin typeface="Cambria Math" panose="02040503050406030204" pitchFamily="18" charset="0"/>
+                                          </a:rPr>
+                                          <m:t>′</m:t>
+                                        </m:r>
+                                      </m:sup>
+                                    </m:sSup>
+                                    <m:r>
+                                      <a:rPr lang="en-US" b="0" i="1" dirty="0" smtClean="0">
+                                        <a:latin typeface="Cambria Math" panose="02040503050406030204" pitchFamily="18" charset="0"/>
+                                      </a:rPr>
+                                      <m:t>,</m:t>
+                                    </m:r>
+                                    <m:r>
+                                      <a:rPr lang="en-US" b="0" i="1" dirty="0" smtClean="0">
+                                        <a:latin typeface="Cambria Math" panose="02040503050406030204" pitchFamily="18" charset="0"/>
+                                      </a:rPr>
+                                      <m:t>𝑇</m:t>
+                                    </m:r>
+                                  </m:e>
+                                </m:d>
+                              </m:e>
+                            </m:d>
+                            <m:r>
+                              <a:rPr lang="en-US" b="0" i="1" dirty="0" smtClean="0">
+                                <a:latin typeface="Cambria Math" panose="02040503050406030204" pitchFamily="18" charset="0"/>
+                              </a:rPr>
+                              <m:t>𝑑</m:t>
+                            </m:r>
+                            <m:acc>
+                              <m:accPr>
+                                <m:chr m:val="⃗"/>
+                                <m:ctrlPr>
+                                  <a:rPr lang="en-US" b="0" i="1" dirty="0" smtClean="0">
+                                    <a:latin typeface="Cambria Math" panose="02040503050406030204" pitchFamily="18" charset="0"/>
+                                  </a:rPr>
+                                </m:ctrlPr>
+                              </m:accPr>
+                              <m:e>
+                                <m:sSup>
+                                  <m:sSupPr>
+                                    <m:ctrlPr>
+                                      <a:rPr lang="en-US" b="0" i="1" dirty="0" smtClean="0">
+                                        <a:latin typeface="Cambria Math" panose="02040503050406030204" pitchFamily="18" charset="0"/>
+                                      </a:rPr>
+                                    </m:ctrlPr>
+                                  </m:sSupPr>
+                                  <m:e>
+                                    <m:r>
+                                      <m:rPr>
+                                        <m:sty m:val="p"/>
+                                      </m:rPr>
+                                      <a:rPr lang="en-US" b="0" i="0" dirty="0" smtClean="0">
+                                        <a:latin typeface="Cambria Math" panose="02040503050406030204" pitchFamily="18" charset="0"/>
+                                      </a:rPr>
+                                      <m:t>Ω</m:t>
+                                    </m:r>
+                                  </m:e>
+                                  <m:sup>
+                                    <m:r>
+                                      <a:rPr lang="en-US" b="0" i="1" dirty="0" smtClean="0">
+                                        <a:latin typeface="Cambria Math" panose="02040503050406030204" pitchFamily="18" charset="0"/>
+                                      </a:rPr>
+                                      <m:t>′</m:t>
+                                    </m:r>
+                                  </m:sup>
+                                </m:sSup>
+                              </m:e>
+                            </m:acc>
+                            <m:r>
+                              <a:rPr lang="en-US" b="0" i="1" dirty="0" smtClean="0">
+                                <a:latin typeface="Cambria Math" panose="02040503050406030204" pitchFamily="18" charset="0"/>
+                              </a:rPr>
+                              <m:t> </m:t>
+                            </m:r>
+                            <m:r>
+                              <a:rPr lang="en-US" b="0" i="1" dirty="0" smtClean="0">
+                                <a:latin typeface="Cambria Math" panose="02040503050406030204" pitchFamily="18" charset="0"/>
+                              </a:rPr>
+                              <m:t>𝑑</m:t>
+                            </m:r>
+                            <m:r>
+                              <a:rPr lang="en-US" b="0" i="1" dirty="0" smtClean="0">
+                                <a:latin typeface="Cambria Math" panose="02040503050406030204" pitchFamily="18" charset="0"/>
+                              </a:rPr>
+                              <m:t>𝜈</m:t>
+                            </m:r>
+                            <m:r>
+                              <a:rPr lang="en-US" b="0" i="1" dirty="0" smtClean="0">
+                                <a:latin typeface="Cambria Math" panose="02040503050406030204" pitchFamily="18" charset="0"/>
+                              </a:rPr>
+                              <m:t>′</m:t>
+                            </m:r>
+                          </m:e>
+                        </m:nary>
+                      </m:e>
+                    </m:nary>
+                  </m:oMath>
+                </a14:m>
+                <a:endParaRPr lang="en-US" b="0" dirty="0"/>
+              </a:p>
+              <a:p>
+                <a:pPr lvl="2"/>
+                <a:endParaRPr lang="en-US" sz="1000" b="0" dirty="0"/>
+              </a:p>
+              <a:p>
+                <a:pPr marL="0" indent="0">
+                  <a:buNone/>
+                </a:pPr>
+                <a:r>
+                  <a:rPr lang="en-US" dirty="0"/>
+                  <a:t>Implicit Monte Carlo (IMC)</a:t>
+                </a:r>
+              </a:p>
+              <a:p>
+                <a:pPr lvl="2"/>
+                <a:r>
+                  <a:rPr lang="en-US" b="0" dirty="0"/>
+                  <a:t>Developed by Fleck and Cummings in 1971 [1] to solve the TRT equations</a:t>
+                </a:r>
+              </a:p>
+              <a:p>
+                <a:pPr lvl="2"/>
+                <a:r>
+                  <a:rPr lang="en-US" dirty="0"/>
+                  <a:t>Uses ‘effective scattering’ events to model absorption/re-emission</a:t>
+                </a:r>
+              </a:p>
+              <a:p>
+                <a:pPr lvl="2"/>
+                <a:r>
+                  <a:rPr lang="en-US" b="0" dirty="0"/>
+                  <a:t>Two major approximations:</a:t>
+                </a:r>
+              </a:p>
+              <a:p>
+                <a:pPr marL="342900" lvl="2" indent="0">
+                  <a:buNone/>
+                </a:pPr>
+                <a:r>
+                  <a:rPr lang="en-US" dirty="0"/>
+                  <a:t>		1. Semi-implicit discretization of time</a:t>
+                </a:r>
+              </a:p>
+              <a:p>
+                <a:pPr marL="342900" lvl="2" indent="0">
+                  <a:buNone/>
+                </a:pPr>
+                <a:r>
+                  <a:rPr lang="en-US" b="0" dirty="0"/>
+                  <a:t>		2. Linear</a:t>
+                </a:r>
+                <a:r>
+                  <a:rPr lang="en-US" dirty="0"/>
+                  <a:t>izes the TRT equations – not fully physical</a:t>
+                </a:r>
+                <a:endParaRPr lang="en-US" b="0" dirty="0"/>
+              </a:p>
+            </p:txBody>
+          </p:sp>
+        </mc:Choice>
+        <mc:Fallback>
+          <p:sp>
+            <p:nvSpPr>
+              <p:cNvPr id="5" name="Content Placeholder 4">
+                <a:extLst>
+                  <a:ext uri="{FF2B5EF4-FFF2-40B4-BE49-F238E27FC236}">
+                    <a16:creationId xmlns:a16="http://schemas.microsoft.com/office/drawing/2014/main" id="{5B61F8F5-7260-8343-A766-8B64C80CF172}"/>
+                  </a:ext>
+                </a:extLst>
+              </p:cNvPr>
+              <p:cNvSpPr>
+                <a:spLocks noGrp="1" noRot="1" noChangeAspect="1" noMove="1" noResize="1" noEditPoints="1" noAdjustHandles="1" noChangeArrowheads="1" noChangeShapeType="1" noTextEdit="1"/>
+              </p:cNvSpPr>
+              <p:nvPr>
+                <p:ph idx="1"/>
+              </p:nvPr>
+            </p:nvSpPr>
+            <p:spPr>
+              <a:xfrm>
+                <a:off x="457200" y="943030"/>
+                <a:ext cx="8229600" cy="4328440"/>
+              </a:xfrm>
+              <a:blipFill>
+                <a:blip r:embed="rId2"/>
+                <a:stretch>
+                  <a:fillRect l="-772" t="-585"/>
+                </a:stretch>
+              </a:blipFill>
+            </p:spPr>
+            <p:txBody>
+              <a:bodyPr/>
+              <a:lstStyle/>
+              <a:p>
+                <a:r>
+                  <a:rPr lang="en-US">
+                    <a:noFill/>
+                  </a:rPr>
+                  <a:t> </a:t>
+                </a:r>
+              </a:p>
+            </p:txBody>
+          </p:sp>
+        </mc:Fallback>
+      </mc:AlternateContent>
       <p:sp>
         <p:nvSpPr>
           <p:cNvPr id="6" name="TextBox 5">
@@ -5736,7 +7425,7 @@
           <a:p>
             <a:r>
               <a:rPr lang="en-US" dirty="0"/>
-              <a:t>Description of Research &amp; Objective</a:t>
+              <a:t>Introduction &amp; Theory Cont.</a:t>
             </a:r>
           </a:p>
         </p:txBody>
@@ -5767,7 +7456,7 @@
               <a:t>8/6/19</a:t>
             </a:fld>
             <a:r>
-              <a:rPr lang="en-US"/>
+              <a:rPr lang="en-US" dirty="0"/>
               <a:t>   |   </a:t>
             </a:r>
             <a:fld id="{5D01E7E5-6465-7A46-A26D-BAABC2D34D38}" type="slidenum">
@@ -5807,35 +7496,704 @@
           </a:p>
         </p:txBody>
       </p:sp>
+      <mc:AlternateContent xmlns:mc="http://schemas.openxmlformats.org/markup-compatibility/2006">
+        <mc:Choice xmlns:a14="http://schemas.microsoft.com/office/drawing/2010/main" Requires="a14">
+          <p:sp>
+            <p:nvSpPr>
+              <p:cNvPr id="5" name="Content Placeholder 4">
+                <a:extLst>
+                  <a:ext uri="{FF2B5EF4-FFF2-40B4-BE49-F238E27FC236}">
+                    <a16:creationId xmlns:a16="http://schemas.microsoft.com/office/drawing/2014/main" id="{5B61F8F5-7260-8343-A766-8B64C80CF172}"/>
+                  </a:ext>
+                </a:extLst>
+              </p:cNvPr>
+              <p:cNvSpPr>
+                <a:spLocks noGrp="1"/>
+              </p:cNvSpPr>
+              <p:nvPr>
+                <p:ph idx="1"/>
+              </p:nvPr>
+            </p:nvSpPr>
+            <p:spPr>
+              <a:xfrm>
+                <a:off x="159240" y="919584"/>
+                <a:ext cx="6139960" cy="4328440"/>
+              </a:xfrm>
+            </p:spPr>
+            <p:txBody>
+              <a:bodyPr/>
+              <a:lstStyle/>
+              <a:p>
+                <a:pPr marL="0" indent="0">
+                  <a:buNone/>
+                </a:pPr>
+                <a:r>
+                  <a:rPr lang="en-US" b="0" dirty="0"/>
+                  <a:t>Standard Variance Reduction Methods</a:t>
+                </a:r>
+              </a:p>
+              <a:p>
+                <a:pPr lvl="2"/>
+                <a:r>
+                  <a:rPr lang="en-US" sz="1500" dirty="0"/>
+                  <a:t>IMC is stochastic – there is inherent uncertainty in the solution</a:t>
+                </a:r>
+              </a:p>
+              <a:p>
+                <a:pPr lvl="2"/>
+                <a:r>
+                  <a:rPr lang="en-US" sz="1500" dirty="0">
+                    <a:cs typeface="Arial" panose="020B0604020202020204" pitchFamily="34" charset="0"/>
+                  </a:rPr>
+                  <a:t>Variance reduction methods are implemented to improve simulation efficiency while producing equivalent unbiased results (e.g. implicit capture, splitting, Russian roulette, weight windows, etc.) [2]</a:t>
+                </a:r>
+              </a:p>
+              <a:p>
+                <a:pPr lvl="2"/>
+                <a:endParaRPr lang="en-US" sz="800" dirty="0">
+                  <a:cs typeface="Arial" panose="020B0604020202020204" pitchFamily="34" charset="0"/>
+                </a:endParaRPr>
+              </a:p>
+              <a:p>
+                <a:pPr marL="0" indent="0">
+                  <a:buNone/>
+                </a:pPr>
+                <a:r>
+                  <a:rPr lang="en-US" dirty="0">
+                    <a:cs typeface="Arial" panose="020B0604020202020204" pitchFamily="34" charset="0"/>
+                  </a:rPr>
+                  <a:t>Next Event Estimators (NXTEVT)</a:t>
+                </a:r>
+              </a:p>
+              <a:p>
+                <a:pPr lvl="2"/>
+                <a:r>
+                  <a:rPr lang="en-US" sz="1500" b="0" dirty="0">
+                    <a:cs typeface="Arial" panose="020B0604020202020204" pitchFamily="34" charset="0"/>
+                  </a:rPr>
+                  <a:t>Effective for limited particle histories, and large mean free paths [3] – i.e. few scattering events and few transported particles</a:t>
+                </a:r>
+              </a:p>
+              <a:p>
+                <a:pPr lvl="2"/>
+                <a:r>
+                  <a:rPr lang="en-US" sz="1500" b="0" dirty="0">
+                    <a:cs typeface="Arial" panose="020B0604020202020204" pitchFamily="34" charset="0"/>
+                  </a:rPr>
+                  <a:t>M</a:t>
+                </a:r>
+                <a:r>
+                  <a:rPr lang="en-US" sz="1500" dirty="0">
+                    <a:cs typeface="Arial" panose="020B0604020202020204" pitchFamily="34" charset="0"/>
+                  </a:rPr>
+                  <a:t>ethod: ‘points’ particles toward region of interest and scores the tally accd. to</a:t>
+                </a:r>
+              </a:p>
+              <a:p>
+                <a:pPr marL="342900" lvl="2" indent="0">
+                  <a:buNone/>
+                </a:pPr>
+                <a14:m>
+                  <m:oMath xmlns:m="http://schemas.openxmlformats.org/officeDocument/2006/math">
+                    <m:r>
+                      <a:rPr lang="en-US" sz="1500" b="0" i="1" smtClean="0">
+                        <a:latin typeface="Cambria Math" panose="02040503050406030204" pitchFamily="18" charset="0"/>
+                        <a:cs typeface="Arial" panose="020B0604020202020204" pitchFamily="34" charset="0"/>
+                      </a:rPr>
+                      <m:t>𝜙</m:t>
+                    </m:r>
+                    <m:d>
+                      <m:dPr>
+                        <m:ctrlPr>
+                          <a:rPr lang="en-US" sz="1500" b="0" i="1" smtClean="0">
+                            <a:latin typeface="Cambria Math" panose="02040503050406030204" pitchFamily="18" charset="0"/>
+                            <a:cs typeface="Arial" panose="020B0604020202020204" pitchFamily="34" charset="0"/>
+                          </a:rPr>
+                        </m:ctrlPr>
+                      </m:dPr>
+                      <m:e>
+                        <m:r>
+                          <a:rPr lang="en-US" sz="1500" b="0" i="1" smtClean="0">
+                            <a:latin typeface="Cambria Math" panose="02040503050406030204" pitchFamily="18" charset="0"/>
+                            <a:cs typeface="Arial" panose="020B0604020202020204" pitchFamily="34" charset="0"/>
+                          </a:rPr>
+                          <m:t>𝜇</m:t>
+                        </m:r>
+                      </m:e>
+                    </m:d>
+                    <m:r>
+                      <a:rPr lang="en-US" sz="1500" b="0" i="1" smtClean="0">
+                        <a:latin typeface="Cambria Math" panose="02040503050406030204" pitchFamily="18" charset="0"/>
+                        <a:cs typeface="Arial" panose="020B0604020202020204" pitchFamily="34" charset="0"/>
+                      </a:rPr>
+                      <m:t>=</m:t>
+                    </m:r>
+                    <m:sSub>
+                      <m:sSubPr>
+                        <m:ctrlPr>
+                          <a:rPr lang="en-US" sz="1500" b="0" i="1" smtClean="0">
+                            <a:latin typeface="Cambria Math" panose="02040503050406030204" pitchFamily="18" charset="0"/>
+                            <a:cs typeface="Arial" panose="020B0604020202020204" pitchFamily="34" charset="0"/>
+                          </a:rPr>
+                        </m:ctrlPr>
+                      </m:sSubPr>
+                      <m:e>
+                        <m:r>
+                          <a:rPr lang="en-US" sz="1500" b="0" i="1" smtClean="0">
+                            <a:latin typeface="Cambria Math" panose="02040503050406030204" pitchFamily="18" charset="0"/>
+                            <a:cs typeface="Arial" panose="020B0604020202020204" pitchFamily="34" charset="0"/>
+                          </a:rPr>
+                          <m:t>𝑤</m:t>
+                        </m:r>
+                      </m:e>
+                      <m:sub>
+                        <m:r>
+                          <a:rPr lang="en-US" sz="1500" b="0" i="1" smtClean="0">
+                            <a:latin typeface="Cambria Math" panose="02040503050406030204" pitchFamily="18" charset="0"/>
+                            <a:cs typeface="Arial" panose="020B0604020202020204" pitchFamily="34" charset="0"/>
+                          </a:rPr>
+                          <m:t>0</m:t>
+                        </m:r>
+                      </m:sub>
+                    </m:sSub>
+                    <m:f>
+                      <m:fPr>
+                        <m:ctrlPr>
+                          <a:rPr lang="en-US" sz="1500" b="0" i="1" smtClean="0">
+                            <a:latin typeface="Cambria Math" panose="02040503050406030204" pitchFamily="18" charset="0"/>
+                            <a:cs typeface="Arial" panose="020B0604020202020204" pitchFamily="34" charset="0"/>
+                          </a:rPr>
+                        </m:ctrlPr>
+                      </m:fPr>
+                      <m:num>
+                        <m:sSup>
+                          <m:sSupPr>
+                            <m:ctrlPr>
+                              <a:rPr lang="en-US" sz="1500" b="0" i="1" smtClean="0">
+                                <a:latin typeface="Cambria Math" panose="02040503050406030204" pitchFamily="18" charset="0"/>
+                                <a:cs typeface="Arial" panose="020B0604020202020204" pitchFamily="34" charset="0"/>
+                              </a:rPr>
+                            </m:ctrlPr>
+                          </m:sSupPr>
+                          <m:e>
+                            <m:r>
+                              <a:rPr lang="en-US" sz="1500" b="0" i="1" smtClean="0">
+                                <a:latin typeface="Cambria Math" panose="02040503050406030204" pitchFamily="18" charset="0"/>
+                                <a:cs typeface="Arial" panose="020B0604020202020204" pitchFamily="34" charset="0"/>
+                              </a:rPr>
+                              <m:t>𝑒</m:t>
+                            </m:r>
+                          </m:e>
+                          <m:sup>
+                            <m:r>
+                              <a:rPr lang="en-US" sz="1500" b="0" i="1" smtClean="0">
+                                <a:latin typeface="Cambria Math" panose="02040503050406030204" pitchFamily="18" charset="0"/>
+                                <a:cs typeface="Arial" panose="020B0604020202020204" pitchFamily="34" charset="0"/>
+                              </a:rPr>
+                              <m:t>−</m:t>
+                            </m:r>
+                            <m:nary>
+                              <m:naryPr>
+                                <m:ctrlPr>
+                                  <a:rPr lang="en-US" sz="1500" b="0" i="1" smtClean="0">
+                                    <a:latin typeface="Cambria Math" panose="02040503050406030204" pitchFamily="18" charset="0"/>
+                                    <a:cs typeface="Arial" panose="020B0604020202020204" pitchFamily="34" charset="0"/>
+                                  </a:rPr>
+                                </m:ctrlPr>
+                              </m:naryPr>
+                              <m:sub>
+                                <m:acc>
+                                  <m:accPr>
+                                    <m:chr m:val="⃗"/>
+                                    <m:ctrlPr>
+                                      <a:rPr lang="en-US" sz="1500" b="0" i="1" smtClean="0">
+                                        <a:latin typeface="Cambria Math" panose="02040503050406030204" pitchFamily="18" charset="0"/>
+                                        <a:cs typeface="Arial" panose="020B0604020202020204" pitchFamily="34" charset="0"/>
+                                      </a:rPr>
+                                    </m:ctrlPr>
+                                  </m:accPr>
+                                  <m:e>
+                                    <m:r>
+                                      <m:rPr>
+                                        <m:brk m:alnAt="23"/>
+                                      </m:rPr>
+                                      <a:rPr lang="en-US" sz="1500" b="0" i="1" smtClean="0">
+                                        <a:latin typeface="Cambria Math" panose="02040503050406030204" pitchFamily="18" charset="0"/>
+                                        <a:cs typeface="Arial" panose="020B0604020202020204" pitchFamily="34" charset="0"/>
+                                      </a:rPr>
+                                      <m:t>𝑟</m:t>
+                                    </m:r>
+                                  </m:e>
+                                </m:acc>
+                              </m:sub>
+                              <m:sup>
+                                <m:acc>
+                                  <m:accPr>
+                                    <m:chr m:val="⃗"/>
+                                    <m:ctrlPr>
+                                      <a:rPr lang="en-US" sz="1500" b="0" i="1" smtClean="0">
+                                        <a:latin typeface="Cambria Math" panose="02040503050406030204" pitchFamily="18" charset="0"/>
+                                        <a:cs typeface="Arial" panose="020B0604020202020204" pitchFamily="34" charset="0"/>
+                                      </a:rPr>
+                                    </m:ctrlPr>
+                                  </m:accPr>
+                                  <m:e>
+                                    <m:sSup>
+                                      <m:sSupPr>
+                                        <m:ctrlPr>
+                                          <a:rPr lang="en-US" sz="1500" b="0" i="1" smtClean="0">
+                                            <a:latin typeface="Cambria Math" panose="02040503050406030204" pitchFamily="18" charset="0"/>
+                                            <a:cs typeface="Arial" panose="020B0604020202020204" pitchFamily="34" charset="0"/>
+                                          </a:rPr>
+                                        </m:ctrlPr>
+                                      </m:sSupPr>
+                                      <m:e>
+                                        <m:r>
+                                          <a:rPr lang="en-US" sz="1500" b="0" i="1" smtClean="0">
+                                            <a:latin typeface="Cambria Math" panose="02040503050406030204" pitchFamily="18" charset="0"/>
+                                            <a:cs typeface="Arial" panose="020B0604020202020204" pitchFamily="34" charset="0"/>
+                                          </a:rPr>
+                                          <m:t>𝑟</m:t>
+                                        </m:r>
+                                      </m:e>
+                                      <m:sup>
+                                        <m:r>
+                                          <a:rPr lang="en-US" sz="1500" b="0" i="1" smtClean="0">
+                                            <a:latin typeface="Cambria Math" panose="02040503050406030204" pitchFamily="18" charset="0"/>
+                                            <a:cs typeface="Arial" panose="020B0604020202020204" pitchFamily="34" charset="0"/>
+                                          </a:rPr>
+                                          <m:t>′</m:t>
+                                        </m:r>
+                                      </m:sup>
+                                    </m:sSup>
+                                  </m:e>
+                                </m:acc>
+                              </m:sup>
+                              <m:e>
+                                <m:sSub>
+                                  <m:sSubPr>
+                                    <m:ctrlPr>
+                                      <a:rPr lang="en-US" sz="1500" b="0" i="1" smtClean="0">
+                                        <a:latin typeface="Cambria Math" panose="02040503050406030204" pitchFamily="18" charset="0"/>
+                                        <a:cs typeface="Arial" panose="020B0604020202020204" pitchFamily="34" charset="0"/>
+                                      </a:rPr>
+                                    </m:ctrlPr>
+                                  </m:sSubPr>
+                                  <m:e>
+                                    <m:r>
+                                      <m:rPr>
+                                        <m:sty m:val="p"/>
+                                      </m:rPr>
+                                      <a:rPr lang="en-US" sz="1500" b="0" i="0" smtClean="0">
+                                        <a:latin typeface="Cambria Math" panose="02040503050406030204" pitchFamily="18" charset="0"/>
+                                        <a:cs typeface="Arial" panose="020B0604020202020204" pitchFamily="34" charset="0"/>
+                                      </a:rPr>
+                                      <m:t>Σ</m:t>
+                                    </m:r>
+                                  </m:e>
+                                  <m:sub>
+                                    <m:r>
+                                      <a:rPr lang="en-US" sz="1500" b="0" i="1" smtClean="0">
+                                        <a:latin typeface="Cambria Math" panose="02040503050406030204" pitchFamily="18" charset="0"/>
+                                        <a:cs typeface="Arial" panose="020B0604020202020204" pitchFamily="34" charset="0"/>
+                                      </a:rPr>
+                                      <m:t>𝑡</m:t>
+                                    </m:r>
+                                  </m:sub>
+                                </m:sSub>
+                                <m:d>
+                                  <m:dPr>
+                                    <m:ctrlPr>
+                                      <a:rPr lang="en-US" sz="1500" b="0" i="1" smtClean="0">
+                                        <a:latin typeface="Cambria Math" panose="02040503050406030204" pitchFamily="18" charset="0"/>
+                                        <a:cs typeface="Arial" panose="020B0604020202020204" pitchFamily="34" charset="0"/>
+                                      </a:rPr>
+                                    </m:ctrlPr>
+                                  </m:dPr>
+                                  <m:e>
+                                    <m:r>
+                                      <a:rPr lang="en-US" sz="1500" b="0" i="1" smtClean="0">
+                                        <a:latin typeface="Cambria Math" panose="02040503050406030204" pitchFamily="18" charset="0"/>
+                                        <a:cs typeface="Arial" panose="020B0604020202020204" pitchFamily="34" charset="0"/>
+                                      </a:rPr>
+                                      <m:t>𝑠</m:t>
+                                    </m:r>
+                                  </m:e>
+                                </m:d>
+                                <m:r>
+                                  <a:rPr lang="en-US" sz="1500" b="0" i="1" smtClean="0">
+                                    <a:latin typeface="Cambria Math" panose="02040503050406030204" pitchFamily="18" charset="0"/>
+                                    <a:cs typeface="Arial" panose="020B0604020202020204" pitchFamily="34" charset="0"/>
+                                  </a:rPr>
+                                  <m:t>𝑑𝑠</m:t>
+                                </m:r>
+                              </m:e>
+                            </m:nary>
+                          </m:sup>
+                        </m:sSup>
+                      </m:num>
+                      <m:den>
+                        <m:r>
+                          <a:rPr lang="en-US" sz="1500" b="0" i="1" smtClean="0">
+                            <a:latin typeface="Cambria Math" panose="02040503050406030204" pitchFamily="18" charset="0"/>
+                            <a:cs typeface="Arial" panose="020B0604020202020204" pitchFamily="34" charset="0"/>
+                          </a:rPr>
+                          <m:t>𝑆</m:t>
+                        </m:r>
+                        <m:r>
+                          <a:rPr lang="en-US" sz="1500" b="0" i="1" smtClean="0">
+                            <a:latin typeface="Cambria Math" panose="02040503050406030204" pitchFamily="18" charset="0"/>
+                            <a:cs typeface="Arial" panose="020B0604020202020204" pitchFamily="34" charset="0"/>
+                          </a:rPr>
+                          <m:t>•</m:t>
+                        </m:r>
+                        <m:r>
+                          <a:rPr lang="en-US" sz="1500" b="0" i="1" smtClean="0">
+                            <a:latin typeface="Cambria Math" panose="02040503050406030204" pitchFamily="18" charset="0"/>
+                            <a:cs typeface="Arial" panose="020B0604020202020204" pitchFamily="34" charset="0"/>
+                          </a:rPr>
+                          <m:t>𝜇</m:t>
+                        </m:r>
+                      </m:den>
+                    </m:f>
+                  </m:oMath>
+                </a14:m>
+                <a:r>
+                  <a:rPr lang="en-US" sz="1500" b="0" dirty="0">
+                    <a:cs typeface="Arial" panose="020B0604020202020204" pitchFamily="34" charset="0"/>
+                  </a:rPr>
+                  <a:t>   </a:t>
+                </a:r>
+                <a:r>
+                  <a:rPr lang="en-US" sz="1200" b="0" dirty="0">
+                    <a:cs typeface="Arial" panose="020B0604020202020204" pitchFamily="34" charset="0"/>
+                  </a:rPr>
+                  <a:t>where  </a:t>
+                </a:r>
+                <a14:m>
+                  <m:oMath xmlns:m="http://schemas.openxmlformats.org/officeDocument/2006/math">
+                    <m:r>
+                      <a:rPr lang="en-US" sz="1200" b="0" i="1" smtClean="0">
+                        <a:latin typeface="Cambria Math" panose="02040503050406030204" pitchFamily="18" charset="0"/>
+                        <a:cs typeface="Arial" panose="020B0604020202020204" pitchFamily="34" charset="0"/>
+                      </a:rPr>
+                      <m:t>𝜇</m:t>
+                    </m:r>
+                  </m:oMath>
+                </a14:m>
+                <a:r>
+                  <a:rPr lang="en-US" sz="1200" b="0" dirty="0">
+                    <a:cs typeface="Arial" panose="020B0604020202020204" pitchFamily="34" charset="0"/>
+                  </a:rPr>
+                  <a:t> is angle between </a:t>
+                </a:r>
+                <a14:m>
+                  <m:oMath xmlns:m="http://schemas.openxmlformats.org/officeDocument/2006/math">
+                    <m:acc>
+                      <m:accPr>
+                        <m:chr m:val="⃗"/>
+                        <m:ctrlPr>
+                          <a:rPr lang="en-US" sz="1200" b="0" i="1" smtClean="0">
+                            <a:latin typeface="Cambria Math" panose="02040503050406030204" pitchFamily="18" charset="0"/>
+                            <a:cs typeface="Arial" panose="020B0604020202020204" pitchFamily="34" charset="0"/>
+                          </a:rPr>
+                        </m:ctrlPr>
+                      </m:accPr>
+                      <m:e>
+                        <m:r>
+                          <m:rPr>
+                            <m:sty m:val="p"/>
+                          </m:rPr>
+                          <a:rPr lang="en-US" sz="1200" b="0" i="0" smtClean="0">
+                            <a:latin typeface="Cambria Math" panose="02040503050406030204" pitchFamily="18" charset="0"/>
+                            <a:cs typeface="Arial" panose="020B0604020202020204" pitchFamily="34" charset="0"/>
+                          </a:rPr>
+                          <m:t>Ω</m:t>
+                        </m:r>
+                      </m:e>
+                    </m:acc>
+                    <m:r>
+                      <a:rPr lang="en-US" sz="1200" b="0" i="1" dirty="0" smtClean="0">
+                        <a:latin typeface="Cambria Math" panose="02040503050406030204" pitchFamily="18" charset="0"/>
+                        <a:cs typeface="Arial" panose="020B0604020202020204" pitchFamily="34" charset="0"/>
+                      </a:rPr>
+                      <m:t> &amp; </m:t>
+                    </m:r>
+                    <m:acc>
+                      <m:accPr>
+                        <m:chr m:val="⃗"/>
+                        <m:ctrlPr>
+                          <a:rPr lang="en-US" sz="1200" b="0" i="1" dirty="0" smtClean="0">
+                            <a:latin typeface="Cambria Math" panose="02040503050406030204" pitchFamily="18" charset="0"/>
+                            <a:cs typeface="Arial" panose="020B0604020202020204" pitchFamily="34" charset="0"/>
+                          </a:rPr>
+                        </m:ctrlPr>
+                      </m:accPr>
+                      <m:e>
+                        <m:sSup>
+                          <m:sSupPr>
+                            <m:ctrlPr>
+                              <a:rPr lang="en-US" sz="1200" b="0" i="1" dirty="0" smtClean="0">
+                                <a:latin typeface="Cambria Math" panose="02040503050406030204" pitchFamily="18" charset="0"/>
+                                <a:cs typeface="Arial" panose="020B0604020202020204" pitchFamily="34" charset="0"/>
+                              </a:rPr>
+                            </m:ctrlPr>
+                          </m:sSupPr>
+                          <m:e>
+                            <m:r>
+                              <a:rPr lang="en-US" sz="1200" b="0" i="1" dirty="0" smtClean="0">
+                                <a:latin typeface="Cambria Math" panose="02040503050406030204" pitchFamily="18" charset="0"/>
+                                <a:cs typeface="Arial" panose="020B0604020202020204" pitchFamily="34" charset="0"/>
+                              </a:rPr>
+                              <m:t>𝑟</m:t>
+                            </m:r>
+                          </m:e>
+                          <m:sup>
+                            <m:r>
+                              <a:rPr lang="en-US" sz="1200" b="0" i="1" dirty="0" smtClean="0">
+                                <a:latin typeface="Cambria Math" panose="02040503050406030204" pitchFamily="18" charset="0"/>
+                                <a:cs typeface="Arial" panose="020B0604020202020204" pitchFamily="34" charset="0"/>
+                              </a:rPr>
+                              <m:t>′</m:t>
+                            </m:r>
+                          </m:sup>
+                        </m:sSup>
+                      </m:e>
+                    </m:acc>
+                  </m:oMath>
+                </a14:m>
+                <a:r>
+                  <a:rPr lang="en-US" sz="1200" b="0" dirty="0">
+                    <a:cs typeface="Arial" panose="020B0604020202020204" pitchFamily="34" charset="0"/>
+                  </a:rPr>
+                  <a:t>, the surface norma</a:t>
+                </a:r>
+                <a:r>
+                  <a:rPr lang="en-US" sz="1200" dirty="0">
+                    <a:cs typeface="Arial" panose="020B0604020202020204" pitchFamily="34" charset="0"/>
+                  </a:rPr>
+                  <a:t>l, </a:t>
+                </a:r>
+                <a14:m>
+                  <m:oMath xmlns:m="http://schemas.openxmlformats.org/officeDocument/2006/math">
+                    <m:sSub>
+                      <m:sSubPr>
+                        <m:ctrlPr>
+                          <a:rPr lang="en-US" sz="1200" b="0" i="1" smtClean="0">
+                            <a:latin typeface="Cambria Math" panose="02040503050406030204" pitchFamily="18" charset="0"/>
+                            <a:cs typeface="Arial" panose="020B0604020202020204" pitchFamily="34" charset="0"/>
+                          </a:rPr>
+                        </m:ctrlPr>
+                      </m:sSubPr>
+                      <m:e>
+                        <m:r>
+                          <m:rPr>
+                            <m:sty m:val="p"/>
+                          </m:rPr>
+                          <a:rPr lang="en-US" sz="1200" b="0" i="0" smtClean="0">
+                            <a:latin typeface="Cambria Math" panose="02040503050406030204" pitchFamily="18" charset="0"/>
+                            <a:cs typeface="Arial" panose="020B0604020202020204" pitchFamily="34" charset="0"/>
+                          </a:rPr>
+                          <m:t>Σ</m:t>
+                        </m:r>
+                      </m:e>
+                      <m:sub>
+                        <m:r>
+                          <a:rPr lang="en-US" sz="1200" b="0" i="1" smtClean="0">
+                            <a:latin typeface="Cambria Math" panose="02040503050406030204" pitchFamily="18" charset="0"/>
+                            <a:cs typeface="Arial" panose="020B0604020202020204" pitchFamily="34" charset="0"/>
+                          </a:rPr>
+                          <m:t>𝑡</m:t>
+                        </m:r>
+                      </m:sub>
+                    </m:sSub>
+                  </m:oMath>
+                </a14:m>
+                <a:r>
+                  <a:rPr lang="en-US" sz="1200" b="0" dirty="0">
+                    <a:cs typeface="Arial" panose="020B0604020202020204" pitchFamily="34" charset="0"/>
+                  </a:rPr>
+                  <a:t> is the total cross-section in the material, and </a:t>
+                </a:r>
+                <a14:m>
+                  <m:oMath xmlns:m="http://schemas.openxmlformats.org/officeDocument/2006/math">
+                    <m:r>
+                      <a:rPr lang="en-US" sz="1200" b="0" i="1" smtClean="0">
+                        <a:latin typeface="Cambria Math" panose="02040503050406030204" pitchFamily="18" charset="0"/>
+                        <a:cs typeface="Arial" panose="020B0604020202020204" pitchFamily="34" charset="0"/>
+                      </a:rPr>
+                      <m:t>𝑆</m:t>
+                    </m:r>
+                  </m:oMath>
+                </a14:m>
+                <a:r>
+                  <a:rPr lang="en-US" sz="1200" b="0" dirty="0">
+                    <a:cs typeface="Arial" panose="020B0604020202020204" pitchFamily="34" charset="0"/>
+                  </a:rPr>
+                  <a:t> is the tally surface area</a:t>
+                </a:r>
+              </a:p>
+            </p:txBody>
+          </p:sp>
+        </mc:Choice>
+        <mc:Fallback>
+          <p:sp>
+            <p:nvSpPr>
+              <p:cNvPr id="5" name="Content Placeholder 4">
+                <a:extLst>
+                  <a:ext uri="{FF2B5EF4-FFF2-40B4-BE49-F238E27FC236}">
+                    <a16:creationId xmlns:a16="http://schemas.microsoft.com/office/drawing/2014/main" id="{5B61F8F5-7260-8343-A766-8B64C80CF172}"/>
+                  </a:ext>
+                </a:extLst>
+              </p:cNvPr>
+              <p:cNvSpPr>
+                <a:spLocks noGrp="1" noRot="1" noChangeAspect="1" noMove="1" noResize="1" noEditPoints="1" noAdjustHandles="1" noChangeArrowheads="1" noChangeShapeType="1" noTextEdit="1"/>
+              </p:cNvSpPr>
+              <p:nvPr>
+                <p:ph idx="1"/>
+              </p:nvPr>
+            </p:nvSpPr>
+            <p:spPr>
+              <a:xfrm>
+                <a:off x="159240" y="919584"/>
+                <a:ext cx="6139960" cy="4328440"/>
+              </a:xfrm>
+              <a:blipFill>
+                <a:blip r:embed="rId2"/>
+                <a:stretch>
+                  <a:fillRect l="-1033" t="-880"/>
+                </a:stretch>
+              </a:blipFill>
+            </p:spPr>
+            <p:txBody>
+              <a:bodyPr/>
+              <a:lstStyle/>
+              <a:p>
+                <a:r>
+                  <a:rPr lang="en-US">
+                    <a:noFill/>
+                  </a:rPr>
+                  <a:t> </a:t>
+                </a:r>
+              </a:p>
+            </p:txBody>
+          </p:sp>
+        </mc:Fallback>
+      </mc:AlternateContent>
       <p:sp>
         <p:nvSpPr>
-          <p:cNvPr id="5" name="Content Placeholder 4">
+          <p:cNvPr id="6" name="TextBox 5">
             <a:extLst>
               <a:ext uri="{FF2B5EF4-FFF2-40B4-BE49-F238E27FC236}">
-                <a16:creationId xmlns:a16="http://schemas.microsoft.com/office/drawing/2014/main" id="{5B61F8F5-7260-8343-A766-8B64C80CF172}"/>
+                <a16:creationId xmlns:a16="http://schemas.microsoft.com/office/drawing/2014/main" id="{4F42F0E1-D0BC-AC45-AA30-E2DC4F13BF5A}"/>
               </a:ext>
             </a:extLst>
           </p:cNvPr>
-          <p:cNvSpPr>
-            <a:spLocks noGrp="1"/>
-          </p:cNvSpPr>
-          <p:nvPr>
-            <p:ph idx="1"/>
-          </p:nvPr>
+          <p:cNvSpPr txBox="1"/>
+          <p:nvPr/>
         </p:nvSpPr>
-        <p:spPr/>
+        <p:spPr>
+          <a:xfrm>
+            <a:off x="5961413" y="415636"/>
+            <a:ext cx="184731" cy="369332"/>
+          </a:xfrm>
+          <a:prstGeom prst="rect">
+            <a:avLst/>
+          </a:prstGeom>
+          <a:noFill/>
+        </p:spPr>
         <p:txBody>
-          <a:bodyPr/>
+          <a:bodyPr wrap="none" rtlCol="0">
+            <a:spAutoFit/>
+          </a:bodyPr>
           <a:lstStyle/>
           <a:p>
             <a:endParaRPr lang="en-US" dirty="0"/>
+          </a:p>
+        </p:txBody>
+      </p:sp>
+      <p:pic>
+        <p:nvPicPr>
+          <p:cNvPr id="9" name="Picture 8">
+            <a:extLst>
+              <a:ext uri="{FF2B5EF4-FFF2-40B4-BE49-F238E27FC236}">
+                <a16:creationId xmlns:a16="http://schemas.microsoft.com/office/drawing/2014/main" id="{81DE49F1-A46A-6C46-B4AF-5E9ACE279792}"/>
+              </a:ext>
+            </a:extLst>
+          </p:cNvPr>
+          <p:cNvPicPr>
+            <a:picLocks noChangeAspect="1"/>
+          </p:cNvPicPr>
+          <p:nvPr/>
+        </p:nvPicPr>
+        <p:blipFill>
+          <a:blip r:embed="rId3"/>
+          <a:stretch>
+            <a:fillRect/>
+          </a:stretch>
+        </p:blipFill>
+        <p:spPr>
+          <a:xfrm>
+            <a:off x="6120534" y="1119992"/>
+            <a:ext cx="3017116" cy="2557851"/>
+          </a:xfrm>
+          <a:prstGeom prst="rect">
+            <a:avLst/>
+          </a:prstGeom>
+        </p:spPr>
+      </p:pic>
+      <p:sp>
+        <p:nvSpPr>
+          <p:cNvPr id="11" name="TextBox 10">
+            <a:extLst>
+              <a:ext uri="{FF2B5EF4-FFF2-40B4-BE49-F238E27FC236}">
+                <a16:creationId xmlns:a16="http://schemas.microsoft.com/office/drawing/2014/main" id="{1C3C7F3C-F284-0C42-B44C-09793721E1AC}"/>
+              </a:ext>
+            </a:extLst>
+          </p:cNvPr>
+          <p:cNvSpPr txBox="1"/>
+          <p:nvPr/>
+        </p:nvSpPr>
+        <p:spPr>
+          <a:xfrm>
+            <a:off x="6146144" y="3751385"/>
+            <a:ext cx="2857179" cy="1323439"/>
+          </a:xfrm>
+          <a:prstGeom prst="rect">
+            <a:avLst/>
+          </a:prstGeom>
+          <a:noFill/>
+        </p:spPr>
+        <p:txBody>
+          <a:bodyPr wrap="square" rtlCol="0">
+            <a:spAutoFit/>
+          </a:bodyPr>
+          <a:lstStyle/>
+          <a:p>
+            <a:r>
+              <a:rPr lang="en-US" sz="1200" b="1" i="1" dirty="0"/>
+              <a:t>Figure 1</a:t>
+            </a:r>
+            <a:r>
+              <a:rPr lang="en-US" sz="1200" i="1" dirty="0"/>
+              <a:t>:</a:t>
+            </a:r>
+          </a:p>
+          <a:p>
+            <a:endParaRPr lang="en-US" sz="800" dirty="0"/>
+          </a:p>
+          <a:p>
+            <a:r>
+              <a:rPr lang="en-US" sz="1200" dirty="0"/>
+              <a:t>A visualization as to why splitting and Russian roulette are ineffective in cases of interest to NXTEVT. Particles not initially directed towards the tally won’t likely reach it.</a:t>
+            </a:r>
           </a:p>
         </p:txBody>
       </p:sp>
     </p:spTree>
     <p:extLst>
       <p:ext uri="{BB962C8B-B14F-4D97-AF65-F5344CB8AC3E}">
-        <p14:creationId xmlns:p14="http://schemas.microsoft.com/office/powerpoint/2010/main" val="1556736215"/>
+        <p14:creationId xmlns:p14="http://schemas.microsoft.com/office/powerpoint/2010/main" val="1012840368"/>
       </p:ext>
     </p:extLst>
   </p:cSld>
@@ -5885,7 +8243,7 @@
           <a:p>
             <a:r>
               <a:rPr lang="en-US" dirty="0"/>
-              <a:t>Methodology</a:t>
+              <a:t>Research Objective &amp; Motivation</a:t>
             </a:r>
           </a:p>
         </p:txBody>
@@ -5972,11 +8330,116 @@
             <p:ph idx="1"/>
           </p:nvPr>
         </p:nvSpPr>
-        <p:spPr/>
+        <p:spPr>
+          <a:xfrm>
+            <a:off x="139701" y="884415"/>
+            <a:ext cx="8839200" cy="4328440"/>
+          </a:xfrm>
+        </p:spPr>
         <p:txBody>
           <a:bodyPr/>
           <a:lstStyle/>
           <a:p>
+            <a:pPr marL="0" indent="0">
+              <a:buNone/>
+            </a:pPr>
+            <a:r>
+              <a:rPr lang="en-US" dirty="0"/>
+              <a:t>Motivation</a:t>
+            </a:r>
+          </a:p>
+          <a:p>
+            <a:pPr lvl="2"/>
+            <a:r>
+              <a:rPr lang="en-US" dirty="0"/>
+              <a:t>We attempt to model a supernova (</a:t>
+            </a:r>
+            <a:r>
+              <a:rPr lang="en-US" i="1" dirty="0"/>
+              <a:t>SN2006gy</a:t>
+            </a:r>
+            <a:r>
+              <a:rPr lang="en-US" dirty="0"/>
+              <a:t>) interacting with its circumstellar medium [4]</a:t>
+            </a:r>
+          </a:p>
+          <a:p>
+            <a:pPr lvl="2"/>
+            <a:r>
+              <a:rPr lang="en-US" dirty="0"/>
+              <a:t>The opacities of the supernova ejecta and ejecta-CSM Shock do not lend itself well to standard VRMs or the NXTEVT estimator</a:t>
+            </a:r>
+          </a:p>
+          <a:p>
+            <a:pPr lvl="2"/>
+            <a:r>
+              <a:rPr lang="en-US" dirty="0"/>
+              <a:t>The multi-physics involved require a large number of particles for answer to converge – makes the simulation computationally expensive</a:t>
+            </a:r>
+          </a:p>
+          <a:p>
+            <a:pPr lvl="2"/>
+            <a:endParaRPr lang="en-US" sz="500" dirty="0"/>
+          </a:p>
+          <a:p>
+            <a:pPr marL="0" indent="0">
+              <a:buNone/>
+            </a:pPr>
+            <a:r>
+              <a:rPr lang="en-US" dirty="0"/>
+              <a:t>Response Function Variance Reduction Method</a:t>
+            </a:r>
+          </a:p>
+          <a:p>
+            <a:pPr lvl="2"/>
+            <a:r>
+              <a:rPr lang="en-US" dirty="0"/>
+              <a:t>Trace particles, as in NXTEVT estimators, but for problems with high opacities. </a:t>
+            </a:r>
+          </a:p>
+          <a:p>
+            <a:pPr lvl="2"/>
+            <a:r>
+              <a:rPr lang="en-US" dirty="0"/>
+              <a:t>Collect information on how traced particles interact with the material</a:t>
+            </a:r>
+          </a:p>
+          <a:p>
+            <a:pPr lvl="2"/>
+            <a:r>
+              <a:rPr lang="en-US" dirty="0"/>
+              <a:t>Contribute to the tally at birth and every scattering event</a:t>
+            </a:r>
+          </a:p>
+          <a:p>
+            <a:pPr lvl="2"/>
+            <a:endParaRPr lang="en-US" sz="500" dirty="0"/>
+          </a:p>
+          <a:p>
+            <a:pPr marL="0" indent="0">
+              <a:buNone/>
+            </a:pPr>
+            <a:r>
+              <a:rPr lang="en-US" dirty="0"/>
+              <a:t>Objective</a:t>
+            </a:r>
+          </a:p>
+          <a:p>
+            <a:pPr lvl="2"/>
+            <a:r>
+              <a:rPr lang="en-US" dirty="0"/>
+              <a:t>Investigate the advantages of a response function based VRM for problems modeling supernova-CSM interactions</a:t>
+            </a:r>
+          </a:p>
+          <a:p>
+            <a:pPr lvl="2"/>
+            <a:r>
+              <a:rPr lang="en-US" dirty="0"/>
+              <a:t>Provide high-quality simulation data to compare with physical observation</a:t>
+            </a:r>
+          </a:p>
+          <a:p>
+            <a:pPr lvl="2"/>
             <a:endParaRPr lang="en-US" dirty="0"/>
           </a:p>
         </p:txBody>
@@ -5984,7 +8447,7 @@
     </p:spTree>
     <p:extLst>
       <p:ext uri="{BB962C8B-B14F-4D97-AF65-F5344CB8AC3E}">
-        <p14:creationId xmlns:p14="http://schemas.microsoft.com/office/powerpoint/2010/main" val="3540597825"/>
+        <p14:creationId xmlns:p14="http://schemas.microsoft.com/office/powerpoint/2010/main" val="1556736215"/>
       </p:ext>
     </p:extLst>
   </p:cSld>
@@ -6034,7 +8497,7 @@
           <a:p>
             <a:r>
               <a:rPr lang="en-US" dirty="0"/>
-              <a:t>Results</a:t>
+              <a:t>Method and Technical Approach</a:t>
             </a:r>
           </a:p>
         </p:txBody>
@@ -6105,35 +8568,513 @@
           </a:p>
         </p:txBody>
       </p:sp>
-      <p:sp>
-        <p:nvSpPr>
-          <p:cNvPr id="5" name="Content Placeholder 4">
+      <mc:AlternateContent xmlns:mc="http://schemas.openxmlformats.org/markup-compatibility/2006">
+        <mc:Choice xmlns:a14="http://schemas.microsoft.com/office/drawing/2010/main" Requires="a14">
+          <p:sp>
+            <p:nvSpPr>
+              <p:cNvPr id="5" name="Content Placeholder 4">
+                <a:extLst>
+                  <a:ext uri="{FF2B5EF4-FFF2-40B4-BE49-F238E27FC236}">
+                    <a16:creationId xmlns:a16="http://schemas.microsoft.com/office/drawing/2014/main" id="{5B61F8F5-7260-8343-A766-8B64C80CF172}"/>
+                  </a:ext>
+                </a:extLst>
+              </p:cNvPr>
+              <p:cNvSpPr>
+                <a:spLocks noGrp="1"/>
+              </p:cNvSpPr>
+              <p:nvPr>
+                <p:ph idx="1"/>
+              </p:nvPr>
+            </p:nvSpPr>
+            <p:spPr>
+              <a:xfrm>
+                <a:off x="140677" y="943030"/>
+                <a:ext cx="5673969" cy="4328440"/>
+              </a:xfrm>
+            </p:spPr>
+            <p:txBody>
+              <a:bodyPr/>
+              <a:lstStyle/>
+              <a:p>
+                <a:pPr marL="0" indent="0">
+                  <a:buNone/>
+                </a:pPr>
+                <a:r>
+                  <a:rPr lang="en-US" dirty="0"/>
+                  <a:t>Overview</a:t>
+                </a:r>
+              </a:p>
+              <a:p>
+                <a:pPr lvl="2"/>
+                <a:r>
+                  <a:rPr lang="en-US" sz="1500" dirty="0"/>
+                  <a:t>Initialize the problem domain</a:t>
+                </a:r>
+              </a:p>
+              <a:p>
+                <a:pPr lvl="2"/>
+                <a:r>
+                  <a:rPr lang="en-US" sz="1500" dirty="0"/>
+                  <a:t>Run the inverse transport problem to generate the response function value (</a:t>
+                </a:r>
+                <a14:m>
+                  <m:oMath xmlns:m="http://schemas.openxmlformats.org/officeDocument/2006/math">
+                    <m:sSub>
+                      <m:sSubPr>
+                        <m:ctrlPr>
+                          <a:rPr lang="en-US" sz="1500" b="0" i="1" smtClean="0">
+                            <a:latin typeface="Cambria Math" panose="02040503050406030204" pitchFamily="18" charset="0"/>
+                          </a:rPr>
+                        </m:ctrlPr>
+                      </m:sSubPr>
+                      <m:e>
+                        <m:r>
+                          <a:rPr lang="en-US" sz="1500" b="0" i="1" smtClean="0">
+                            <a:latin typeface="Cambria Math" panose="02040503050406030204" pitchFamily="18" charset="0"/>
+                          </a:rPr>
+                          <m:t>𝜎</m:t>
+                        </m:r>
+                      </m:e>
+                      <m:sub>
+                        <m:r>
+                          <a:rPr lang="en-US" sz="1500" b="0" i="1" smtClean="0">
+                            <a:latin typeface="Cambria Math" panose="02040503050406030204" pitchFamily="18" charset="0"/>
+                          </a:rPr>
+                          <m:t>𝑟</m:t>
+                        </m:r>
+                      </m:sub>
+                    </m:sSub>
+                  </m:oMath>
+                </a14:m>
+                <a:r>
+                  <a:rPr lang="en-US" sz="1500" dirty="0"/>
+                  <a:t>) for each cell</a:t>
+                </a:r>
+              </a:p>
+              <a:p>
+                <a:pPr lvl="2"/>
+                <a:r>
+                  <a:rPr lang="en-US" sz="1500" dirty="0"/>
+                  <a:t>Run forward transport problem, using the </a:t>
+                </a:r>
+                <a14:m>
+                  <m:oMath xmlns:m="http://schemas.openxmlformats.org/officeDocument/2006/math">
+                    <m:sSub>
+                      <m:sSubPr>
+                        <m:ctrlPr>
+                          <a:rPr lang="en-US" sz="1500" i="1">
+                            <a:latin typeface="Cambria Math" panose="02040503050406030204" pitchFamily="18" charset="0"/>
+                          </a:rPr>
+                        </m:ctrlPr>
+                      </m:sSubPr>
+                      <m:e>
+                        <m:r>
+                          <a:rPr lang="en-US" sz="1500" i="1">
+                            <a:latin typeface="Cambria Math" panose="02040503050406030204" pitchFamily="18" charset="0"/>
+                          </a:rPr>
+                          <m:t>𝜎</m:t>
+                        </m:r>
+                      </m:e>
+                      <m:sub>
+                        <m:r>
+                          <a:rPr lang="en-US" sz="1500" i="1">
+                            <a:latin typeface="Cambria Math" panose="02040503050406030204" pitchFamily="18" charset="0"/>
+                          </a:rPr>
+                          <m:t>𝑟</m:t>
+                        </m:r>
+                      </m:sub>
+                    </m:sSub>
+                  </m:oMath>
+                </a14:m>
+                <a:r>
+                  <a:rPr lang="en-US" sz="1500" dirty="0"/>
+                  <a:t> values to tally at a particles birth and every subseq. scatter event</a:t>
+                </a:r>
+              </a:p>
+              <a:p>
+                <a:pPr lvl="2"/>
+                <a:endParaRPr lang="en-US" sz="500" dirty="0"/>
+              </a:p>
+              <a:p>
+                <a:pPr marL="0" indent="0">
+                  <a:buNone/>
+                </a:pPr>
+                <a:r>
+                  <a:rPr lang="en-US" dirty="0"/>
+                  <a:t>Inverse Transport</a:t>
+                </a:r>
+              </a:p>
+              <a:p>
+                <a:pPr lvl="2"/>
+                <a:r>
+                  <a:rPr lang="en-US" sz="1500" dirty="0"/>
+                  <a:t>Initialize the particle uniformly on the tally surface, and direct it towards the source via cosine-distribution</a:t>
+                </a:r>
+              </a:p>
+              <a:p>
+                <a:pPr lvl="2"/>
+                <a:r>
+                  <a:rPr lang="en-US" sz="1500" dirty="0"/>
+                  <a:t>Trace particle through the mesh, calculating </a:t>
+                </a:r>
+                <a14:m>
+                  <m:oMath xmlns:m="http://schemas.openxmlformats.org/officeDocument/2006/math">
+                    <m:sSub>
+                      <m:sSubPr>
+                        <m:ctrlPr>
+                          <a:rPr lang="en-US" sz="1400" i="1">
+                            <a:latin typeface="Cambria Math" panose="02040503050406030204" pitchFamily="18" charset="0"/>
+                          </a:rPr>
+                        </m:ctrlPr>
+                      </m:sSubPr>
+                      <m:e>
+                        <m:r>
+                          <a:rPr lang="en-US" sz="1400" i="1">
+                            <a:latin typeface="Cambria Math" panose="02040503050406030204" pitchFamily="18" charset="0"/>
+                          </a:rPr>
+                          <m:t>𝜎</m:t>
+                        </m:r>
+                      </m:e>
+                      <m:sub>
+                        <m:r>
+                          <a:rPr lang="en-US" sz="1400" i="1">
+                            <a:latin typeface="Cambria Math" panose="02040503050406030204" pitchFamily="18" charset="0"/>
+                          </a:rPr>
+                          <m:t>𝑟</m:t>
+                        </m:r>
+                      </m:sub>
+                    </m:sSub>
+                  </m:oMath>
+                </a14:m>
+                <a:r>
+                  <a:rPr lang="en-US" sz="1500" dirty="0"/>
+                  <a:t> based on:</a:t>
+                </a:r>
+              </a:p>
+              <a:p>
+                <a:pPr lvl="3"/>
+                <a:r>
+                  <a:rPr lang="en-US" sz="1300" dirty="0"/>
+                  <a:t>Weighted </a:t>
+                </a:r>
+                <a14:m>
+                  <m:oMath xmlns:m="http://schemas.openxmlformats.org/officeDocument/2006/math">
+                    <m:sSub>
+                      <m:sSubPr>
+                        <m:ctrlPr>
+                          <a:rPr lang="en-US" sz="1200" i="1">
+                            <a:latin typeface="Cambria Math" panose="02040503050406030204" pitchFamily="18" charset="0"/>
+                          </a:rPr>
+                        </m:ctrlPr>
+                      </m:sSubPr>
+                      <m:e>
+                        <m:r>
+                          <a:rPr lang="en-US" sz="1200" i="1">
+                            <a:latin typeface="Cambria Math" panose="02040503050406030204" pitchFamily="18" charset="0"/>
+                          </a:rPr>
+                          <m:t>𝜎</m:t>
+                        </m:r>
+                      </m:e>
+                      <m:sub>
+                        <m:r>
+                          <a:rPr lang="en-US" sz="1200" b="0" i="1" smtClean="0">
+                            <a:latin typeface="Cambria Math" panose="02040503050406030204" pitchFamily="18" charset="0"/>
+                          </a:rPr>
+                          <m:t>𝑎</m:t>
+                        </m:r>
+                      </m:sub>
+                    </m:sSub>
+                  </m:oMath>
+                </a14:m>
+                <a:r>
+                  <a:rPr lang="en-US" sz="1300" dirty="0"/>
+                  <a:t> value the particle encounters based on the distance it travels through each cell</a:t>
+                </a:r>
+              </a:p>
+              <a:p>
+                <a:pPr lvl="3"/>
+                <a:r>
+                  <a:rPr lang="en-US" sz="1300" dirty="0"/>
+                  <a:t>Weighted </a:t>
+                </a:r>
+                <a14:m>
+                  <m:oMath xmlns:m="http://schemas.openxmlformats.org/officeDocument/2006/math">
+                    <m:sSub>
+                      <m:sSubPr>
+                        <m:ctrlPr>
+                          <a:rPr lang="en-US" sz="1200" i="1">
+                            <a:latin typeface="Cambria Math" panose="02040503050406030204" pitchFamily="18" charset="0"/>
+                          </a:rPr>
+                        </m:ctrlPr>
+                      </m:sSubPr>
+                      <m:e>
+                        <m:r>
+                          <a:rPr lang="en-US" sz="1200" i="1">
+                            <a:latin typeface="Cambria Math" panose="02040503050406030204" pitchFamily="18" charset="0"/>
+                          </a:rPr>
+                          <m:t>𝜎</m:t>
+                        </m:r>
+                      </m:e>
+                      <m:sub>
+                        <m:r>
+                          <a:rPr lang="en-US" sz="1200" b="0" i="1" smtClean="0">
+                            <a:latin typeface="Cambria Math" panose="02040503050406030204" pitchFamily="18" charset="0"/>
+                          </a:rPr>
+                          <m:t>𝑎</m:t>
+                        </m:r>
+                      </m:sub>
+                    </m:sSub>
+                  </m:oMath>
+                </a14:m>
+                <a:r>
+                  <a:rPr lang="en-US" sz="1300" dirty="0"/>
+                  <a:t> value for each cell based on every particle that passes through → </a:t>
+                </a:r>
+                <a14:m>
+                  <m:oMath xmlns:m="http://schemas.openxmlformats.org/officeDocument/2006/math">
+                    <m:sSub>
+                      <m:sSubPr>
+                        <m:ctrlPr>
+                          <a:rPr lang="en-US" sz="1200" i="1">
+                            <a:latin typeface="Cambria Math" panose="02040503050406030204" pitchFamily="18" charset="0"/>
+                          </a:rPr>
+                        </m:ctrlPr>
+                      </m:sSubPr>
+                      <m:e>
+                        <m:r>
+                          <a:rPr lang="en-US" sz="1200" i="1">
+                            <a:latin typeface="Cambria Math" panose="02040503050406030204" pitchFamily="18" charset="0"/>
+                          </a:rPr>
+                          <m:t>𝜎</m:t>
+                        </m:r>
+                      </m:e>
+                      <m:sub>
+                        <m:r>
+                          <a:rPr lang="en-US" sz="1200" i="1">
+                            <a:latin typeface="Cambria Math" panose="02040503050406030204" pitchFamily="18" charset="0"/>
+                          </a:rPr>
+                          <m:t>𝑟</m:t>
+                        </m:r>
+                      </m:sub>
+                    </m:sSub>
+                  </m:oMath>
+                </a14:m>
+                <a:endParaRPr lang="en-US" sz="1200" dirty="0"/>
+              </a:p>
+              <a:p>
+                <a:pPr lvl="2"/>
+                <a:endParaRPr lang="en-US" sz="1500" dirty="0"/>
+              </a:p>
+            </p:txBody>
+          </p:sp>
+        </mc:Choice>
+        <mc:Fallback>
+          <p:sp>
+            <p:nvSpPr>
+              <p:cNvPr id="5" name="Content Placeholder 4">
+                <a:extLst>
+                  <a:ext uri="{FF2B5EF4-FFF2-40B4-BE49-F238E27FC236}">
+                    <a16:creationId xmlns:a16="http://schemas.microsoft.com/office/drawing/2014/main" id="{5B61F8F5-7260-8343-A766-8B64C80CF172}"/>
+                  </a:ext>
+                </a:extLst>
+              </p:cNvPr>
+              <p:cNvSpPr>
+                <a:spLocks noGrp="1" noRot="1" noChangeAspect="1" noMove="1" noResize="1" noEditPoints="1" noAdjustHandles="1" noChangeArrowheads="1" noChangeShapeType="1" noTextEdit="1"/>
+              </p:cNvSpPr>
+              <p:nvPr>
+                <p:ph idx="1"/>
+              </p:nvPr>
+            </p:nvSpPr>
+            <p:spPr>
+              <a:xfrm>
+                <a:off x="140677" y="943030"/>
+                <a:ext cx="5673969" cy="4328440"/>
+              </a:xfrm>
+              <a:blipFill>
+                <a:blip r:embed="rId2"/>
+                <a:stretch>
+                  <a:fillRect l="-893" t="-585"/>
+                </a:stretch>
+              </a:blipFill>
+            </p:spPr>
+            <p:txBody>
+              <a:bodyPr/>
+              <a:lstStyle/>
+              <a:p>
+                <a:r>
+                  <a:rPr lang="en-US">
+                    <a:noFill/>
+                  </a:rPr>
+                  <a:t> </a:t>
+                </a:r>
+              </a:p>
+            </p:txBody>
+          </p:sp>
+        </mc:Fallback>
+      </mc:AlternateContent>
+      <p:pic>
+        <p:nvPicPr>
+          <p:cNvPr id="7" name="Picture 6">
             <a:extLst>
               <a:ext uri="{FF2B5EF4-FFF2-40B4-BE49-F238E27FC236}">
-                <a16:creationId xmlns:a16="http://schemas.microsoft.com/office/drawing/2014/main" id="{5B61F8F5-7260-8343-A766-8B64C80CF172}"/>
+                <a16:creationId xmlns:a16="http://schemas.microsoft.com/office/drawing/2014/main" id="{8A21F248-CF9D-FF49-846A-F0B3FA50CB09}"/>
               </a:ext>
             </a:extLst>
           </p:cNvPr>
-          <p:cNvSpPr>
-            <a:spLocks noGrp="1"/>
-          </p:cNvSpPr>
-          <p:nvPr>
-            <p:ph idx="1"/>
-          </p:nvPr>
-        </p:nvSpPr>
-        <p:spPr/>
-        <p:txBody>
-          <a:bodyPr/>
-          <a:lstStyle/>
-          <a:p>
-            <a:endParaRPr lang="en-US" dirty="0"/>
-          </a:p>
-        </p:txBody>
-      </p:sp>
+          <p:cNvPicPr>
+            <a:picLocks noChangeAspect="1"/>
+          </p:cNvPicPr>
+          <p:nvPr/>
+        </p:nvPicPr>
+        <p:blipFill>
+          <a:blip r:embed="rId3"/>
+          <a:stretch>
+            <a:fillRect/>
+          </a:stretch>
+        </p:blipFill>
+        <p:spPr>
+          <a:xfrm>
+            <a:off x="6001011" y="943030"/>
+            <a:ext cx="3002312" cy="2971800"/>
+          </a:xfrm>
+          <a:prstGeom prst="rect">
+            <a:avLst/>
+          </a:prstGeom>
+        </p:spPr>
+      </p:pic>
+      <mc:AlternateContent xmlns:mc="http://schemas.openxmlformats.org/markup-compatibility/2006">
+        <mc:Choice xmlns:a14="http://schemas.microsoft.com/office/drawing/2010/main" Requires="a14">
+          <p:sp>
+            <p:nvSpPr>
+              <p:cNvPr id="8" name="TextBox 7">
+                <a:extLst>
+                  <a:ext uri="{FF2B5EF4-FFF2-40B4-BE49-F238E27FC236}">
+                    <a16:creationId xmlns:a16="http://schemas.microsoft.com/office/drawing/2014/main" id="{E697FA6B-D40F-0F45-A413-05FCD703EF39}"/>
+                  </a:ext>
+                </a:extLst>
+              </p:cNvPr>
+              <p:cNvSpPr txBox="1"/>
+              <p:nvPr/>
+            </p:nvSpPr>
+            <p:spPr>
+              <a:xfrm>
+                <a:off x="6096000" y="3914830"/>
+                <a:ext cx="2813538" cy="1138773"/>
+              </a:xfrm>
+              <a:prstGeom prst="rect">
+                <a:avLst/>
+              </a:prstGeom>
+              <a:noFill/>
+            </p:spPr>
+            <p:txBody>
+              <a:bodyPr wrap="square" rtlCol="0">
+                <a:spAutoFit/>
+              </a:bodyPr>
+              <a:lstStyle/>
+              <a:p>
+                <a:r>
+                  <a:rPr lang="en-US" sz="1200" b="1" i="1" dirty="0"/>
+                  <a:t>Figure 2</a:t>
+                </a:r>
+                <a:r>
+                  <a:rPr lang="en-US" sz="1200" i="1" dirty="0"/>
+                  <a:t>:</a:t>
+                </a:r>
+              </a:p>
+              <a:p>
+                <a:endParaRPr lang="en-US" sz="800" dirty="0"/>
+              </a:p>
+              <a:p>
+                <a:r>
+                  <a:rPr lang="en-US" sz="1200" dirty="0"/>
+                  <a:t>A visualization of the inverse transport method. The source is the purple cell, and a darker shade of red corresponds to a higher </a:t>
+                </a:r>
+                <a14:m>
+                  <m:oMath xmlns:m="http://schemas.openxmlformats.org/officeDocument/2006/math">
+                    <m:sSub>
+                      <m:sSubPr>
+                        <m:ctrlPr>
+                          <a:rPr lang="en-US" sz="1200" i="1">
+                            <a:latin typeface="Cambria Math" panose="02040503050406030204" pitchFamily="18" charset="0"/>
+                          </a:rPr>
+                        </m:ctrlPr>
+                      </m:sSubPr>
+                      <m:e>
+                        <m:r>
+                          <a:rPr lang="en-US" sz="1200" i="1">
+                            <a:latin typeface="Cambria Math" panose="02040503050406030204" pitchFamily="18" charset="0"/>
+                          </a:rPr>
+                          <m:t>𝜎</m:t>
+                        </m:r>
+                      </m:e>
+                      <m:sub>
+                        <m:r>
+                          <a:rPr lang="en-US" sz="1200" i="1">
+                            <a:latin typeface="Cambria Math" panose="02040503050406030204" pitchFamily="18" charset="0"/>
+                          </a:rPr>
+                          <m:t>𝑟</m:t>
+                        </m:r>
+                      </m:sub>
+                    </m:sSub>
+                  </m:oMath>
+                </a14:m>
+                <a:r>
+                  <a:rPr lang="en-US" sz="1200" dirty="0"/>
+                  <a:t> value.</a:t>
+                </a:r>
+              </a:p>
+            </p:txBody>
+          </p:sp>
+        </mc:Choice>
+        <mc:Fallback>
+          <p:sp>
+            <p:nvSpPr>
+              <p:cNvPr id="8" name="TextBox 7">
+                <a:extLst>
+                  <a:ext uri="{FF2B5EF4-FFF2-40B4-BE49-F238E27FC236}">
+                    <a16:creationId xmlns:a16="http://schemas.microsoft.com/office/drawing/2014/main" id="{E697FA6B-D40F-0F45-A413-05FCD703EF39}"/>
+                  </a:ext>
+                </a:extLst>
+              </p:cNvPr>
+              <p:cNvSpPr txBox="1">
+                <a:spLocks noRot="1" noChangeAspect="1" noMove="1" noResize="1" noEditPoints="1" noAdjustHandles="1" noChangeArrowheads="1" noChangeShapeType="1" noTextEdit="1"/>
+              </p:cNvSpPr>
+              <p:nvPr/>
+            </p:nvSpPr>
+            <p:spPr>
+              <a:xfrm>
+                <a:off x="6096000" y="3914830"/>
+                <a:ext cx="2813538" cy="1138773"/>
+              </a:xfrm>
+              <a:prstGeom prst="rect">
+                <a:avLst/>
+              </a:prstGeom>
+              <a:blipFill>
+                <a:blip r:embed="rId4"/>
+                <a:stretch>
+                  <a:fillRect r="-901" b="-3297"/>
+                </a:stretch>
+              </a:blipFill>
+            </p:spPr>
+            <p:txBody>
+              <a:bodyPr/>
+              <a:lstStyle/>
+              <a:p>
+                <a:r>
+                  <a:rPr lang="en-US">
+                    <a:noFill/>
+                  </a:rPr>
+                  <a:t> </a:t>
+                </a:r>
+              </a:p>
+            </p:txBody>
+          </p:sp>
+        </mc:Fallback>
+      </mc:AlternateContent>
     </p:spTree>
     <p:extLst>
       <p:ext uri="{BB962C8B-B14F-4D97-AF65-F5344CB8AC3E}">
-        <p14:creationId xmlns:p14="http://schemas.microsoft.com/office/powerpoint/2010/main" val="4112433492"/>
+        <p14:creationId xmlns:p14="http://schemas.microsoft.com/office/powerpoint/2010/main" val="3540597825"/>
       </p:ext>
     </p:extLst>
   </p:cSld>
@@ -6183,7 +9124,7 @@
           <a:p>
             <a:r>
               <a:rPr lang="en-US" dirty="0"/>
-              <a:t>Conclusions</a:t>
+              <a:t>Method Cont. &amp; Testing</a:t>
             </a:r>
           </a:p>
         </p:txBody>
@@ -6254,35 +9195,431 @@
           </a:p>
         </p:txBody>
       </p:sp>
-      <p:sp>
-        <p:nvSpPr>
-          <p:cNvPr id="5" name="Content Placeholder 4">
+      <mc:AlternateContent xmlns:mc="http://schemas.openxmlformats.org/markup-compatibility/2006">
+        <mc:Choice xmlns:a14="http://schemas.microsoft.com/office/drawing/2010/main" Requires="a14">
+          <p:sp>
+            <p:nvSpPr>
+              <p:cNvPr id="5" name="Content Placeholder 4">
+                <a:extLst>
+                  <a:ext uri="{FF2B5EF4-FFF2-40B4-BE49-F238E27FC236}">
+                    <a16:creationId xmlns:a16="http://schemas.microsoft.com/office/drawing/2014/main" id="{5B61F8F5-7260-8343-A766-8B64C80CF172}"/>
+                  </a:ext>
+                </a:extLst>
+              </p:cNvPr>
+              <p:cNvSpPr>
+                <a:spLocks noGrp="1"/>
+              </p:cNvSpPr>
+              <p:nvPr>
+                <p:ph idx="1"/>
+              </p:nvPr>
+            </p:nvSpPr>
+            <p:spPr>
+              <a:xfrm>
+                <a:off x="257908" y="849246"/>
+                <a:ext cx="8628184" cy="2344691"/>
+              </a:xfrm>
+            </p:spPr>
+            <p:txBody>
+              <a:bodyPr/>
+              <a:lstStyle/>
+              <a:p>
+                <a:pPr marL="0" indent="0">
+                  <a:buNone/>
+                </a:pPr>
+                <a:r>
+                  <a:rPr lang="en-US" dirty="0"/>
+                  <a:t>Forward Transport</a:t>
+                </a:r>
+              </a:p>
+              <a:p>
+                <a:pPr marL="342900" lvl="2" indent="0">
+                  <a:buNone/>
+                </a:pPr>
+                <a:r>
+                  <a:rPr lang="en-US" sz="1500" dirty="0"/>
+                  <a:t>1. Upon the particles creation, a contribution is added to the tally accd. to:</a:t>
+                </a:r>
+              </a:p>
+              <a:p>
+                <a:pPr marL="342900" lvl="2" indent="0">
+                  <a:buNone/>
+                </a:pPr>
+                <a14:m>
+                  <m:oMathPara xmlns:m="http://schemas.openxmlformats.org/officeDocument/2006/math">
+                    <m:oMathParaPr>
+                      <m:jc m:val="centerGroup"/>
+                    </m:oMathParaPr>
+                    <m:oMath xmlns:m="http://schemas.openxmlformats.org/officeDocument/2006/math">
+                      <m:r>
+                        <a:rPr lang="en-US" sz="1500" b="0" i="1" smtClean="0">
+                          <a:latin typeface="Cambria Math" panose="02040503050406030204" pitchFamily="18" charset="0"/>
+                        </a:rPr>
+                        <m:t>𝐶𝑜𝑛𝑡𝑟𝑖𝑏𝑢𝑡𝑖𝑜𝑛</m:t>
+                      </m:r>
+                      <m:r>
+                        <a:rPr lang="en-US" sz="1500" b="0" i="1" smtClean="0">
+                          <a:latin typeface="Cambria Math" panose="02040503050406030204" pitchFamily="18" charset="0"/>
+                        </a:rPr>
+                        <m:t>=</m:t>
+                      </m:r>
+                      <m:sSub>
+                        <m:sSubPr>
+                          <m:ctrlPr>
+                            <a:rPr lang="en-US" sz="1500" b="0" i="1" smtClean="0">
+                              <a:latin typeface="Cambria Math" panose="02040503050406030204" pitchFamily="18" charset="0"/>
+                            </a:rPr>
+                          </m:ctrlPr>
+                        </m:sSubPr>
+                        <m:e>
+                          <m:r>
+                            <a:rPr lang="en-US" sz="1500" b="0" i="1" smtClean="0">
+                              <a:latin typeface="Cambria Math" panose="02040503050406030204" pitchFamily="18" charset="0"/>
+                            </a:rPr>
+                            <m:t>𝐸</m:t>
+                          </m:r>
+                        </m:e>
+                        <m:sub>
+                          <m:r>
+                            <a:rPr lang="en-US" sz="1500" b="0" i="1" smtClean="0">
+                              <a:latin typeface="Cambria Math" panose="02040503050406030204" pitchFamily="18" charset="0"/>
+                            </a:rPr>
+                            <m:t>𝑝𝑎𝑟𝑡𝑖𝑐𝑙𝑒</m:t>
+                          </m:r>
+                        </m:sub>
+                      </m:sSub>
+                      <m:sSup>
+                        <m:sSupPr>
+                          <m:ctrlPr>
+                            <a:rPr lang="en-US" sz="1500" b="0" i="1" smtClean="0">
+                              <a:latin typeface="Cambria Math" panose="02040503050406030204" pitchFamily="18" charset="0"/>
+                            </a:rPr>
+                          </m:ctrlPr>
+                        </m:sSupPr>
+                        <m:e>
+                          <m:r>
+                            <a:rPr lang="en-US" sz="1500" b="0" i="1" smtClean="0">
+                              <a:latin typeface="Cambria Math" panose="02040503050406030204" pitchFamily="18" charset="0"/>
+                            </a:rPr>
+                            <m:t>𝑒</m:t>
+                          </m:r>
+                        </m:e>
+                        <m:sup>
+                          <m:r>
+                            <a:rPr lang="en-US" sz="1500" b="0" i="1" smtClean="0">
+                              <a:latin typeface="Cambria Math" panose="02040503050406030204" pitchFamily="18" charset="0"/>
+                            </a:rPr>
+                            <m:t>−</m:t>
+                          </m:r>
+                          <m:d>
+                            <m:dPr>
+                              <m:ctrlPr>
+                                <a:rPr lang="en-US" sz="1500" b="0" i="1" smtClean="0">
+                                  <a:latin typeface="Cambria Math" panose="02040503050406030204" pitchFamily="18" charset="0"/>
+                                </a:rPr>
+                              </m:ctrlPr>
+                            </m:dPr>
+                            <m:e>
+                              <m:sSub>
+                                <m:sSubPr>
+                                  <m:ctrlPr>
+                                    <a:rPr lang="en-US" sz="1500" i="1">
+                                      <a:latin typeface="Cambria Math" panose="02040503050406030204" pitchFamily="18" charset="0"/>
+                                    </a:rPr>
+                                  </m:ctrlPr>
+                                </m:sSubPr>
+                                <m:e>
+                                  <m:r>
+                                    <a:rPr lang="en-US" sz="1500" i="1">
+                                      <a:latin typeface="Cambria Math" panose="02040503050406030204" pitchFamily="18" charset="0"/>
+                                    </a:rPr>
+                                    <m:t>𝜎</m:t>
+                                  </m:r>
+                                </m:e>
+                                <m:sub>
+                                  <m:r>
+                                    <a:rPr lang="en-US" sz="1500" i="1">
+                                      <a:latin typeface="Cambria Math" panose="02040503050406030204" pitchFamily="18" charset="0"/>
+                                    </a:rPr>
+                                    <m:t>𝑟</m:t>
+                                  </m:r>
+                                </m:sub>
+                              </m:sSub>
+                              <m:r>
+                                <a:rPr lang="en-US" sz="1500" i="1">
+                                  <a:latin typeface="Cambria Math" panose="02040503050406030204" pitchFamily="18" charset="0"/>
+                                </a:rPr>
+                                <m:t>+</m:t>
+                              </m:r>
+                              <m:f>
+                                <m:fPr>
+                                  <m:ctrlPr>
+                                    <a:rPr lang="en-US" sz="1500" i="1">
+                                      <a:latin typeface="Cambria Math" panose="02040503050406030204" pitchFamily="18" charset="0"/>
+                                    </a:rPr>
+                                  </m:ctrlPr>
+                                </m:fPr>
+                                <m:num>
+                                  <m:r>
+                                    <a:rPr lang="en-US" sz="1500" i="1">
+                                      <a:latin typeface="Cambria Math" panose="02040503050406030204" pitchFamily="18" charset="0"/>
+                                    </a:rPr>
+                                    <m:t>1</m:t>
+                                  </m:r>
+                                </m:num>
+                                <m:den>
+                                  <m:r>
+                                    <a:rPr lang="en-US" sz="1500" i="1">
+                                      <a:latin typeface="Cambria Math" panose="02040503050406030204" pitchFamily="18" charset="0"/>
+                                    </a:rPr>
+                                    <m:t>𝑐</m:t>
+                                  </m:r>
+                                  <m:r>
+                                    <m:rPr>
+                                      <m:sty m:val="p"/>
+                                    </m:rPr>
+                                    <a:rPr lang="en-US" sz="1500">
+                                      <a:latin typeface="Cambria Math" panose="02040503050406030204" pitchFamily="18" charset="0"/>
+                                    </a:rPr>
+                                    <m:t>Δ</m:t>
+                                  </m:r>
+                                  <m:r>
+                                    <a:rPr lang="en-US" sz="1500" i="1">
+                                      <a:latin typeface="Cambria Math" panose="02040503050406030204" pitchFamily="18" charset="0"/>
+                                    </a:rPr>
+                                    <m:t>𝑡</m:t>
+                                  </m:r>
+                                </m:den>
+                              </m:f>
+                            </m:e>
+                          </m:d>
+                          <m:sSub>
+                            <m:sSubPr>
+                              <m:ctrlPr>
+                                <a:rPr lang="en-US" sz="1500" b="0" i="1" smtClean="0">
+                                  <a:latin typeface="Cambria Math" panose="02040503050406030204" pitchFamily="18" charset="0"/>
+                                </a:rPr>
+                              </m:ctrlPr>
+                            </m:sSubPr>
+                            <m:e>
+                              <m:r>
+                                <a:rPr lang="en-US" sz="1500" b="0" i="1" smtClean="0">
+                                  <a:latin typeface="Cambria Math" panose="02040503050406030204" pitchFamily="18" charset="0"/>
+                                </a:rPr>
+                                <m:t>𝑑</m:t>
+                              </m:r>
+                            </m:e>
+                            <m:sub>
+                              <m:r>
+                                <a:rPr lang="en-US" sz="1500" b="0" i="1" smtClean="0">
+                                  <a:latin typeface="Cambria Math" panose="02040503050406030204" pitchFamily="18" charset="0"/>
+                                </a:rPr>
+                                <m:t>𝑡𝑎𝑙𝑙𝑦</m:t>
+                              </m:r>
+                            </m:sub>
+                          </m:sSub>
+                          <m:r>
+                            <a:rPr lang="en-US" sz="1500" b="0" i="1" smtClean="0">
+                              <a:latin typeface="Cambria Math" panose="02040503050406030204" pitchFamily="18" charset="0"/>
+                            </a:rPr>
+                            <m:t> </m:t>
+                          </m:r>
+                        </m:sup>
+                      </m:sSup>
+                    </m:oMath>
+                  </m:oMathPara>
+                </a14:m>
+                <a:endParaRPr lang="en-US" sz="1500" dirty="0"/>
+              </a:p>
+              <a:p>
+                <a:pPr marL="342900" lvl="2" indent="0">
+                  <a:buNone/>
+                </a:pPr>
+                <a:r>
+                  <a:rPr lang="en-US" sz="1500" dirty="0"/>
+                  <a:t>2. Transport the particle through the mesh. If the particle is scattered, add a			  contribution to the tally as above</a:t>
+                </a:r>
+              </a:p>
+              <a:p>
+                <a:pPr marL="342900" lvl="2" indent="0">
+                  <a:buNone/>
+                </a:pPr>
+                <a:r>
+                  <a:rPr lang="en-US" sz="1500" dirty="0"/>
+                  <a:t>3. Repeat 1 &amp; 2	for the duration of the timestep or until absorbed. Repeat for all particles</a:t>
+                </a:r>
+              </a:p>
+              <a:p>
+                <a:pPr marL="342900" lvl="2" indent="0">
+                  <a:buNone/>
+                </a:pPr>
+                <a:endParaRPr lang="en-US" sz="500" dirty="0"/>
+              </a:p>
+              <a:p>
+                <a:pPr marL="0" indent="0">
+                  <a:buNone/>
+                </a:pPr>
+                <a:r>
+                  <a:rPr lang="en-US" dirty="0"/>
+                  <a:t>Test Problem</a:t>
+                </a:r>
+              </a:p>
+              <a:p>
+                <a:pPr marL="342900" lvl="2" indent="0">
+                  <a:buNone/>
+                </a:pPr>
+                <a:endParaRPr lang="en-US" dirty="0"/>
+              </a:p>
+              <a:p>
+                <a:pPr marL="342900" lvl="2" indent="0">
+                  <a:buNone/>
+                </a:pPr>
+                <a:endParaRPr lang="en-US" dirty="0"/>
+              </a:p>
+              <a:p>
+                <a:pPr lvl="2"/>
+                <a:endParaRPr lang="en-US" sz="1500" dirty="0"/>
+              </a:p>
+            </p:txBody>
+          </p:sp>
+        </mc:Choice>
+        <mc:Fallback>
+          <p:sp>
+            <p:nvSpPr>
+              <p:cNvPr id="5" name="Content Placeholder 4">
+                <a:extLst>
+                  <a:ext uri="{FF2B5EF4-FFF2-40B4-BE49-F238E27FC236}">
+                    <a16:creationId xmlns:a16="http://schemas.microsoft.com/office/drawing/2014/main" id="{5B61F8F5-7260-8343-A766-8B64C80CF172}"/>
+                  </a:ext>
+                </a:extLst>
+              </p:cNvPr>
+              <p:cNvSpPr>
+                <a:spLocks noGrp="1" noRot="1" noChangeAspect="1" noMove="1" noResize="1" noEditPoints="1" noAdjustHandles="1" noChangeArrowheads="1" noChangeShapeType="1" noTextEdit="1"/>
+              </p:cNvSpPr>
+              <p:nvPr>
+                <p:ph idx="1"/>
+              </p:nvPr>
+            </p:nvSpPr>
+            <p:spPr>
+              <a:xfrm>
+                <a:off x="257908" y="849246"/>
+                <a:ext cx="8628184" cy="2344691"/>
+              </a:xfrm>
+              <a:blipFill>
+                <a:blip r:embed="rId2"/>
+                <a:stretch>
+                  <a:fillRect l="-587" t="-1081" b="-1622"/>
+                </a:stretch>
+              </a:blipFill>
+            </p:spPr>
+            <p:txBody>
+              <a:bodyPr/>
+              <a:lstStyle/>
+              <a:p>
+                <a:r>
+                  <a:rPr lang="en-US">
+                    <a:noFill/>
+                  </a:rPr>
+                  <a:t> </a:t>
+                </a:r>
+              </a:p>
+            </p:txBody>
+          </p:sp>
+        </mc:Fallback>
+      </mc:AlternateContent>
+      <p:pic>
+        <p:nvPicPr>
+          <p:cNvPr id="10" name="Picture 9">
             <a:extLst>
               <a:ext uri="{FF2B5EF4-FFF2-40B4-BE49-F238E27FC236}">
-                <a16:creationId xmlns:a16="http://schemas.microsoft.com/office/drawing/2014/main" id="{5B61F8F5-7260-8343-A766-8B64C80CF172}"/>
+                <a16:creationId xmlns:a16="http://schemas.microsoft.com/office/drawing/2014/main" id="{D42C1C7D-8BFC-E14E-85FF-4AE4F9186D10}"/>
               </a:ext>
             </a:extLst>
           </p:cNvPr>
-          <p:cNvSpPr>
-            <a:spLocks noGrp="1"/>
-          </p:cNvSpPr>
-          <p:nvPr>
-            <p:ph idx="1"/>
-          </p:nvPr>
-        </p:nvSpPr>
-        <p:spPr/>
-        <p:txBody>
-          <a:bodyPr/>
-          <a:lstStyle/>
-          <a:p>
-            <a:endParaRPr lang="en-US" dirty="0"/>
-          </a:p>
-        </p:txBody>
-      </p:sp>
+          <p:cNvPicPr>
+            <a:picLocks noChangeAspect="1"/>
+          </p:cNvPicPr>
+          <p:nvPr/>
+        </p:nvPicPr>
+        <p:blipFill>
+          <a:blip r:embed="rId3"/>
+          <a:stretch>
+            <a:fillRect/>
+          </a:stretch>
+        </p:blipFill>
+        <p:spPr>
+          <a:xfrm>
+            <a:off x="130908" y="3193937"/>
+            <a:ext cx="2881923" cy="2088911"/>
+          </a:xfrm>
+          <a:prstGeom prst="rect">
+            <a:avLst/>
+          </a:prstGeom>
+        </p:spPr>
+      </p:pic>
+      <p:pic>
+        <p:nvPicPr>
+          <p:cNvPr id="12" name="Picture 11">
+            <a:extLst>
+              <a:ext uri="{FF2B5EF4-FFF2-40B4-BE49-F238E27FC236}">
+                <a16:creationId xmlns:a16="http://schemas.microsoft.com/office/drawing/2014/main" id="{5AA58131-C438-3848-9CC9-5AF03E32409F}"/>
+              </a:ext>
+            </a:extLst>
+          </p:cNvPr>
+          <p:cNvPicPr>
+            <a:picLocks noChangeAspect="1"/>
+          </p:cNvPicPr>
+          <p:nvPr/>
+        </p:nvPicPr>
+        <p:blipFill>
+          <a:blip r:embed="rId4"/>
+          <a:stretch>
+            <a:fillRect/>
+          </a:stretch>
+        </p:blipFill>
+        <p:spPr>
+          <a:xfrm>
+            <a:off x="3038068" y="3193937"/>
+            <a:ext cx="2847893" cy="2088911"/>
+          </a:xfrm>
+          <a:prstGeom prst="rect">
+            <a:avLst/>
+          </a:prstGeom>
+        </p:spPr>
+      </p:pic>
+      <p:pic>
+        <p:nvPicPr>
+          <p:cNvPr id="14" name="Picture 13">
+            <a:extLst>
+              <a:ext uri="{FF2B5EF4-FFF2-40B4-BE49-F238E27FC236}">
+                <a16:creationId xmlns:a16="http://schemas.microsoft.com/office/drawing/2014/main" id="{C0E602F3-3493-614B-B8AC-41E821F15CFF}"/>
+              </a:ext>
+            </a:extLst>
+          </p:cNvPr>
+          <p:cNvPicPr>
+            <a:picLocks noChangeAspect="1"/>
+          </p:cNvPicPr>
+          <p:nvPr/>
+        </p:nvPicPr>
+        <p:blipFill>
+          <a:blip r:embed="rId5"/>
+          <a:stretch>
+            <a:fillRect/>
+          </a:stretch>
+        </p:blipFill>
+        <p:spPr>
+          <a:xfrm>
+            <a:off x="5912283" y="3193937"/>
+            <a:ext cx="3104717" cy="2088912"/>
+          </a:xfrm>
+          <a:prstGeom prst="rect">
+            <a:avLst/>
+          </a:prstGeom>
+        </p:spPr>
+      </p:pic>
     </p:spTree>
     <p:extLst>
       <p:ext uri="{BB962C8B-B14F-4D97-AF65-F5344CB8AC3E}">
-        <p14:creationId xmlns:p14="http://schemas.microsoft.com/office/powerpoint/2010/main" val="229612411"/>
+        <p14:creationId xmlns:p14="http://schemas.microsoft.com/office/powerpoint/2010/main" val="56201017"/>
       </p:ext>
     </p:extLst>
   </p:cSld>
@@ -6332,7 +9669,7 @@
           <a:p>
             <a:r>
               <a:rPr lang="en-US" dirty="0"/>
-              <a:t>Acknowledgements</a:t>
+              <a:t>Applications to Supernova Simulations</a:t>
             </a:r>
           </a:p>
         </p:txBody>
@@ -6431,7 +9768,156 @@
     </p:spTree>
     <p:extLst>
       <p:ext uri="{BB962C8B-B14F-4D97-AF65-F5344CB8AC3E}">
-        <p14:creationId xmlns:p14="http://schemas.microsoft.com/office/powerpoint/2010/main" val="2063819716"/>
+        <p14:creationId xmlns:p14="http://schemas.microsoft.com/office/powerpoint/2010/main" val="4112433492"/>
+      </p:ext>
+    </p:extLst>
+  </p:cSld>
+  <p:clrMapOvr>
+    <a:masterClrMapping/>
+  </p:clrMapOvr>
+</p:sld>
+</file>
+
+<file path=ppt/slides/slide9.xml><?xml version="1.0" encoding="utf-8"?>
+<p:sld xmlns:a="http://schemas.openxmlformats.org/drawingml/2006/main" xmlns:r="http://schemas.openxmlformats.org/officeDocument/2006/relationships" xmlns:p="http://schemas.openxmlformats.org/presentationml/2006/main">
+  <p:cSld>
+    <p:spTree>
+      <p:nvGrpSpPr>
+        <p:cNvPr id="1" name=""/>
+        <p:cNvGrpSpPr/>
+        <p:nvPr/>
+      </p:nvGrpSpPr>
+      <p:grpSpPr>
+        <a:xfrm>
+          <a:off x="0" y="0"/>
+          <a:ext cx="0" cy="0"/>
+          <a:chOff x="0" y="0"/>
+          <a:chExt cx="0" cy="0"/>
+        </a:xfrm>
+      </p:grpSpPr>
+      <p:sp>
+        <p:nvSpPr>
+          <p:cNvPr id="2" name="Title 1">
+            <a:extLst>
+              <a:ext uri="{FF2B5EF4-FFF2-40B4-BE49-F238E27FC236}">
+                <a16:creationId xmlns:a16="http://schemas.microsoft.com/office/drawing/2014/main" id="{111F79BD-8853-EC46-B6FA-D39ABD181585}"/>
+              </a:ext>
+            </a:extLst>
+          </p:cNvPr>
+          <p:cNvSpPr>
+            <a:spLocks noGrp="1"/>
+          </p:cNvSpPr>
+          <p:nvPr>
+            <p:ph type="title"/>
+          </p:nvPr>
+        </p:nvSpPr>
+        <p:spPr/>
+        <p:txBody>
+          <a:bodyPr/>
+          <a:lstStyle/>
+          <a:p>
+            <a:r>
+              <a:rPr lang="en-US" dirty="0"/>
+              <a:t>Conclusions</a:t>
+            </a:r>
+          </a:p>
+        </p:txBody>
+      </p:sp>
+      <p:sp>
+        <p:nvSpPr>
+          <p:cNvPr id="3" name="Date Placeholder 2">
+            <a:extLst>
+              <a:ext uri="{FF2B5EF4-FFF2-40B4-BE49-F238E27FC236}">
+                <a16:creationId xmlns:a16="http://schemas.microsoft.com/office/drawing/2014/main" id="{6303EE71-FB58-4F44-B1BF-9C57CB8EF42B}"/>
+              </a:ext>
+            </a:extLst>
+          </p:cNvPr>
+          <p:cNvSpPr>
+            <a:spLocks noGrp="1"/>
+          </p:cNvSpPr>
+          <p:nvPr>
+            <p:ph type="dt" sz="half" idx="10"/>
+          </p:nvPr>
+        </p:nvSpPr>
+        <p:spPr/>
+        <p:txBody>
+          <a:bodyPr/>
+          <a:lstStyle/>
+          <a:p>
+            <a:fld id="{3BB050BD-D5D4-004B-87E1-382D8D28594F}" type="datetime1">
+              <a:rPr lang="en-US" smtClean="0"/>
+              <a:t>8/6/19</a:t>
+            </a:fld>
+            <a:r>
+              <a:rPr lang="en-US"/>
+              <a:t>   |   </a:t>
+            </a:r>
+            <a:fld id="{5D01E7E5-6465-7A46-A26D-BAABC2D34D38}" type="slidenum">
+              <a:rPr lang="en-US" smtClean="0"/>
+              <a:t>9</a:t>
+            </a:fld>
+            <a:endParaRPr lang="en-US" dirty="0"/>
+          </a:p>
+        </p:txBody>
+      </p:sp>
+      <p:sp>
+        <p:nvSpPr>
+          <p:cNvPr id="4" name="Footer Placeholder 3">
+            <a:extLst>
+              <a:ext uri="{FF2B5EF4-FFF2-40B4-BE49-F238E27FC236}">
+                <a16:creationId xmlns:a16="http://schemas.microsoft.com/office/drawing/2014/main" id="{867C4327-6A53-1240-9772-0B5A57D4302D}"/>
+              </a:ext>
+            </a:extLst>
+          </p:cNvPr>
+          <p:cNvSpPr>
+            <a:spLocks noGrp="1"/>
+          </p:cNvSpPr>
+          <p:nvPr>
+            <p:ph type="ftr" sz="quarter" idx="11"/>
+          </p:nvPr>
+        </p:nvSpPr>
+        <p:spPr/>
+        <p:txBody>
+          <a:bodyPr/>
+          <a:lstStyle/>
+          <a:p>
+            <a:r>
+              <a:rPr lang="en-US"/>
+              <a:t>Los Alamos National Laboratory</a:t>
+            </a:r>
+            <a:endParaRPr lang="en-US" dirty="0"/>
+          </a:p>
+        </p:txBody>
+      </p:sp>
+      <p:sp>
+        <p:nvSpPr>
+          <p:cNvPr id="5" name="Content Placeholder 4">
+            <a:extLst>
+              <a:ext uri="{FF2B5EF4-FFF2-40B4-BE49-F238E27FC236}">
+                <a16:creationId xmlns:a16="http://schemas.microsoft.com/office/drawing/2014/main" id="{5B61F8F5-7260-8343-A766-8B64C80CF172}"/>
+              </a:ext>
+            </a:extLst>
+          </p:cNvPr>
+          <p:cNvSpPr>
+            <a:spLocks noGrp="1"/>
+          </p:cNvSpPr>
+          <p:nvPr>
+            <p:ph idx="1"/>
+          </p:nvPr>
+        </p:nvSpPr>
+        <p:spPr/>
+        <p:txBody>
+          <a:bodyPr/>
+          <a:lstStyle/>
+          <a:p>
+            <a:endParaRPr lang="en-US" dirty="0"/>
+          </a:p>
+        </p:txBody>
+      </p:sp>
+    </p:spTree>
+    <p:extLst>
+      <p:ext uri="{BB962C8B-B14F-4D97-AF65-F5344CB8AC3E}">
+        <p14:creationId xmlns:p14="http://schemas.microsoft.com/office/powerpoint/2010/main" val="229612411"/>
       </p:ext>
     </p:extLst>
   </p:cSld>

</xml_diff>

<commit_message>
Finshed the CCS pres, added LA-UR to poster
</commit_message>
<xml_diff>
--- a/Poster and Presentation/Campbell_Scott_Variance_Reduction.pptx
+++ b/Poster and Presentation/Campbell_Scott_Variance_Reduction.pptx
@@ -5,10 +5,10 @@
     <p:sldMasterId id="2147483648" r:id="rId1"/>
   </p:sldMasterIdLst>
   <p:notesMasterIdLst>
-    <p:notesMasterId r:id="rId12"/>
+    <p:notesMasterId r:id="rId13"/>
   </p:notesMasterIdLst>
   <p:handoutMasterIdLst>
-    <p:handoutMasterId r:id="rId13"/>
+    <p:handoutMasterId r:id="rId14"/>
   </p:handoutMasterIdLst>
   <p:sldIdLst>
     <p:sldId id="263" r:id="rId2"/>
@@ -19,8 +19,9 @@
     <p:sldId id="259" r:id="rId7"/>
     <p:sldId id="266" r:id="rId8"/>
     <p:sldId id="260" r:id="rId9"/>
-    <p:sldId id="261" r:id="rId10"/>
-    <p:sldId id="262" r:id="rId11"/>
+    <p:sldId id="267" r:id="rId10"/>
+    <p:sldId id="261" r:id="rId11"/>
+    <p:sldId id="262" r:id="rId12"/>
   </p:sldIdLst>
   <p:sldSz cx="9144000" cy="5715000" type="screen16x10"/>
   <p:notesSz cx="6858000" cy="9144000"/>
@@ -902,14 +903,14 @@
           </a:ln>
           <a:extLst>
             <a:ext uri="{909E8E84-426E-40dd-AFC4-6F175D3DCCD1}">
-              <a14:hiddenFill xmlns="" xmlns:a14="http://schemas.microsoft.com/office/drawing/2010/main">
+              <a14:hiddenFill xmlns:a14="http://schemas.microsoft.com/office/drawing/2010/main" xmlns="">
                 <a:solidFill>
                   <a:srgbClr val="FFFFFF"/>
                 </a:solidFill>
               </a14:hiddenFill>
             </a:ext>
             <a:ext uri="{91240B29-F687-4f45-9708-019B960494DF}">
-              <a14:hiddenLine xmlns="" xmlns:a14="http://schemas.microsoft.com/office/drawing/2010/main" w="9525">
+              <a14:hiddenLine xmlns:a14="http://schemas.microsoft.com/office/drawing/2010/main" xmlns="" w="9525">
                 <a:solidFill>
                   <a:srgbClr val="000000"/>
                 </a:solidFill>
@@ -1251,14 +1252,14 @@
           </a:ln>
           <a:extLst>
             <a:ext uri="{909E8E84-426E-40dd-AFC4-6F175D3DCCD1}">
-              <a14:hiddenFill xmlns="" xmlns:a14="http://schemas.microsoft.com/office/drawing/2010/main">
+              <a14:hiddenFill xmlns:a14="http://schemas.microsoft.com/office/drawing/2010/main" xmlns="">
                 <a:solidFill>
                   <a:srgbClr val="FFFFFF"/>
                 </a:solidFill>
               </a14:hiddenFill>
             </a:ext>
             <a:ext uri="{91240B29-F687-4f45-9708-019B960494DF}">
-              <a14:hiddenLine xmlns="" xmlns:a14="http://schemas.microsoft.com/office/drawing/2010/main" w="9525">
+              <a14:hiddenLine xmlns:a14="http://schemas.microsoft.com/office/drawing/2010/main" xmlns="" w="9525">
                 <a:solidFill>
                   <a:srgbClr val="000000"/>
                 </a:solidFill>
@@ -2486,14 +2487,14 @@
             </a:ln>
             <a:extLst>
               <a:ext uri="{909E8E84-426E-40dd-AFC4-6F175D3DCCD1}">
-                <a14:hiddenFill xmlns="" xmlns:a14="http://schemas.microsoft.com/office/drawing/2010/main">
+                <a14:hiddenFill xmlns:a14="http://schemas.microsoft.com/office/drawing/2010/main" xmlns="">
                   <a:solidFill>
                     <a:srgbClr val="FFFFFF"/>
                   </a:solidFill>
                 </a14:hiddenFill>
               </a:ext>
               <a:ext uri="{91240B29-F687-4f45-9708-019B960494DF}">
-                <a14:hiddenLine xmlns="" xmlns:a14="http://schemas.microsoft.com/office/drawing/2010/main" w="9525">
+                <a14:hiddenLine xmlns:a14="http://schemas.microsoft.com/office/drawing/2010/main" xmlns="" w="9525">
                   <a:solidFill>
                     <a:srgbClr val="000000"/>
                   </a:solidFill>
@@ -5227,7 +5228,7 @@
           <a:p>
             <a:r>
               <a:rPr lang="en-US" dirty="0"/>
-              <a:t>Acknowledgements &amp; References</a:t>
+              <a:t>Conclusions</a:t>
             </a:r>
           </a:p>
         </p:txBody>
@@ -5264,6 +5265,197 @@
             <a:fld id="{5D01E7E5-6465-7A46-A26D-BAABC2D34D38}" type="slidenum">
               <a:rPr lang="en-US" smtClean="0"/>
               <a:t>10</a:t>
+            </a:fld>
+            <a:endParaRPr lang="en-US" dirty="0"/>
+          </a:p>
+        </p:txBody>
+      </p:sp>
+      <p:sp>
+        <p:nvSpPr>
+          <p:cNvPr id="4" name="Footer Placeholder 3">
+            <a:extLst>
+              <a:ext uri="{FF2B5EF4-FFF2-40B4-BE49-F238E27FC236}">
+                <a16:creationId xmlns:a16="http://schemas.microsoft.com/office/drawing/2014/main" id="{867C4327-6A53-1240-9772-0B5A57D4302D}"/>
+              </a:ext>
+            </a:extLst>
+          </p:cNvPr>
+          <p:cNvSpPr>
+            <a:spLocks noGrp="1"/>
+          </p:cNvSpPr>
+          <p:nvPr>
+            <p:ph type="ftr" sz="quarter" idx="11"/>
+          </p:nvPr>
+        </p:nvSpPr>
+        <p:spPr/>
+        <p:txBody>
+          <a:bodyPr/>
+          <a:lstStyle/>
+          <a:p>
+            <a:r>
+              <a:rPr lang="en-US"/>
+              <a:t>Los Alamos National Laboratory</a:t>
+            </a:r>
+            <a:endParaRPr lang="en-US" dirty="0"/>
+          </a:p>
+        </p:txBody>
+      </p:sp>
+      <p:sp>
+        <p:nvSpPr>
+          <p:cNvPr id="5" name="Content Placeholder 4">
+            <a:extLst>
+              <a:ext uri="{FF2B5EF4-FFF2-40B4-BE49-F238E27FC236}">
+                <a16:creationId xmlns:a16="http://schemas.microsoft.com/office/drawing/2014/main" id="{5B61F8F5-7260-8343-A766-8B64C80CF172}"/>
+              </a:ext>
+            </a:extLst>
+          </p:cNvPr>
+          <p:cNvSpPr>
+            <a:spLocks noGrp="1"/>
+          </p:cNvSpPr>
+          <p:nvPr>
+            <p:ph idx="1"/>
+          </p:nvPr>
+        </p:nvSpPr>
+        <p:spPr/>
+        <p:txBody>
+          <a:bodyPr/>
+          <a:lstStyle/>
+          <a:p>
+            <a:pPr algn="just"/>
+            <a:r>
+              <a:rPr lang="en-US" dirty="0">
+                <a:latin typeface="Times"/>
+                <a:cs typeface="Times"/>
+              </a:rPr>
+              <a:t>Our investigation into the use of a response function-based variance reduction method for use in simulations modeling supernova interactions with its circumstellar medium has shown a notable improvement in variance over standard methods. </a:t>
+            </a:r>
+          </a:p>
+          <a:p>
+            <a:pPr algn="just"/>
+            <a:endParaRPr lang="en-US" sz="1000" dirty="0">
+              <a:latin typeface="Times"/>
+              <a:cs typeface="Times"/>
+            </a:endParaRPr>
+          </a:p>
+          <a:p>
+            <a:pPr algn="just"/>
+            <a:r>
+              <a:rPr lang="en-US" dirty="0">
+                <a:latin typeface="Times"/>
+                <a:cs typeface="Times"/>
+              </a:rPr>
+              <a:t>The lack or directionality in the response function likely causes the method to under-predict the flux for a spherical tally. We do expect that the method will preform significantly better for other tally geometries, i.e. planes, as the directionality is more obviously built into the response. </a:t>
+            </a:r>
+          </a:p>
+          <a:p>
+            <a:pPr algn="just"/>
+            <a:endParaRPr lang="en-US" sz="1000" dirty="0">
+              <a:latin typeface="Times"/>
+              <a:cs typeface="Times"/>
+            </a:endParaRPr>
+          </a:p>
+          <a:p>
+            <a:pPr algn="just"/>
+            <a:r>
+              <a:rPr lang="en-US" dirty="0">
+                <a:latin typeface="Times"/>
+                <a:cs typeface="Times"/>
+              </a:rPr>
+              <a:t>Future work will be looking at potentially improving the directionality of the response function and its performance for other tally geometries.</a:t>
+            </a:r>
+            <a:endParaRPr lang="en-US" dirty="0"/>
+          </a:p>
+        </p:txBody>
+      </p:sp>
+    </p:spTree>
+    <p:extLst>
+      <p:ext uri="{BB962C8B-B14F-4D97-AF65-F5344CB8AC3E}">
+        <p14:creationId xmlns:p14="http://schemas.microsoft.com/office/powerpoint/2010/main" val="229612411"/>
+      </p:ext>
+    </p:extLst>
+  </p:cSld>
+  <p:clrMapOvr>
+    <a:masterClrMapping/>
+  </p:clrMapOvr>
+</p:sld>
+</file>
+
+<file path=ppt/slides/slide11.xml><?xml version="1.0" encoding="utf-8"?>
+<p:sld xmlns:a="http://schemas.openxmlformats.org/drawingml/2006/main" xmlns:r="http://schemas.openxmlformats.org/officeDocument/2006/relationships" xmlns:p="http://schemas.openxmlformats.org/presentationml/2006/main">
+  <p:cSld>
+    <p:spTree>
+      <p:nvGrpSpPr>
+        <p:cNvPr id="1" name=""/>
+        <p:cNvGrpSpPr/>
+        <p:nvPr/>
+      </p:nvGrpSpPr>
+      <p:grpSpPr>
+        <a:xfrm>
+          <a:off x="0" y="0"/>
+          <a:ext cx="0" cy="0"/>
+          <a:chOff x="0" y="0"/>
+          <a:chExt cx="0" cy="0"/>
+        </a:xfrm>
+      </p:grpSpPr>
+      <p:sp>
+        <p:nvSpPr>
+          <p:cNvPr id="2" name="Title 1">
+            <a:extLst>
+              <a:ext uri="{FF2B5EF4-FFF2-40B4-BE49-F238E27FC236}">
+                <a16:creationId xmlns:a16="http://schemas.microsoft.com/office/drawing/2014/main" id="{111F79BD-8853-EC46-B6FA-D39ABD181585}"/>
+              </a:ext>
+            </a:extLst>
+          </p:cNvPr>
+          <p:cNvSpPr>
+            <a:spLocks noGrp="1"/>
+          </p:cNvSpPr>
+          <p:nvPr>
+            <p:ph type="title"/>
+          </p:nvPr>
+        </p:nvSpPr>
+        <p:spPr/>
+        <p:txBody>
+          <a:bodyPr/>
+          <a:lstStyle/>
+          <a:p>
+            <a:r>
+              <a:rPr lang="en-US" dirty="0"/>
+              <a:t>Acknowledgements &amp; References</a:t>
+            </a:r>
+          </a:p>
+        </p:txBody>
+      </p:sp>
+      <p:sp>
+        <p:nvSpPr>
+          <p:cNvPr id="3" name="Date Placeholder 2">
+            <a:extLst>
+              <a:ext uri="{FF2B5EF4-FFF2-40B4-BE49-F238E27FC236}">
+                <a16:creationId xmlns:a16="http://schemas.microsoft.com/office/drawing/2014/main" id="{6303EE71-FB58-4F44-B1BF-9C57CB8EF42B}"/>
+              </a:ext>
+            </a:extLst>
+          </p:cNvPr>
+          <p:cNvSpPr>
+            <a:spLocks noGrp="1"/>
+          </p:cNvSpPr>
+          <p:nvPr>
+            <p:ph type="dt" sz="half" idx="10"/>
+          </p:nvPr>
+        </p:nvSpPr>
+        <p:spPr/>
+        <p:txBody>
+          <a:bodyPr/>
+          <a:lstStyle/>
+          <a:p>
+            <a:fld id="{3BB050BD-D5D4-004B-87E1-382D8D28594F}" type="datetime1">
+              <a:rPr lang="en-US" smtClean="0"/>
+              <a:t>8/6/19</a:t>
+            </a:fld>
+            <a:r>
+              <a:rPr lang="en-US"/>
+              <a:t>   |   </a:t>
+            </a:r>
+            <a:fld id="{5D01E7E5-6465-7A46-A26D-BAABC2D34D38}" type="slidenum">
+              <a:rPr lang="en-US" smtClean="0"/>
+              <a:t>11</a:t>
             </a:fld>
             <a:endParaRPr lang="en-US" dirty="0"/>
           </a:p>
@@ -5893,8 +6085,8 @@
           </a:p>
         </p:txBody>
       </p:sp>
-      <mc:AlternateContent xmlns:mc="http://schemas.openxmlformats.org/markup-compatibility/2006">
-        <mc:Choice xmlns:a14="http://schemas.microsoft.com/office/drawing/2010/main" Requires="a14">
+      <mc:AlternateContent xmlns:mc="http://schemas.openxmlformats.org/markup-compatibility/2006" xmlns:a14="http://schemas.microsoft.com/office/drawing/2010/main">
+        <mc:Choice Requires="a14">
           <p:sp>
             <p:nvSpPr>
               <p:cNvPr id="5" name="Content Placeholder 4">
@@ -6846,7 +7038,13 @@
                               <a:rPr lang="en-US" b="0" i="1" dirty="0" smtClean="0">
                                 <a:latin typeface="Cambria Math" panose="02040503050406030204" pitchFamily="18" charset="0"/>
                               </a:rPr>
-                              <m:t>−1</m:t>
+                              <m:t>−</m:t>
+                            </m:r>
+                            <m:r>
+                              <a:rPr lang="en-US" b="0" i="1" dirty="0" smtClean="0">
+                                <a:latin typeface="Cambria Math" panose="02040503050406030204" pitchFamily="18" charset="0"/>
+                              </a:rPr>
+                              <m:t>1</m:t>
                             </m:r>
                           </m:sub>
                           <m:sup>
@@ -7296,7 +7494,7 @@
             </p:txBody>
           </p:sp>
         </mc:Choice>
-        <mc:Fallback>
+        <mc:Fallback xmlns="">
           <p:sp>
             <p:nvSpPr>
               <p:cNvPr id="5" name="Content Placeholder 4">
@@ -7496,8 +7694,8 @@
           </a:p>
         </p:txBody>
       </p:sp>
-      <mc:AlternateContent xmlns:mc="http://schemas.openxmlformats.org/markup-compatibility/2006">
-        <mc:Choice xmlns:a14="http://schemas.microsoft.com/office/drawing/2010/main" Requires="a14">
+      <mc:AlternateContent xmlns:mc="http://schemas.openxmlformats.org/markup-compatibility/2006" xmlns:a14="http://schemas.microsoft.com/office/drawing/2010/main">
+        <mc:Choice Requires="a14">
           <p:sp>
             <p:nvSpPr>
               <p:cNvPr id="5" name="Content Placeholder 4">
@@ -8036,7 +8234,7 @@
             </p:txBody>
           </p:sp>
         </mc:Choice>
-        <mc:Fallback>
+        <mc:Fallback xmlns="">
           <p:sp>
             <p:nvSpPr>
               <p:cNvPr id="5" name="Content Placeholder 4">
@@ -8568,8 +8766,8 @@
           </a:p>
         </p:txBody>
       </p:sp>
-      <mc:AlternateContent xmlns:mc="http://schemas.openxmlformats.org/markup-compatibility/2006">
-        <mc:Choice xmlns:a14="http://schemas.microsoft.com/office/drawing/2010/main" Requires="a14">
+      <mc:AlternateContent xmlns:mc="http://schemas.openxmlformats.org/markup-compatibility/2006" xmlns:a14="http://schemas.microsoft.com/office/drawing/2010/main">
+        <mc:Choice Requires="a14">
           <p:sp>
             <p:nvSpPr>
               <p:cNvPr id="5" name="Content Placeholder 4">
@@ -8868,7 +9066,7 @@
             </p:txBody>
           </p:sp>
         </mc:Choice>
-        <mc:Fallback>
+        <mc:Fallback xmlns="">
           <p:sp>
             <p:nvSpPr>
               <p:cNvPr id="5" name="Content Placeholder 4">
@@ -8942,8 +9140,8 @@
           </a:prstGeom>
         </p:spPr>
       </p:pic>
-      <mc:AlternateContent xmlns:mc="http://schemas.openxmlformats.org/markup-compatibility/2006">
-        <mc:Choice xmlns:a14="http://schemas.microsoft.com/office/drawing/2010/main" Requires="a14">
+      <mc:AlternateContent xmlns:mc="http://schemas.openxmlformats.org/markup-compatibility/2006" xmlns:a14="http://schemas.microsoft.com/office/drawing/2010/main">
+        <mc:Choice Requires="a14">
           <p:sp>
             <p:nvSpPr>
               <p:cNvPr id="8" name="TextBox 7">
@@ -9026,7 +9224,7 @@
             </p:txBody>
           </p:sp>
         </mc:Choice>
-        <mc:Fallback>
+        <mc:Fallback xmlns="">
           <p:sp>
             <p:nvSpPr>
               <p:cNvPr id="8" name="TextBox 7">
@@ -9195,8 +9393,8 @@
           </a:p>
         </p:txBody>
       </p:sp>
-      <mc:AlternateContent xmlns:mc="http://schemas.openxmlformats.org/markup-compatibility/2006">
-        <mc:Choice xmlns:a14="http://schemas.microsoft.com/office/drawing/2010/main" Requires="a14">
+      <mc:AlternateContent xmlns:mc="http://schemas.openxmlformats.org/markup-compatibility/2006" xmlns:a14="http://schemas.microsoft.com/office/drawing/2010/main">
+        <mc:Choice Requires="a14">
           <p:sp>
             <p:nvSpPr>
               <p:cNvPr id="5" name="Content Placeholder 4">
@@ -9482,7 +9680,7 @@
             </p:txBody>
           </p:sp>
         </mc:Choice>
-        <mc:Fallback>
+        <mc:Fallback xmlns="">
           <p:sp>
             <p:nvSpPr>
               <p:cNvPr id="5" name="Content Placeholder 4">
@@ -9669,7 +9867,7 @@
           <a:p>
             <a:r>
               <a:rPr lang="en-US" dirty="0"/>
-              <a:t>Applications to Supernova Simulations</a:t>
+              <a:t>Supernova Applications</a:t>
             </a:r>
           </a:p>
         </p:txBody>
@@ -9740,31 +9938,65 @@
           </a:p>
         </p:txBody>
       </p:sp>
-      <p:sp>
-        <p:nvSpPr>
-          <p:cNvPr id="5" name="Content Placeholder 4">
+      <p:pic>
+        <p:nvPicPr>
+          <p:cNvPr id="7" name="Content Placeholder 6">
             <a:extLst>
               <a:ext uri="{FF2B5EF4-FFF2-40B4-BE49-F238E27FC236}">
-                <a16:creationId xmlns:a16="http://schemas.microsoft.com/office/drawing/2014/main" id="{5B61F8F5-7260-8343-A766-8B64C80CF172}"/>
+                <a16:creationId xmlns:a16="http://schemas.microsoft.com/office/drawing/2014/main" id="{62033545-670C-9F4F-B140-4EF8D64255F6}"/>
               </a:ext>
             </a:extLst>
           </p:cNvPr>
-          <p:cNvSpPr>
-            <a:spLocks noGrp="1"/>
-          </p:cNvSpPr>
+          <p:cNvPicPr>
+            <a:picLocks noGrp="1" noChangeAspect="1"/>
+          </p:cNvPicPr>
           <p:nvPr>
             <p:ph idx="1"/>
           </p:nvPr>
-        </p:nvSpPr>
-        <p:spPr/>
-        <p:txBody>
-          <a:bodyPr/>
-          <a:lstStyle/>
-          <a:p>
-            <a:endParaRPr lang="en-US" dirty="0"/>
-          </a:p>
-        </p:txBody>
-      </p:sp>
+        </p:nvPicPr>
+        <p:blipFill>
+          <a:blip r:embed="rId2"/>
+          <a:stretch>
+            <a:fillRect/>
+          </a:stretch>
+        </p:blipFill>
+        <p:spPr>
+          <a:xfrm>
+            <a:off x="71320" y="1493264"/>
+            <a:ext cx="3689780" cy="3320802"/>
+          </a:xfrm>
+        </p:spPr>
+      </p:pic>
+      <p:pic>
+        <p:nvPicPr>
+          <p:cNvPr id="9" name="Picture 8">
+            <a:extLst>
+              <a:ext uri="{FF2B5EF4-FFF2-40B4-BE49-F238E27FC236}">
+                <a16:creationId xmlns:a16="http://schemas.microsoft.com/office/drawing/2014/main" id="{A8350D8F-14EC-764C-A702-725BC78496C1}"/>
+              </a:ext>
+            </a:extLst>
+          </p:cNvPr>
+          <p:cNvPicPr>
+            <a:picLocks noChangeAspect="1"/>
+          </p:cNvPicPr>
+          <p:nvPr/>
+        </p:nvPicPr>
+        <p:blipFill>
+          <a:blip r:embed="rId3"/>
+          <a:stretch>
+            <a:fillRect/>
+          </a:stretch>
+        </p:blipFill>
+        <p:spPr>
+          <a:xfrm>
+            <a:off x="3761100" y="1539219"/>
+            <a:ext cx="5296260" cy="3228893"/>
+          </a:xfrm>
+          <a:prstGeom prst="rect">
+            <a:avLst/>
+          </a:prstGeom>
+        </p:spPr>
+      </p:pic>
     </p:spTree>
     <p:extLst>
       <p:ext uri="{BB962C8B-B14F-4D97-AF65-F5344CB8AC3E}">
@@ -9818,7 +10050,7 @@
           <a:p>
             <a:r>
               <a:rPr lang="en-US" dirty="0"/>
-              <a:t>Conclusions</a:t>
+              <a:t>Supernova Applications Cont.</a:t>
             </a:r>
           </a:p>
         </p:txBody>
@@ -9889,35 +10121,100 @@
           </a:p>
         </p:txBody>
       </p:sp>
-      <p:sp>
-        <p:nvSpPr>
-          <p:cNvPr id="5" name="Content Placeholder 4">
+      <p:pic>
+        <p:nvPicPr>
+          <p:cNvPr id="13" name="Picture 12">
             <a:extLst>
               <a:ext uri="{FF2B5EF4-FFF2-40B4-BE49-F238E27FC236}">
-                <a16:creationId xmlns:a16="http://schemas.microsoft.com/office/drawing/2014/main" id="{5B61F8F5-7260-8343-A766-8B64C80CF172}"/>
+                <a16:creationId xmlns:a16="http://schemas.microsoft.com/office/drawing/2014/main" id="{1BAF6213-888E-CE46-8856-C6A26DACAE35}"/>
               </a:ext>
             </a:extLst>
           </p:cNvPr>
-          <p:cNvSpPr>
-            <a:spLocks noGrp="1"/>
-          </p:cNvSpPr>
-          <p:nvPr>
-            <p:ph idx="1"/>
-          </p:nvPr>
-        </p:nvSpPr>
-        <p:spPr/>
-        <p:txBody>
-          <a:bodyPr/>
-          <a:lstStyle/>
-          <a:p>
-            <a:endParaRPr lang="en-US" dirty="0"/>
-          </a:p>
-        </p:txBody>
-      </p:sp>
+          <p:cNvPicPr>
+            <a:picLocks noChangeAspect="1"/>
+          </p:cNvPicPr>
+          <p:nvPr/>
+        </p:nvPicPr>
+        <p:blipFill>
+          <a:blip r:embed="rId2"/>
+          <a:stretch>
+            <a:fillRect/>
+          </a:stretch>
+        </p:blipFill>
+        <p:spPr>
+          <a:xfrm>
+            <a:off x="0" y="820912"/>
+            <a:ext cx="2634712" cy="2343611"/>
+          </a:xfrm>
+          <a:prstGeom prst="rect">
+            <a:avLst/>
+          </a:prstGeom>
+        </p:spPr>
+      </p:pic>
+      <p:pic>
+        <p:nvPicPr>
+          <p:cNvPr id="15" name="Picture 14">
+            <a:extLst>
+              <a:ext uri="{FF2B5EF4-FFF2-40B4-BE49-F238E27FC236}">
+                <a16:creationId xmlns:a16="http://schemas.microsoft.com/office/drawing/2014/main" id="{E26F7290-370D-8441-A0CE-631B87AB25E2}"/>
+              </a:ext>
+            </a:extLst>
+          </p:cNvPr>
+          <p:cNvPicPr>
+            <a:picLocks noChangeAspect="1"/>
+          </p:cNvPicPr>
+          <p:nvPr/>
+        </p:nvPicPr>
+        <p:blipFill>
+          <a:blip r:embed="rId3"/>
+          <a:stretch>
+            <a:fillRect/>
+          </a:stretch>
+        </p:blipFill>
+        <p:spPr>
+          <a:xfrm>
+            <a:off x="6350" y="3066236"/>
+            <a:ext cx="2634712" cy="2343612"/>
+          </a:xfrm>
+          <a:prstGeom prst="rect">
+            <a:avLst/>
+          </a:prstGeom>
+        </p:spPr>
+      </p:pic>
+      <p:pic>
+        <p:nvPicPr>
+          <p:cNvPr id="17" name="Picture 16">
+            <a:extLst>
+              <a:ext uri="{FF2B5EF4-FFF2-40B4-BE49-F238E27FC236}">
+                <a16:creationId xmlns:a16="http://schemas.microsoft.com/office/drawing/2014/main" id="{FA0853A7-E97D-CF4C-991E-0FB56BE0AB0A}"/>
+              </a:ext>
+            </a:extLst>
+          </p:cNvPr>
+          <p:cNvPicPr>
+            <a:picLocks noChangeAspect="1"/>
+          </p:cNvPicPr>
+          <p:nvPr/>
+        </p:nvPicPr>
+        <p:blipFill>
+          <a:blip r:embed="rId4"/>
+          <a:stretch>
+            <a:fillRect/>
+          </a:stretch>
+        </p:blipFill>
+        <p:spPr>
+          <a:xfrm>
+            <a:off x="2758274" y="1141283"/>
+            <a:ext cx="6116675" cy="3948193"/>
+          </a:xfrm>
+          <a:prstGeom prst="rect">
+            <a:avLst/>
+          </a:prstGeom>
+        </p:spPr>
+      </p:pic>
     </p:spTree>
     <p:extLst>
       <p:ext uri="{BB962C8B-B14F-4D97-AF65-F5344CB8AC3E}">
-        <p14:creationId xmlns:p14="http://schemas.microsoft.com/office/powerpoint/2010/main" val="229612411"/>
+        <p14:creationId xmlns:p14="http://schemas.microsoft.com/office/powerpoint/2010/main" val="2399619968"/>
       </p:ext>
     </p:extLst>
   </p:cSld>

</xml_diff>

<commit_message>
Updaed the CCS Presentation
</commit_message>
<xml_diff>
--- a/Poster and Presentation/Campbell_Scott_Variance_Reduction.pptx
+++ b/Poster and Presentation/Campbell_Scott_Variance_Reduction.pptx
@@ -5,10 +5,10 @@
     <p:sldMasterId id="2147483648" r:id="rId1"/>
   </p:sldMasterIdLst>
   <p:notesMasterIdLst>
-    <p:notesMasterId r:id="rId13"/>
+    <p:notesMasterId r:id="rId14"/>
   </p:notesMasterIdLst>
   <p:handoutMasterIdLst>
-    <p:handoutMasterId r:id="rId14"/>
+    <p:handoutMasterId r:id="rId15"/>
   </p:handoutMasterIdLst>
   <p:sldIdLst>
     <p:sldId id="263" r:id="rId2"/>
@@ -20,8 +20,9 @@
     <p:sldId id="266" r:id="rId8"/>
     <p:sldId id="260" r:id="rId9"/>
     <p:sldId id="267" r:id="rId10"/>
-    <p:sldId id="261" r:id="rId11"/>
-    <p:sldId id="262" r:id="rId12"/>
+    <p:sldId id="268" r:id="rId11"/>
+    <p:sldId id="261" r:id="rId12"/>
+    <p:sldId id="262" r:id="rId13"/>
   </p:sldIdLst>
   <p:sldSz cx="9144000" cy="5715000" type="screen16x10"/>
   <p:notesSz cx="6858000" cy="9144000"/>
@@ -221,7 +222,7 @@
           <a:p>
             <a:fld id="{2BFC5B56-155A-8A4F-A200-15510EAC000D}" type="datetime1">
               <a:rPr lang="en-US" smtClean="0"/>
-              <a:t>8/6/19</a:t>
+              <a:t>8/9/19</a:t>
             </a:fld>
             <a:endParaRPr lang="en-US"/>
           </a:p>
@@ -390,7 +391,7 @@
           <a:p>
             <a:fld id="{420232FE-02A3-6D41-B422-B15757ACBFED}" type="datetime1">
               <a:rPr lang="en-US" smtClean="0"/>
-              <a:t>8/6/19</a:t>
+              <a:t>8/9/19</a:t>
             </a:fld>
             <a:endParaRPr lang="en-US"/>
           </a:p>
@@ -903,14 +904,14 @@
           </a:ln>
           <a:extLst>
             <a:ext uri="{909E8E84-426E-40dd-AFC4-6F175D3DCCD1}">
-              <a14:hiddenFill xmlns:a14="http://schemas.microsoft.com/office/drawing/2010/main" xmlns="">
+              <a14:hiddenFill xmlns="" xmlns:a14="http://schemas.microsoft.com/office/drawing/2010/main">
                 <a:solidFill>
                   <a:srgbClr val="FFFFFF"/>
                 </a:solidFill>
               </a14:hiddenFill>
             </a:ext>
             <a:ext uri="{91240B29-F687-4f45-9708-019B960494DF}">
-              <a14:hiddenLine xmlns:a14="http://schemas.microsoft.com/office/drawing/2010/main" xmlns="" w="9525">
+              <a14:hiddenLine xmlns="" xmlns:a14="http://schemas.microsoft.com/office/drawing/2010/main" w="9525">
                 <a:solidFill>
                   <a:srgbClr val="000000"/>
                 </a:solidFill>
@@ -1252,14 +1253,14 @@
           </a:ln>
           <a:extLst>
             <a:ext uri="{909E8E84-426E-40dd-AFC4-6F175D3DCCD1}">
-              <a14:hiddenFill xmlns:a14="http://schemas.microsoft.com/office/drawing/2010/main" xmlns="">
+              <a14:hiddenFill xmlns="" xmlns:a14="http://schemas.microsoft.com/office/drawing/2010/main">
                 <a:solidFill>
                   <a:srgbClr val="FFFFFF"/>
                 </a:solidFill>
               </a14:hiddenFill>
             </a:ext>
             <a:ext uri="{91240B29-F687-4f45-9708-019B960494DF}">
-              <a14:hiddenLine xmlns:a14="http://schemas.microsoft.com/office/drawing/2010/main" xmlns="" w="9525">
+              <a14:hiddenLine xmlns="" xmlns:a14="http://schemas.microsoft.com/office/drawing/2010/main" w="9525">
                 <a:solidFill>
                   <a:srgbClr val="000000"/>
                 </a:solidFill>
@@ -2487,14 +2488,14 @@
             </a:ln>
             <a:extLst>
               <a:ext uri="{909E8E84-426E-40dd-AFC4-6F175D3DCCD1}">
-                <a14:hiddenFill xmlns:a14="http://schemas.microsoft.com/office/drawing/2010/main" xmlns="">
+                <a14:hiddenFill xmlns="" xmlns:a14="http://schemas.microsoft.com/office/drawing/2010/main">
                   <a:solidFill>
                     <a:srgbClr val="FFFFFF"/>
                   </a:solidFill>
                 </a14:hiddenFill>
               </a:ext>
               <a:ext uri="{91240B29-F687-4f45-9708-019B960494DF}">
-                <a14:hiddenLine xmlns:a14="http://schemas.microsoft.com/office/drawing/2010/main" xmlns="" w="9525">
+                <a14:hiddenLine xmlns="" xmlns:a14="http://schemas.microsoft.com/office/drawing/2010/main" w="9525">
                   <a:solidFill>
                     <a:srgbClr val="000000"/>
                   </a:solidFill>
@@ -2831,7 +2832,7 @@
           <a:p>
             <a:fld id="{FDFC695E-3847-284B-804A-F0C0441E204C}" type="datetime1">
               <a:rPr lang="en-US" smtClean="0"/>
-              <a:t>8/6/19</a:t>
+              <a:t>8/9/19</a:t>
             </a:fld>
             <a:r>
               <a:rPr lang="en-US" dirty="0"/>
@@ -3200,7 +3201,7 @@
           <a:p>
             <a:fld id="{D3CA6442-326F-BF43-9512-C754596C1A34}" type="datetime1">
               <a:rPr lang="en-US" smtClean="0"/>
-              <a:t>8/6/19</a:t>
+              <a:t>8/9/19</a:t>
             </a:fld>
             <a:r>
               <a:rPr lang="en-US"/>
@@ -3355,7 +3356,7 @@
           <a:p>
             <a:fld id="{3BB050BD-D5D4-004B-87E1-382D8D28594F}" type="datetime1">
               <a:rPr lang="en-US" smtClean="0"/>
-              <a:t>8/6/19</a:t>
+              <a:t>8/9/19</a:t>
             </a:fld>
             <a:r>
               <a:rPr lang="en-US" dirty="0"/>
@@ -3567,7 +3568,7 @@
           <a:p>
             <a:fld id="{E497D45A-E2C2-5444-8727-94AA467EBF1A}" type="datetime1">
               <a:rPr lang="en-US" smtClean="0"/>
-              <a:t>8/6/19</a:t>
+              <a:t>8/9/19</a:t>
             </a:fld>
             <a:r>
               <a:rPr lang="en-US"/>
@@ -3764,7 +3765,7 @@
           <a:p>
             <a:fld id="{3BCD5A60-AEBD-CD41-AE13-C139EF5F076B}" type="datetime1">
               <a:rPr lang="en-US" smtClean="0"/>
-              <a:t>8/6/19</a:t>
+              <a:t>8/9/19</a:t>
             </a:fld>
             <a:r>
               <a:rPr lang="en-US"/>
@@ -4488,7 +4489,7 @@
             <a:fld id="{33415E80-817E-41B3-A1DB-15C0B125CF72}" type="datetime1">
               <a:rPr lang="en-US" smtClean="0"/>
               <a:pPr/>
-              <a:t>8/6/19</a:t>
+              <a:t>8/9/19</a:t>
             </a:fld>
             <a:r>
               <a:rPr lang="en-US" dirty="0"/>
@@ -5228,7 +5229,7 @@
           <a:p>
             <a:r>
               <a:rPr lang="en-US" dirty="0"/>
-              <a:t>Conclusions</a:t>
+              <a:t>Supernova Applications Cont.</a:t>
             </a:r>
           </a:p>
         </p:txBody>
@@ -5256,7 +5257,7 @@
           <a:p>
             <a:fld id="{3BB050BD-D5D4-004B-87E1-382D8D28594F}" type="datetime1">
               <a:rPr lang="en-US" smtClean="0"/>
-              <a:t>8/6/19</a:t>
+              <a:t>8/9/19</a:t>
             </a:fld>
             <a:r>
               <a:rPr lang="en-US"/>
@@ -5299,77 +5300,70 @@
           </a:p>
         </p:txBody>
       </p:sp>
-      <p:sp>
-        <p:nvSpPr>
-          <p:cNvPr id="5" name="Content Placeholder 4">
+      <p:pic>
+        <p:nvPicPr>
+          <p:cNvPr id="6" name="Picture 5">
             <a:extLst>
               <a:ext uri="{FF2B5EF4-FFF2-40B4-BE49-F238E27FC236}">
-                <a16:creationId xmlns:a16="http://schemas.microsoft.com/office/drawing/2014/main" id="{5B61F8F5-7260-8343-A766-8B64C80CF172}"/>
+                <a16:creationId xmlns:a16="http://schemas.microsoft.com/office/drawing/2014/main" id="{1B5F6D8C-ECD0-5443-840E-3228CF87649C}"/>
               </a:ext>
             </a:extLst>
           </p:cNvPr>
-          <p:cNvSpPr>
-            <a:spLocks noGrp="1"/>
-          </p:cNvSpPr>
-          <p:nvPr>
-            <p:ph idx="1"/>
-          </p:nvPr>
-        </p:nvSpPr>
-        <p:spPr/>
-        <p:txBody>
-          <a:bodyPr/>
-          <a:lstStyle/>
-          <a:p>
-            <a:pPr algn="just"/>
-            <a:r>
-              <a:rPr lang="en-US" dirty="0">
-                <a:latin typeface="Times"/>
-                <a:cs typeface="Times"/>
-              </a:rPr>
-              <a:t>Our investigation into the use of a response function-based variance reduction method for use in simulations modeling supernova interactions with its circumstellar medium has shown a notable improvement in variance over standard methods. </a:t>
-            </a:r>
-          </a:p>
-          <a:p>
-            <a:pPr algn="just"/>
-            <a:endParaRPr lang="en-US" sz="1000" dirty="0">
-              <a:latin typeface="Times"/>
-              <a:cs typeface="Times"/>
-            </a:endParaRPr>
-          </a:p>
-          <a:p>
-            <a:pPr algn="just"/>
-            <a:r>
-              <a:rPr lang="en-US" dirty="0">
-                <a:latin typeface="Times"/>
-                <a:cs typeface="Times"/>
-              </a:rPr>
-              <a:t>The lack or directionality in the response function likely causes the method to under-predict the flux for a spherical tally. We do expect that the method will preform significantly better for other tally geometries, i.e. planes, as the directionality is more obviously built into the response. </a:t>
-            </a:r>
-          </a:p>
-          <a:p>
-            <a:pPr algn="just"/>
-            <a:endParaRPr lang="en-US" sz="1000" dirty="0">
-              <a:latin typeface="Times"/>
-              <a:cs typeface="Times"/>
-            </a:endParaRPr>
-          </a:p>
-          <a:p>
-            <a:pPr algn="just"/>
-            <a:r>
-              <a:rPr lang="en-US" dirty="0">
-                <a:latin typeface="Times"/>
-                <a:cs typeface="Times"/>
-              </a:rPr>
-              <a:t>Future work will be looking at potentially improving the directionality of the response function and its performance for other tally geometries.</a:t>
-            </a:r>
-            <a:endParaRPr lang="en-US" dirty="0"/>
-          </a:p>
-        </p:txBody>
-      </p:sp>
+          <p:cNvPicPr>
+            <a:picLocks noChangeAspect="1"/>
+          </p:cNvPicPr>
+          <p:nvPr/>
+        </p:nvPicPr>
+        <p:blipFill>
+          <a:blip r:embed="rId2"/>
+          <a:stretch>
+            <a:fillRect/>
+          </a:stretch>
+        </p:blipFill>
+        <p:spPr>
+          <a:xfrm>
+            <a:off x="102354" y="1719618"/>
+            <a:ext cx="4654063" cy="2904604"/>
+          </a:xfrm>
+          <a:prstGeom prst="rect">
+            <a:avLst/>
+          </a:prstGeom>
+        </p:spPr>
+      </p:pic>
+      <p:pic>
+        <p:nvPicPr>
+          <p:cNvPr id="10" name="Picture 9">
+            <a:extLst>
+              <a:ext uri="{FF2B5EF4-FFF2-40B4-BE49-F238E27FC236}">
+                <a16:creationId xmlns:a16="http://schemas.microsoft.com/office/drawing/2014/main" id="{1ADECDC6-730E-1A40-8DA5-DAD5993E45ED}"/>
+              </a:ext>
+            </a:extLst>
+          </p:cNvPr>
+          <p:cNvPicPr>
+            <a:picLocks noChangeAspect="1"/>
+          </p:cNvPicPr>
+          <p:nvPr/>
+        </p:nvPicPr>
+        <p:blipFill>
+          <a:blip r:embed="rId3"/>
+          <a:stretch>
+            <a:fillRect/>
+          </a:stretch>
+        </p:blipFill>
+        <p:spPr>
+          <a:xfrm>
+            <a:off x="4809685" y="1719618"/>
+            <a:ext cx="4201154" cy="2906744"/>
+          </a:xfrm>
+          <a:prstGeom prst="rect">
+            <a:avLst/>
+          </a:prstGeom>
+        </p:spPr>
+      </p:pic>
     </p:spTree>
     <p:extLst>
       <p:ext uri="{BB962C8B-B14F-4D97-AF65-F5344CB8AC3E}">
-        <p14:creationId xmlns:p14="http://schemas.microsoft.com/office/powerpoint/2010/main" val="229612411"/>
+        <p14:creationId xmlns:p14="http://schemas.microsoft.com/office/powerpoint/2010/main" val="3980914567"/>
       </p:ext>
     </p:extLst>
   </p:cSld>
@@ -5419,7 +5413,7 @@
           <a:p>
             <a:r>
               <a:rPr lang="en-US" dirty="0"/>
-              <a:t>Acknowledgements &amp; References</a:t>
+              <a:t>Conclusions</a:t>
             </a:r>
           </a:p>
         </p:txBody>
@@ -5447,7 +5441,7 @@
           <a:p>
             <a:fld id="{3BB050BD-D5D4-004B-87E1-382D8D28594F}" type="datetime1">
               <a:rPr lang="en-US" smtClean="0"/>
-              <a:t>8/6/19</a:t>
+              <a:t>8/9/19</a:t>
             </a:fld>
             <a:r>
               <a:rPr lang="en-US"/>
@@ -5456,6 +5450,197 @@
             <a:fld id="{5D01E7E5-6465-7A46-A26D-BAABC2D34D38}" type="slidenum">
               <a:rPr lang="en-US" smtClean="0"/>
               <a:t>11</a:t>
+            </a:fld>
+            <a:endParaRPr lang="en-US" dirty="0"/>
+          </a:p>
+        </p:txBody>
+      </p:sp>
+      <p:sp>
+        <p:nvSpPr>
+          <p:cNvPr id="4" name="Footer Placeholder 3">
+            <a:extLst>
+              <a:ext uri="{FF2B5EF4-FFF2-40B4-BE49-F238E27FC236}">
+                <a16:creationId xmlns:a16="http://schemas.microsoft.com/office/drawing/2014/main" id="{867C4327-6A53-1240-9772-0B5A57D4302D}"/>
+              </a:ext>
+            </a:extLst>
+          </p:cNvPr>
+          <p:cNvSpPr>
+            <a:spLocks noGrp="1"/>
+          </p:cNvSpPr>
+          <p:nvPr>
+            <p:ph type="ftr" sz="quarter" idx="11"/>
+          </p:nvPr>
+        </p:nvSpPr>
+        <p:spPr/>
+        <p:txBody>
+          <a:bodyPr/>
+          <a:lstStyle/>
+          <a:p>
+            <a:r>
+              <a:rPr lang="en-US"/>
+              <a:t>Los Alamos National Laboratory</a:t>
+            </a:r>
+            <a:endParaRPr lang="en-US" dirty="0"/>
+          </a:p>
+        </p:txBody>
+      </p:sp>
+      <p:sp>
+        <p:nvSpPr>
+          <p:cNvPr id="5" name="Content Placeholder 4">
+            <a:extLst>
+              <a:ext uri="{FF2B5EF4-FFF2-40B4-BE49-F238E27FC236}">
+                <a16:creationId xmlns:a16="http://schemas.microsoft.com/office/drawing/2014/main" id="{5B61F8F5-7260-8343-A766-8B64C80CF172}"/>
+              </a:ext>
+            </a:extLst>
+          </p:cNvPr>
+          <p:cNvSpPr>
+            <a:spLocks noGrp="1"/>
+          </p:cNvSpPr>
+          <p:nvPr>
+            <p:ph idx="1"/>
+          </p:nvPr>
+        </p:nvSpPr>
+        <p:spPr/>
+        <p:txBody>
+          <a:bodyPr/>
+          <a:lstStyle/>
+          <a:p>
+            <a:pPr algn="just"/>
+            <a:r>
+              <a:rPr lang="en-US" dirty="0">
+                <a:latin typeface="Times"/>
+                <a:cs typeface="Times"/>
+              </a:rPr>
+              <a:t>Our investigation into the use of a response function-based variance reduction method for use in simulations modeling supernova interactions with its circumstellar medium has shown a notable improvement in variance over standard methods. </a:t>
+            </a:r>
+          </a:p>
+          <a:p>
+            <a:pPr algn="just"/>
+            <a:endParaRPr lang="en-US" sz="1000" dirty="0">
+              <a:latin typeface="Times"/>
+              <a:cs typeface="Times"/>
+            </a:endParaRPr>
+          </a:p>
+          <a:p>
+            <a:pPr algn="just"/>
+            <a:r>
+              <a:rPr lang="en-US" dirty="0">
+                <a:latin typeface="Times"/>
+                <a:cs typeface="Times"/>
+              </a:rPr>
+              <a:t>The lack or directionality in the response function likely causes the method to under-predict the flux for a spherical tally. We do expect that the method will preform significantly better for other tally geometries, i.e. planes, as the directionality is more obviously built into the response. </a:t>
+            </a:r>
+          </a:p>
+          <a:p>
+            <a:pPr algn="just"/>
+            <a:endParaRPr lang="en-US" sz="1000" dirty="0">
+              <a:latin typeface="Times"/>
+              <a:cs typeface="Times"/>
+            </a:endParaRPr>
+          </a:p>
+          <a:p>
+            <a:pPr algn="just"/>
+            <a:r>
+              <a:rPr lang="en-US" dirty="0">
+                <a:latin typeface="Times"/>
+                <a:cs typeface="Times"/>
+              </a:rPr>
+              <a:t>Future work will be looking at potentially improving the directionality of the response function and its performance for other tally geometries.</a:t>
+            </a:r>
+            <a:endParaRPr lang="en-US" dirty="0"/>
+          </a:p>
+        </p:txBody>
+      </p:sp>
+    </p:spTree>
+    <p:extLst>
+      <p:ext uri="{BB962C8B-B14F-4D97-AF65-F5344CB8AC3E}">
+        <p14:creationId xmlns:p14="http://schemas.microsoft.com/office/powerpoint/2010/main" val="229612411"/>
+      </p:ext>
+    </p:extLst>
+  </p:cSld>
+  <p:clrMapOvr>
+    <a:masterClrMapping/>
+  </p:clrMapOvr>
+</p:sld>
+</file>
+
+<file path=ppt/slides/slide12.xml><?xml version="1.0" encoding="utf-8"?>
+<p:sld xmlns:a="http://schemas.openxmlformats.org/drawingml/2006/main" xmlns:r="http://schemas.openxmlformats.org/officeDocument/2006/relationships" xmlns:p="http://schemas.openxmlformats.org/presentationml/2006/main">
+  <p:cSld>
+    <p:spTree>
+      <p:nvGrpSpPr>
+        <p:cNvPr id="1" name=""/>
+        <p:cNvGrpSpPr/>
+        <p:nvPr/>
+      </p:nvGrpSpPr>
+      <p:grpSpPr>
+        <a:xfrm>
+          <a:off x="0" y="0"/>
+          <a:ext cx="0" cy="0"/>
+          <a:chOff x="0" y="0"/>
+          <a:chExt cx="0" cy="0"/>
+        </a:xfrm>
+      </p:grpSpPr>
+      <p:sp>
+        <p:nvSpPr>
+          <p:cNvPr id="2" name="Title 1">
+            <a:extLst>
+              <a:ext uri="{FF2B5EF4-FFF2-40B4-BE49-F238E27FC236}">
+                <a16:creationId xmlns:a16="http://schemas.microsoft.com/office/drawing/2014/main" id="{111F79BD-8853-EC46-B6FA-D39ABD181585}"/>
+              </a:ext>
+            </a:extLst>
+          </p:cNvPr>
+          <p:cNvSpPr>
+            <a:spLocks noGrp="1"/>
+          </p:cNvSpPr>
+          <p:nvPr>
+            <p:ph type="title"/>
+          </p:nvPr>
+        </p:nvSpPr>
+        <p:spPr/>
+        <p:txBody>
+          <a:bodyPr/>
+          <a:lstStyle/>
+          <a:p>
+            <a:r>
+              <a:rPr lang="en-US" dirty="0"/>
+              <a:t>Acknowledgements &amp; References</a:t>
+            </a:r>
+          </a:p>
+        </p:txBody>
+      </p:sp>
+      <p:sp>
+        <p:nvSpPr>
+          <p:cNvPr id="3" name="Date Placeholder 2">
+            <a:extLst>
+              <a:ext uri="{FF2B5EF4-FFF2-40B4-BE49-F238E27FC236}">
+                <a16:creationId xmlns:a16="http://schemas.microsoft.com/office/drawing/2014/main" id="{6303EE71-FB58-4F44-B1BF-9C57CB8EF42B}"/>
+              </a:ext>
+            </a:extLst>
+          </p:cNvPr>
+          <p:cNvSpPr>
+            <a:spLocks noGrp="1"/>
+          </p:cNvSpPr>
+          <p:nvPr>
+            <p:ph type="dt" sz="half" idx="10"/>
+          </p:nvPr>
+        </p:nvSpPr>
+        <p:spPr/>
+        <p:txBody>
+          <a:bodyPr/>
+          <a:lstStyle/>
+          <a:p>
+            <a:fld id="{3BB050BD-D5D4-004B-87E1-382D8D28594F}" type="datetime1">
+              <a:rPr lang="en-US" smtClean="0"/>
+              <a:t>8/9/19</a:t>
+            </a:fld>
+            <a:r>
+              <a:rPr lang="en-US"/>
+              <a:t>   |   </a:t>
+            </a:r>
+            <a:fld id="{5D01E7E5-6465-7A46-A26D-BAABC2D34D38}" type="slidenum">
+              <a:rPr lang="en-US" smtClean="0"/>
+              <a:t>12</a:t>
             </a:fld>
             <a:endParaRPr lang="en-US" dirty="0"/>
           </a:p>
@@ -6042,7 +6227,7 @@
           <a:p>
             <a:fld id="{3BB050BD-D5D4-004B-87E1-382D8D28594F}" type="datetime1">
               <a:rPr lang="en-US" smtClean="0"/>
-              <a:t>8/6/19</a:t>
+              <a:t>8/9/19</a:t>
             </a:fld>
             <a:r>
               <a:rPr lang="en-US"/>
@@ -7651,7 +7836,7 @@
           <a:p>
             <a:fld id="{3BB050BD-D5D4-004B-87E1-382D8D28594F}" type="datetime1">
               <a:rPr lang="en-US" smtClean="0"/>
-              <a:t>8/6/19</a:t>
+              <a:t>8/9/19</a:t>
             </a:fld>
             <a:r>
               <a:rPr lang="en-US" dirty="0"/>
@@ -8469,7 +8654,7 @@
           <a:p>
             <a:fld id="{3BB050BD-D5D4-004B-87E1-382D8D28594F}" type="datetime1">
               <a:rPr lang="en-US" smtClean="0"/>
-              <a:t>8/6/19</a:t>
+              <a:t>8/9/19</a:t>
             </a:fld>
             <a:r>
               <a:rPr lang="en-US"/>
@@ -8723,7 +8908,7 @@
           <a:p>
             <a:fld id="{3BB050BD-D5D4-004B-87E1-382D8D28594F}" type="datetime1">
               <a:rPr lang="en-US" smtClean="0"/>
-              <a:t>8/6/19</a:t>
+              <a:t>8/9/19</a:t>
             </a:fld>
             <a:r>
               <a:rPr lang="en-US"/>
@@ -9350,7 +9535,7 @@
           <a:p>
             <a:fld id="{3BB050BD-D5D4-004B-87E1-382D8D28594F}" type="datetime1">
               <a:rPr lang="en-US" smtClean="0"/>
-              <a:t>8/6/19</a:t>
+              <a:t>8/9/19</a:t>
             </a:fld>
             <a:r>
               <a:rPr lang="en-US"/>
@@ -9895,7 +10080,7 @@
           <a:p>
             <a:fld id="{3BB050BD-D5D4-004B-87E1-382D8D28594F}" type="datetime1">
               <a:rPr lang="en-US" smtClean="0"/>
-              <a:t>8/6/19</a:t>
+              <a:t>8/9/19</a:t>
             </a:fld>
             <a:r>
               <a:rPr lang="en-US"/>
@@ -10078,7 +10263,7 @@
           <a:p>
             <a:fld id="{3BB050BD-D5D4-004B-87E1-382D8D28594F}" type="datetime1">
               <a:rPr lang="en-US" smtClean="0"/>
-              <a:t>8/6/19</a:t>
+              <a:t>8/9/19</a:t>
             </a:fld>
             <a:r>
               <a:rPr lang="en-US"/>

</xml_diff>

<commit_message>
Updated the official file
</commit_message>
<xml_diff>
--- a/Poster and Presentation/Campbell_Scott_Variance_Reduction.pptx
+++ b/Poster and Presentation/Campbell_Scott_Variance_Reduction.pptx
@@ -222,7 +222,7 @@
           <a:p>
             <a:fld id="{2BFC5B56-155A-8A4F-A200-15510EAC000D}" type="datetime1">
               <a:rPr lang="en-US" smtClean="0"/>
-              <a:t>8/9/19</a:t>
+              <a:t>8/12/19</a:t>
             </a:fld>
             <a:endParaRPr lang="en-US"/>
           </a:p>
@@ -391,7 +391,7 @@
           <a:p>
             <a:fld id="{420232FE-02A3-6D41-B422-B15757ACBFED}" type="datetime1">
               <a:rPr lang="en-US" smtClean="0"/>
-              <a:t>8/9/19</a:t>
+              <a:t>8/12/19</a:t>
             </a:fld>
             <a:endParaRPr lang="en-US"/>
           </a:p>
@@ -904,14 +904,14 @@
           </a:ln>
           <a:extLst>
             <a:ext uri="{909E8E84-426E-40dd-AFC4-6F175D3DCCD1}">
-              <a14:hiddenFill xmlns="" xmlns:a14="http://schemas.microsoft.com/office/drawing/2010/main">
+              <a14:hiddenFill xmlns:a14="http://schemas.microsoft.com/office/drawing/2010/main" xmlns="">
                 <a:solidFill>
                   <a:srgbClr val="FFFFFF"/>
                 </a:solidFill>
               </a14:hiddenFill>
             </a:ext>
             <a:ext uri="{91240B29-F687-4f45-9708-019B960494DF}">
-              <a14:hiddenLine xmlns="" xmlns:a14="http://schemas.microsoft.com/office/drawing/2010/main" w="9525">
+              <a14:hiddenLine xmlns:a14="http://schemas.microsoft.com/office/drawing/2010/main" xmlns="" w="9525">
                 <a:solidFill>
                   <a:srgbClr val="000000"/>
                 </a:solidFill>
@@ -1253,14 +1253,14 @@
           </a:ln>
           <a:extLst>
             <a:ext uri="{909E8E84-426E-40dd-AFC4-6F175D3DCCD1}">
-              <a14:hiddenFill xmlns="" xmlns:a14="http://schemas.microsoft.com/office/drawing/2010/main">
+              <a14:hiddenFill xmlns:a14="http://schemas.microsoft.com/office/drawing/2010/main" xmlns="">
                 <a:solidFill>
                   <a:srgbClr val="FFFFFF"/>
                 </a:solidFill>
               </a14:hiddenFill>
             </a:ext>
             <a:ext uri="{91240B29-F687-4f45-9708-019B960494DF}">
-              <a14:hiddenLine xmlns="" xmlns:a14="http://schemas.microsoft.com/office/drawing/2010/main" w="9525">
+              <a14:hiddenLine xmlns:a14="http://schemas.microsoft.com/office/drawing/2010/main" xmlns="" w="9525">
                 <a:solidFill>
                   <a:srgbClr val="000000"/>
                 </a:solidFill>
@@ -2488,14 +2488,14 @@
             </a:ln>
             <a:extLst>
               <a:ext uri="{909E8E84-426E-40dd-AFC4-6F175D3DCCD1}">
-                <a14:hiddenFill xmlns="" xmlns:a14="http://schemas.microsoft.com/office/drawing/2010/main">
+                <a14:hiddenFill xmlns:a14="http://schemas.microsoft.com/office/drawing/2010/main" xmlns="">
                   <a:solidFill>
                     <a:srgbClr val="FFFFFF"/>
                   </a:solidFill>
                 </a14:hiddenFill>
               </a:ext>
               <a:ext uri="{91240B29-F687-4f45-9708-019B960494DF}">
-                <a14:hiddenLine xmlns="" xmlns:a14="http://schemas.microsoft.com/office/drawing/2010/main" w="9525">
+                <a14:hiddenLine xmlns:a14="http://schemas.microsoft.com/office/drawing/2010/main" xmlns="" w="9525">
                   <a:solidFill>
                     <a:srgbClr val="000000"/>
                   </a:solidFill>
@@ -2832,7 +2832,7 @@
           <a:p>
             <a:fld id="{FDFC695E-3847-284B-804A-F0C0441E204C}" type="datetime1">
               <a:rPr lang="en-US" smtClean="0"/>
-              <a:t>8/9/19</a:t>
+              <a:t>8/12/19</a:t>
             </a:fld>
             <a:r>
               <a:rPr lang="en-US" dirty="0"/>
@@ -3201,7 +3201,7 @@
           <a:p>
             <a:fld id="{D3CA6442-326F-BF43-9512-C754596C1A34}" type="datetime1">
               <a:rPr lang="en-US" smtClean="0"/>
-              <a:t>8/9/19</a:t>
+              <a:t>8/12/19</a:t>
             </a:fld>
             <a:r>
               <a:rPr lang="en-US"/>
@@ -3356,7 +3356,7 @@
           <a:p>
             <a:fld id="{3BB050BD-D5D4-004B-87E1-382D8D28594F}" type="datetime1">
               <a:rPr lang="en-US" smtClean="0"/>
-              <a:t>8/9/19</a:t>
+              <a:t>8/12/19</a:t>
             </a:fld>
             <a:r>
               <a:rPr lang="en-US" dirty="0"/>
@@ -3568,7 +3568,7 @@
           <a:p>
             <a:fld id="{E497D45A-E2C2-5444-8727-94AA467EBF1A}" type="datetime1">
               <a:rPr lang="en-US" smtClean="0"/>
-              <a:t>8/9/19</a:t>
+              <a:t>8/12/19</a:t>
             </a:fld>
             <a:r>
               <a:rPr lang="en-US"/>
@@ -3765,7 +3765,7 @@
           <a:p>
             <a:fld id="{3BCD5A60-AEBD-CD41-AE13-C139EF5F076B}" type="datetime1">
               <a:rPr lang="en-US" smtClean="0"/>
-              <a:t>8/9/19</a:t>
+              <a:t>8/12/19</a:t>
             </a:fld>
             <a:r>
               <a:rPr lang="en-US"/>
@@ -4489,7 +4489,7 @@
             <a:fld id="{33415E80-817E-41B3-A1DB-15C0B125CF72}" type="datetime1">
               <a:rPr lang="en-US" smtClean="0"/>
               <a:pPr/>
-              <a:t>8/9/19</a:t>
+              <a:t>8/12/19</a:t>
             </a:fld>
             <a:r>
               <a:rPr lang="en-US" dirty="0"/>
@@ -5257,7 +5257,7 @@
           <a:p>
             <a:fld id="{3BB050BD-D5D4-004B-87E1-382D8D28594F}" type="datetime1">
               <a:rPr lang="en-US" smtClean="0"/>
-              <a:t>8/9/19</a:t>
+              <a:t>8/12/19</a:t>
             </a:fld>
             <a:r>
               <a:rPr lang="en-US"/>
@@ -5441,7 +5441,7 @@
           <a:p>
             <a:fld id="{3BB050BD-D5D4-004B-87E1-382D8D28594F}" type="datetime1">
               <a:rPr lang="en-US" smtClean="0"/>
-              <a:t>8/9/19</a:t>
+              <a:t>8/12/19</a:t>
             </a:fld>
             <a:r>
               <a:rPr lang="en-US"/>
@@ -5632,7 +5632,7 @@
           <a:p>
             <a:fld id="{3BB050BD-D5D4-004B-87E1-382D8D28594F}" type="datetime1">
               <a:rPr lang="en-US" smtClean="0"/>
-              <a:t>8/9/19</a:t>
+              <a:t>8/12/19</a:t>
             </a:fld>
             <a:r>
               <a:rPr lang="en-US"/>
@@ -5861,7 +5861,10 @@
           <a:bodyPr/>
           <a:lstStyle/>
           <a:p>
-            <a:endParaRPr lang="en-US" dirty="0"/>
+            <a:r>
+              <a:rPr lang="en-US" dirty="0"/>
+              <a:t>LA-UR-19-28106</a:t>
+            </a:r>
           </a:p>
         </p:txBody>
       </p:sp>
@@ -6227,7 +6230,7 @@
           <a:p>
             <a:fld id="{3BB050BD-D5D4-004B-87E1-382D8D28594F}" type="datetime1">
               <a:rPr lang="en-US" smtClean="0"/>
-              <a:t>8/9/19</a:t>
+              <a:t>8/12/19</a:t>
             </a:fld>
             <a:r>
               <a:rPr lang="en-US"/>
@@ -7836,7 +7839,7 @@
           <a:p>
             <a:fld id="{3BB050BD-D5D4-004B-87E1-382D8D28594F}" type="datetime1">
               <a:rPr lang="en-US" smtClean="0"/>
-              <a:t>8/9/19</a:t>
+              <a:t>8/12/19</a:t>
             </a:fld>
             <a:r>
               <a:rPr lang="en-US" dirty="0"/>
@@ -8654,7 +8657,7 @@
           <a:p>
             <a:fld id="{3BB050BD-D5D4-004B-87E1-382D8D28594F}" type="datetime1">
               <a:rPr lang="en-US" smtClean="0"/>
-              <a:t>8/9/19</a:t>
+              <a:t>8/12/19</a:t>
             </a:fld>
             <a:r>
               <a:rPr lang="en-US"/>
@@ -8908,7 +8911,7 @@
           <a:p>
             <a:fld id="{3BB050BD-D5D4-004B-87E1-382D8D28594F}" type="datetime1">
               <a:rPr lang="en-US" smtClean="0"/>
-              <a:t>8/9/19</a:t>
+              <a:t>8/12/19</a:t>
             </a:fld>
             <a:r>
               <a:rPr lang="en-US"/>
@@ -9535,7 +9538,7 @@
           <a:p>
             <a:fld id="{3BB050BD-D5D4-004B-87E1-382D8D28594F}" type="datetime1">
               <a:rPr lang="en-US" smtClean="0"/>
-              <a:t>8/9/19</a:t>
+              <a:t>8/12/19</a:t>
             </a:fld>
             <a:r>
               <a:rPr lang="en-US"/>
@@ -10080,7 +10083,7 @@
           <a:p>
             <a:fld id="{3BB050BD-D5D4-004B-87E1-382D8D28594F}" type="datetime1">
               <a:rPr lang="en-US" smtClean="0"/>
-              <a:t>8/9/19</a:t>
+              <a:t>8/12/19</a:t>
             </a:fld>
             <a:r>
               <a:rPr lang="en-US"/>
@@ -10263,7 +10266,7 @@
           <a:p>
             <a:fld id="{3BB050BD-D5D4-004B-87E1-382D8D28594F}" type="datetime1">
               <a:rPr lang="en-US" smtClean="0"/>
-              <a:t>8/9/19</a:t>
+              <a:t>8/12/19</a:t>
             </a:fld>
             <a:r>
               <a:rPr lang="en-US"/>

</xml_diff>

<commit_message>
Updated files to work with official format
</commit_message>
<xml_diff>
--- a/Poster and Presentation/Campbell_Scott_Variance_Reduction.pptx
+++ b/Poster and Presentation/Campbell_Scott_Variance_Reduction.pptx
@@ -5,10 +5,10 @@
     <p:sldMasterId id="2147483648" r:id="rId1"/>
   </p:sldMasterIdLst>
   <p:notesMasterIdLst>
-    <p:notesMasterId r:id="rId14"/>
+    <p:notesMasterId r:id="rId15"/>
   </p:notesMasterIdLst>
   <p:handoutMasterIdLst>
-    <p:handoutMasterId r:id="rId15"/>
+    <p:handoutMasterId r:id="rId16"/>
   </p:handoutMasterIdLst>
   <p:sldIdLst>
     <p:sldId id="263" r:id="rId2"/>
@@ -21,8 +21,9 @@
     <p:sldId id="260" r:id="rId9"/>
     <p:sldId id="267" r:id="rId10"/>
     <p:sldId id="268" r:id="rId11"/>
-    <p:sldId id="261" r:id="rId12"/>
-    <p:sldId id="262" r:id="rId13"/>
+    <p:sldId id="269" r:id="rId12"/>
+    <p:sldId id="261" r:id="rId13"/>
+    <p:sldId id="262" r:id="rId14"/>
   </p:sldIdLst>
   <p:sldSz cx="9144000" cy="5715000" type="screen16x10"/>
   <p:notesSz cx="6858000" cy="9144000"/>
@@ -222,7 +223,7 @@
           <a:p>
             <a:fld id="{2BFC5B56-155A-8A4F-A200-15510EAC000D}" type="datetime1">
               <a:rPr lang="en-US" smtClean="0"/>
-              <a:t>8/12/19</a:t>
+              <a:t>8/13/19</a:t>
             </a:fld>
             <a:endParaRPr lang="en-US"/>
           </a:p>
@@ -391,7 +392,7 @@
           <a:p>
             <a:fld id="{420232FE-02A3-6D41-B422-B15757ACBFED}" type="datetime1">
               <a:rPr lang="en-US" smtClean="0"/>
-              <a:t>8/12/19</a:t>
+              <a:t>8/13/19</a:t>
             </a:fld>
             <a:endParaRPr lang="en-US"/>
           </a:p>
@@ -660,6 +661,135 @@
     </a:lvl9pPr>
   </p:notesStyle>
 </p:notesMaster>
+</file>
+
+<file path=ppt/notesSlides/notesSlide1.xml><?xml version="1.0" encoding="utf-8"?>
+<p:notes xmlns:a="http://schemas.openxmlformats.org/drawingml/2006/main" xmlns:r="http://schemas.openxmlformats.org/officeDocument/2006/relationships" xmlns:p="http://schemas.openxmlformats.org/presentationml/2006/main">
+  <p:cSld>
+    <p:spTree>
+      <p:nvGrpSpPr>
+        <p:cNvPr id="1" name=""/>
+        <p:cNvGrpSpPr/>
+        <p:nvPr/>
+      </p:nvGrpSpPr>
+      <p:grpSpPr>
+        <a:xfrm>
+          <a:off x="0" y="0"/>
+          <a:ext cx="0" cy="0"/>
+          <a:chOff x="0" y="0"/>
+          <a:chExt cx="0" cy="0"/>
+        </a:xfrm>
+      </p:grpSpPr>
+      <p:sp>
+        <p:nvSpPr>
+          <p:cNvPr id="2" name="Slide Image Placeholder 1"/>
+          <p:cNvSpPr>
+            <a:spLocks noGrp="1" noRot="1" noChangeAspect="1"/>
+          </p:cNvSpPr>
+          <p:nvPr>
+            <p:ph type="sldImg"/>
+          </p:nvPr>
+        </p:nvSpPr>
+        <p:spPr/>
+      </p:sp>
+      <p:sp>
+        <p:nvSpPr>
+          <p:cNvPr id="3" name="Notes Placeholder 2"/>
+          <p:cNvSpPr>
+            <a:spLocks noGrp="1"/>
+          </p:cNvSpPr>
+          <p:nvPr>
+            <p:ph type="body" idx="1"/>
+          </p:nvPr>
+        </p:nvSpPr>
+        <p:spPr/>
+        <p:txBody>
+          <a:bodyPr/>
+          <a:lstStyle/>
+          <a:p>
+            <a:endParaRPr lang="en-US" dirty="0"/>
+          </a:p>
+        </p:txBody>
+      </p:sp>
+      <p:sp>
+        <p:nvSpPr>
+          <p:cNvPr id="4" name="Date Placeholder 3"/>
+          <p:cNvSpPr>
+            <a:spLocks noGrp="1"/>
+          </p:cNvSpPr>
+          <p:nvPr>
+            <p:ph type="dt" idx="1"/>
+          </p:nvPr>
+        </p:nvSpPr>
+        <p:spPr/>
+        <p:txBody>
+          <a:bodyPr/>
+          <a:lstStyle/>
+          <a:p>
+            <a:fld id="{420232FE-02A3-6D41-B422-B15757ACBFED}" type="datetime1">
+              <a:rPr lang="en-US" smtClean="0"/>
+              <a:t>8/13/19</a:t>
+            </a:fld>
+            <a:endParaRPr lang="en-US"/>
+          </a:p>
+        </p:txBody>
+      </p:sp>
+      <p:sp>
+        <p:nvSpPr>
+          <p:cNvPr id="5" name="Footer Placeholder 4"/>
+          <p:cNvSpPr>
+            <a:spLocks noGrp="1"/>
+          </p:cNvSpPr>
+          <p:nvPr>
+            <p:ph type="ftr" sz="quarter" idx="4"/>
+          </p:nvPr>
+        </p:nvSpPr>
+        <p:spPr/>
+        <p:txBody>
+          <a:bodyPr/>
+          <a:lstStyle/>
+          <a:p>
+            <a:r>
+              <a:rPr lang="en-US"/>
+              <a:t>Los Alamos National Laboratory</a:t>
+            </a:r>
+          </a:p>
+        </p:txBody>
+      </p:sp>
+      <p:sp>
+        <p:nvSpPr>
+          <p:cNvPr id="6" name="Slide Number Placeholder 5"/>
+          <p:cNvSpPr>
+            <a:spLocks noGrp="1"/>
+          </p:cNvSpPr>
+          <p:nvPr>
+            <p:ph type="sldNum" sz="quarter" idx="5"/>
+          </p:nvPr>
+        </p:nvSpPr>
+        <p:spPr/>
+        <p:txBody>
+          <a:bodyPr/>
+          <a:lstStyle/>
+          <a:p>
+            <a:fld id="{9B4268CE-33B7-7549-BEF6-7F438D74ABCA}" type="slidenum">
+              <a:rPr lang="en-US" smtClean="0"/>
+              <a:t>6</a:t>
+            </a:fld>
+            <a:endParaRPr lang="en-US"/>
+          </a:p>
+        </p:txBody>
+      </p:sp>
+    </p:spTree>
+    <p:extLst>
+      <p:ext uri="{BB962C8B-B14F-4D97-AF65-F5344CB8AC3E}">
+        <p14:creationId xmlns:p14="http://schemas.microsoft.com/office/powerpoint/2010/main" val="869235801"/>
+      </p:ext>
+    </p:extLst>
+  </p:cSld>
+  <p:clrMapOvr>
+    <a:masterClrMapping/>
+  </p:clrMapOvr>
+</p:notes>
 </file>
 
 <file path=ppt/slideLayouts/slideLayout1.xml><?xml version="1.0" encoding="utf-8"?>
@@ -2832,7 +2962,7 @@
           <a:p>
             <a:fld id="{FDFC695E-3847-284B-804A-F0C0441E204C}" type="datetime1">
               <a:rPr lang="en-US" smtClean="0"/>
-              <a:t>8/12/19</a:t>
+              <a:t>8/13/19</a:t>
             </a:fld>
             <a:r>
               <a:rPr lang="en-US" dirty="0"/>
@@ -3201,7 +3331,7 @@
           <a:p>
             <a:fld id="{D3CA6442-326F-BF43-9512-C754596C1A34}" type="datetime1">
               <a:rPr lang="en-US" smtClean="0"/>
-              <a:t>8/12/19</a:t>
+              <a:t>8/13/19</a:t>
             </a:fld>
             <a:r>
               <a:rPr lang="en-US"/>
@@ -3356,7 +3486,7 @@
           <a:p>
             <a:fld id="{3BB050BD-D5D4-004B-87E1-382D8D28594F}" type="datetime1">
               <a:rPr lang="en-US" smtClean="0"/>
-              <a:t>8/12/19</a:t>
+              <a:t>8/13/19</a:t>
             </a:fld>
             <a:r>
               <a:rPr lang="en-US" dirty="0"/>
@@ -3568,7 +3698,7 @@
           <a:p>
             <a:fld id="{E497D45A-E2C2-5444-8727-94AA467EBF1A}" type="datetime1">
               <a:rPr lang="en-US" smtClean="0"/>
-              <a:t>8/12/19</a:t>
+              <a:t>8/13/19</a:t>
             </a:fld>
             <a:r>
               <a:rPr lang="en-US"/>
@@ -3765,7 +3895,7 @@
           <a:p>
             <a:fld id="{3BCD5A60-AEBD-CD41-AE13-C139EF5F076B}" type="datetime1">
               <a:rPr lang="en-US" smtClean="0"/>
-              <a:t>8/12/19</a:t>
+              <a:t>8/13/19</a:t>
             </a:fld>
             <a:r>
               <a:rPr lang="en-US"/>
@@ -4489,7 +4619,7 @@
             <a:fld id="{33415E80-817E-41B3-A1DB-15C0B125CF72}" type="datetime1">
               <a:rPr lang="en-US" smtClean="0"/>
               <a:pPr/>
-              <a:t>8/12/19</a:t>
+              <a:t>8/13/19</a:t>
             </a:fld>
             <a:r>
               <a:rPr lang="en-US" dirty="0"/>
@@ -5257,7 +5387,7 @@
           <a:p>
             <a:fld id="{3BB050BD-D5D4-004B-87E1-382D8D28594F}" type="datetime1">
               <a:rPr lang="en-US" smtClean="0"/>
-              <a:t>8/12/19</a:t>
+              <a:t>8/13/19</a:t>
             </a:fld>
             <a:r>
               <a:rPr lang="en-US"/>
@@ -5302,10 +5432,10 @@
       </p:sp>
       <p:pic>
         <p:nvPicPr>
-          <p:cNvPr id="6" name="Picture 5">
+          <p:cNvPr id="7" name="Picture 6">
             <a:extLst>
               <a:ext uri="{FF2B5EF4-FFF2-40B4-BE49-F238E27FC236}">
-                <a16:creationId xmlns:a16="http://schemas.microsoft.com/office/drawing/2014/main" id="{1B5F6D8C-ECD0-5443-840E-3228CF87649C}"/>
+                <a16:creationId xmlns:a16="http://schemas.microsoft.com/office/drawing/2014/main" id="{1D22760B-6C89-3B44-952A-710048AC897B}"/>
               </a:ext>
             </a:extLst>
           </p:cNvPr>
@@ -5322,8 +5452,8 @@
         </p:blipFill>
         <p:spPr>
           <a:xfrm>
-            <a:off x="102354" y="1719618"/>
-            <a:ext cx="4654063" cy="2904604"/>
+            <a:off x="104792" y="1723906"/>
+            <a:ext cx="4549913" cy="2904604"/>
           </a:xfrm>
           <a:prstGeom prst="rect">
             <a:avLst/>
@@ -5332,10 +5462,10 @@
       </p:pic>
       <p:pic>
         <p:nvPicPr>
-          <p:cNvPr id="10" name="Picture 9">
+          <p:cNvPr id="9" name="Picture 8">
             <a:extLst>
               <a:ext uri="{FF2B5EF4-FFF2-40B4-BE49-F238E27FC236}">
-                <a16:creationId xmlns:a16="http://schemas.microsoft.com/office/drawing/2014/main" id="{1ADECDC6-730E-1A40-8DA5-DAD5993E45ED}"/>
+                <a16:creationId xmlns:a16="http://schemas.microsoft.com/office/drawing/2014/main" id="{EAADB7AF-825D-724A-AB05-67690F382381}"/>
               </a:ext>
             </a:extLst>
           </p:cNvPr>
@@ -5352,8 +5482,8 @@
         </p:blipFill>
         <p:spPr>
           <a:xfrm>
-            <a:off x="4809685" y="1719618"/>
-            <a:ext cx="4201154" cy="2906744"/>
+            <a:off x="4763191" y="1729190"/>
+            <a:ext cx="4257390" cy="2899319"/>
           </a:xfrm>
           <a:prstGeom prst="rect">
             <a:avLst/>
@@ -5413,7 +5543,7 @@
           <a:p>
             <a:r>
               <a:rPr lang="en-US" dirty="0"/>
-              <a:t>Conclusions</a:t>
+              <a:t>Supernova Applications Cont.</a:t>
             </a:r>
           </a:p>
         </p:txBody>
@@ -5441,7 +5571,7 @@
           <a:p>
             <a:fld id="{3BB050BD-D5D4-004B-87E1-382D8D28594F}" type="datetime1">
               <a:rPr lang="en-US" smtClean="0"/>
-              <a:t>8/12/19</a:t>
+              <a:t>8/13/19</a:t>
             </a:fld>
             <a:r>
               <a:rPr lang="en-US"/>
@@ -5484,77 +5614,40 @@
           </a:p>
         </p:txBody>
       </p:sp>
-      <p:sp>
-        <p:nvSpPr>
-          <p:cNvPr id="5" name="Content Placeholder 4">
+      <p:pic>
+        <p:nvPicPr>
+          <p:cNvPr id="6" name="Picture 5">
             <a:extLst>
               <a:ext uri="{FF2B5EF4-FFF2-40B4-BE49-F238E27FC236}">
-                <a16:creationId xmlns:a16="http://schemas.microsoft.com/office/drawing/2014/main" id="{5B61F8F5-7260-8343-A766-8B64C80CF172}"/>
+                <a16:creationId xmlns:a16="http://schemas.microsoft.com/office/drawing/2014/main" id="{0C3430D6-3E05-9446-BADD-E7B603413E1B}"/>
               </a:ext>
             </a:extLst>
           </p:cNvPr>
-          <p:cNvSpPr>
-            <a:spLocks noGrp="1"/>
-          </p:cNvSpPr>
-          <p:nvPr>
-            <p:ph idx="1"/>
-          </p:nvPr>
-        </p:nvSpPr>
-        <p:spPr/>
-        <p:txBody>
-          <a:bodyPr/>
-          <a:lstStyle/>
-          <a:p>
-            <a:pPr algn="just"/>
-            <a:r>
-              <a:rPr lang="en-US" dirty="0">
-                <a:latin typeface="Times"/>
-                <a:cs typeface="Times"/>
-              </a:rPr>
-              <a:t>Our investigation into the use of a response function-based variance reduction method for use in simulations modeling supernova interactions with its circumstellar medium has shown a notable improvement in variance over standard methods. </a:t>
-            </a:r>
-          </a:p>
-          <a:p>
-            <a:pPr algn="just"/>
-            <a:endParaRPr lang="en-US" sz="1000" dirty="0">
-              <a:latin typeface="Times"/>
-              <a:cs typeface="Times"/>
-            </a:endParaRPr>
-          </a:p>
-          <a:p>
-            <a:pPr algn="just"/>
-            <a:r>
-              <a:rPr lang="en-US" dirty="0">
-                <a:latin typeface="Times"/>
-                <a:cs typeface="Times"/>
-              </a:rPr>
-              <a:t>The lack or directionality in the response function likely causes the method to under-predict the flux for a spherical tally. We do expect that the method will preform significantly better for other tally geometries, i.e. planes, as the directionality is more obviously built into the response. </a:t>
-            </a:r>
-          </a:p>
-          <a:p>
-            <a:pPr algn="just"/>
-            <a:endParaRPr lang="en-US" sz="1000" dirty="0">
-              <a:latin typeface="Times"/>
-              <a:cs typeface="Times"/>
-            </a:endParaRPr>
-          </a:p>
-          <a:p>
-            <a:pPr algn="just"/>
-            <a:r>
-              <a:rPr lang="en-US" dirty="0">
-                <a:latin typeface="Times"/>
-                <a:cs typeface="Times"/>
-              </a:rPr>
-              <a:t>Future work will be looking at potentially improving the directionality of the response function and its performance for other tally geometries.</a:t>
-            </a:r>
-            <a:endParaRPr lang="en-US" dirty="0"/>
-          </a:p>
-        </p:txBody>
-      </p:sp>
+          <p:cNvPicPr>
+            <a:picLocks noChangeAspect="1"/>
+          </p:cNvPicPr>
+          <p:nvPr/>
+        </p:nvPicPr>
+        <p:blipFill>
+          <a:blip r:embed="rId2"/>
+          <a:stretch>
+            <a:fillRect/>
+          </a:stretch>
+        </p:blipFill>
+        <p:spPr>
+          <a:xfrm>
+            <a:off x="1517210" y="950867"/>
+            <a:ext cx="6109580" cy="4329026"/>
+          </a:xfrm>
+          <a:prstGeom prst="rect">
+            <a:avLst/>
+          </a:prstGeom>
+        </p:spPr>
+      </p:pic>
     </p:spTree>
     <p:extLst>
       <p:ext uri="{BB962C8B-B14F-4D97-AF65-F5344CB8AC3E}">
-        <p14:creationId xmlns:p14="http://schemas.microsoft.com/office/powerpoint/2010/main" val="229612411"/>
+        <p14:creationId xmlns:p14="http://schemas.microsoft.com/office/powerpoint/2010/main" val="2774025444"/>
       </p:ext>
     </p:extLst>
   </p:cSld>
@@ -5604,7 +5697,7 @@
           <a:p>
             <a:r>
               <a:rPr lang="en-US" dirty="0"/>
-              <a:t>Acknowledgements &amp; References</a:t>
+              <a:t>Conclusions &amp; Future Work</a:t>
             </a:r>
           </a:p>
         </p:txBody>
@@ -5632,7 +5725,7 @@
           <a:p>
             <a:fld id="{3BB050BD-D5D4-004B-87E1-382D8D28594F}" type="datetime1">
               <a:rPr lang="en-US" smtClean="0"/>
-              <a:t>8/12/19</a:t>
+              <a:t>8/13/19</a:t>
             </a:fld>
             <a:r>
               <a:rPr lang="en-US"/>
@@ -5641,6 +5734,205 @@
             <a:fld id="{5D01E7E5-6465-7A46-A26D-BAABC2D34D38}" type="slidenum">
               <a:rPr lang="en-US" smtClean="0"/>
               <a:t>12</a:t>
+            </a:fld>
+            <a:endParaRPr lang="en-US" dirty="0"/>
+          </a:p>
+        </p:txBody>
+      </p:sp>
+      <p:sp>
+        <p:nvSpPr>
+          <p:cNvPr id="4" name="Footer Placeholder 3">
+            <a:extLst>
+              <a:ext uri="{FF2B5EF4-FFF2-40B4-BE49-F238E27FC236}">
+                <a16:creationId xmlns:a16="http://schemas.microsoft.com/office/drawing/2014/main" id="{867C4327-6A53-1240-9772-0B5A57D4302D}"/>
+              </a:ext>
+            </a:extLst>
+          </p:cNvPr>
+          <p:cNvSpPr>
+            <a:spLocks noGrp="1"/>
+          </p:cNvSpPr>
+          <p:nvPr>
+            <p:ph type="ftr" sz="quarter" idx="11"/>
+          </p:nvPr>
+        </p:nvSpPr>
+        <p:spPr/>
+        <p:txBody>
+          <a:bodyPr/>
+          <a:lstStyle/>
+          <a:p>
+            <a:r>
+              <a:rPr lang="en-US"/>
+              <a:t>Los Alamos National Laboratory</a:t>
+            </a:r>
+            <a:endParaRPr lang="en-US" dirty="0"/>
+          </a:p>
+        </p:txBody>
+      </p:sp>
+      <p:sp>
+        <p:nvSpPr>
+          <p:cNvPr id="5" name="Content Placeholder 4">
+            <a:extLst>
+              <a:ext uri="{FF2B5EF4-FFF2-40B4-BE49-F238E27FC236}">
+                <a16:creationId xmlns:a16="http://schemas.microsoft.com/office/drawing/2014/main" id="{5B61F8F5-7260-8343-A766-8B64C80CF172}"/>
+              </a:ext>
+            </a:extLst>
+          </p:cNvPr>
+          <p:cNvSpPr>
+            <a:spLocks noGrp="1"/>
+          </p:cNvSpPr>
+          <p:nvPr>
+            <p:ph idx="1"/>
+          </p:nvPr>
+        </p:nvSpPr>
+        <p:spPr/>
+        <p:txBody>
+          <a:bodyPr/>
+          <a:lstStyle/>
+          <a:p>
+            <a:r>
+              <a:rPr lang="en-US" dirty="0">
+                <a:cs typeface="Times"/>
+              </a:rPr>
+              <a:t>Our investigation into the use of a response function-based variance reduction method has shown a notable improvement in variance over standard methods. </a:t>
+            </a:r>
+          </a:p>
+          <a:p>
+            <a:endParaRPr lang="en-US" dirty="0">
+              <a:cs typeface="Times"/>
+            </a:endParaRPr>
+          </a:p>
+          <a:p>
+            <a:r>
+              <a:rPr lang="en-US" dirty="0">
+                <a:cs typeface="Times"/>
+              </a:rPr>
+              <a:t>Our method can be applied to astrophysical events such as supernova interactions with its CSM</a:t>
+            </a:r>
+          </a:p>
+          <a:p>
+            <a:endParaRPr lang="en-US" dirty="0">
+              <a:cs typeface="Times"/>
+            </a:endParaRPr>
+          </a:p>
+          <a:p>
+            <a:r>
+              <a:rPr lang="en-US" dirty="0">
+                <a:cs typeface="Times"/>
+              </a:rPr>
+              <a:t>There is a strong link between problem and tally geometry in determining how effective our method will perform</a:t>
+            </a:r>
+          </a:p>
+          <a:p>
+            <a:endParaRPr lang="en-US" sz="1000" dirty="0">
+              <a:cs typeface="Times"/>
+            </a:endParaRPr>
+          </a:p>
+          <a:p>
+            <a:endParaRPr lang="en-US" sz="1000" dirty="0">
+              <a:cs typeface="Times"/>
+            </a:endParaRPr>
+          </a:p>
+          <a:p>
+            <a:r>
+              <a:rPr lang="en-US" dirty="0">
+                <a:cs typeface="Times"/>
+              </a:rPr>
+              <a:t>Future work will be looking at potentially improving the directionality of the response function and its performance for other tally geometries.</a:t>
+            </a:r>
+            <a:endParaRPr lang="en-US" dirty="0"/>
+          </a:p>
+        </p:txBody>
+      </p:sp>
+    </p:spTree>
+    <p:extLst>
+      <p:ext uri="{BB962C8B-B14F-4D97-AF65-F5344CB8AC3E}">
+        <p14:creationId xmlns:p14="http://schemas.microsoft.com/office/powerpoint/2010/main" val="229612411"/>
+      </p:ext>
+    </p:extLst>
+  </p:cSld>
+  <p:clrMapOvr>
+    <a:masterClrMapping/>
+  </p:clrMapOvr>
+</p:sld>
+</file>
+
+<file path=ppt/slides/slide13.xml><?xml version="1.0" encoding="utf-8"?>
+<p:sld xmlns:a="http://schemas.openxmlformats.org/drawingml/2006/main" xmlns:r="http://schemas.openxmlformats.org/officeDocument/2006/relationships" xmlns:p="http://schemas.openxmlformats.org/presentationml/2006/main">
+  <p:cSld>
+    <p:spTree>
+      <p:nvGrpSpPr>
+        <p:cNvPr id="1" name=""/>
+        <p:cNvGrpSpPr/>
+        <p:nvPr/>
+      </p:nvGrpSpPr>
+      <p:grpSpPr>
+        <a:xfrm>
+          <a:off x="0" y="0"/>
+          <a:ext cx="0" cy="0"/>
+          <a:chOff x="0" y="0"/>
+          <a:chExt cx="0" cy="0"/>
+        </a:xfrm>
+      </p:grpSpPr>
+      <p:sp>
+        <p:nvSpPr>
+          <p:cNvPr id="2" name="Title 1">
+            <a:extLst>
+              <a:ext uri="{FF2B5EF4-FFF2-40B4-BE49-F238E27FC236}">
+                <a16:creationId xmlns:a16="http://schemas.microsoft.com/office/drawing/2014/main" id="{111F79BD-8853-EC46-B6FA-D39ABD181585}"/>
+              </a:ext>
+            </a:extLst>
+          </p:cNvPr>
+          <p:cNvSpPr>
+            <a:spLocks noGrp="1"/>
+          </p:cNvSpPr>
+          <p:nvPr>
+            <p:ph type="title"/>
+          </p:nvPr>
+        </p:nvSpPr>
+        <p:spPr/>
+        <p:txBody>
+          <a:bodyPr/>
+          <a:lstStyle/>
+          <a:p>
+            <a:r>
+              <a:rPr lang="en-US" dirty="0"/>
+              <a:t>Acknowledgements &amp; References</a:t>
+            </a:r>
+          </a:p>
+        </p:txBody>
+      </p:sp>
+      <p:sp>
+        <p:nvSpPr>
+          <p:cNvPr id="3" name="Date Placeholder 2">
+            <a:extLst>
+              <a:ext uri="{FF2B5EF4-FFF2-40B4-BE49-F238E27FC236}">
+                <a16:creationId xmlns:a16="http://schemas.microsoft.com/office/drawing/2014/main" id="{6303EE71-FB58-4F44-B1BF-9C57CB8EF42B}"/>
+              </a:ext>
+            </a:extLst>
+          </p:cNvPr>
+          <p:cNvSpPr>
+            <a:spLocks noGrp="1"/>
+          </p:cNvSpPr>
+          <p:nvPr>
+            <p:ph type="dt" sz="half" idx="10"/>
+          </p:nvPr>
+        </p:nvSpPr>
+        <p:spPr/>
+        <p:txBody>
+          <a:bodyPr/>
+          <a:lstStyle/>
+          <a:p>
+            <a:fld id="{3BB050BD-D5D4-004B-87E1-382D8D28594F}" type="datetime1">
+              <a:rPr lang="en-US" smtClean="0"/>
+              <a:t>8/13/19</a:t>
+            </a:fld>
+            <a:r>
+              <a:rPr lang="en-US"/>
+              <a:t>   |   </a:t>
+            </a:r>
+            <a:fld id="{5D01E7E5-6465-7A46-A26D-BAABC2D34D38}" type="slidenum">
+              <a:rPr lang="en-US" smtClean="0"/>
+              <a:t>13</a:t>
             </a:fld>
             <a:endParaRPr lang="en-US" dirty="0"/>
           </a:p>
@@ -5701,6 +5993,9 @@
           <a:bodyPr/>
           <a:lstStyle/>
           <a:p>
+            <a:pPr marL="0" indent="0">
+              <a:buNone/>
+            </a:pPr>
             <a:r>
               <a:rPr lang="en-US" dirty="0"/>
               <a:t>Acknowledgements</a:t>
@@ -5711,6 +6006,13 @@
             <a:r>
               <a:rPr lang="en-US" dirty="0"/>
               <a:t>We would like to thank the XCP Summer Computational Physics Workshop, its directors, and its mentors for the opportunity, time, and mentorship.</a:t>
+            </a:r>
+          </a:p>
+          <a:p>
+            <a:pPr lvl="2"/>
+            <a:r>
+              <a:rPr lang="en-US" dirty="0"/>
+              <a:t>I would like to personally thank Mat Cleveland, Kendra Long, and Ryan Wollaeger for their mentorship and expertise.</a:t>
             </a:r>
           </a:p>
           <a:p>
@@ -5723,15 +6025,6 @@
             <a:pPr marL="0" indent="0">
               <a:buNone/>
             </a:pPr>
-            <a:endParaRPr lang="en-US" dirty="0"/>
-          </a:p>
-          <a:p>
-            <a:pPr marL="0" indent="0">
-              <a:buNone/>
-            </a:pPr>
-            <a:endParaRPr lang="en-US" dirty="0"/>
-          </a:p>
-          <a:p>
             <a:r>
               <a:rPr lang="en-US" dirty="0"/>
               <a:t>References</a:t>
@@ -6230,7 +6523,7 @@
           <a:p>
             <a:fld id="{3BB050BD-D5D4-004B-87E1-382D8D28594F}" type="datetime1">
               <a:rPr lang="en-US" smtClean="0"/>
-              <a:t>8/12/19</a:t>
+              <a:t>8/13/19</a:t>
             </a:fld>
             <a:r>
               <a:rPr lang="en-US"/>
@@ -7624,6 +7917,10 @@
               </a:p>
               <a:p>
                 <a:pPr lvl="2"/>
+                <a:endParaRPr lang="en-US" sz="1000" b="0"/>
+              </a:p>
+              <a:p>
+                <a:pPr lvl="2"/>
                 <a:endParaRPr lang="en-US" sz="1000" b="0" dirty="0"/>
               </a:p>
               <a:p>
@@ -7677,6 +7974,11 @@
                   <a:rPr lang="en-US" dirty="0"/>
                   <a:t>izes the TRT equations – not fully physical</a:t>
                 </a:r>
+              </a:p>
+              <a:p>
+                <a:pPr marL="342900" lvl="2" indent="0">
+                  <a:buNone/>
+                </a:pPr>
                 <a:endParaRPr lang="en-US" b="0" dirty="0"/>
               </a:p>
             </p:txBody>
@@ -7839,7 +8141,7 @@
           <a:p>
             <a:fld id="{3BB050BD-D5D4-004B-87E1-382D8D28594F}" type="datetime1">
               <a:rPr lang="en-US" smtClean="0"/>
-              <a:t>8/12/19</a:t>
+              <a:t>8/13/19</a:t>
             </a:fld>
             <a:r>
               <a:rPr lang="en-US" dirty="0"/>
@@ -8657,7 +8959,7 @@
           <a:p>
             <a:fld id="{3BB050BD-D5D4-004B-87E1-382D8D28594F}" type="datetime1">
               <a:rPr lang="en-US" smtClean="0"/>
-              <a:t>8/12/19</a:t>
+              <a:t>8/13/19</a:t>
             </a:fld>
             <a:r>
               <a:rPr lang="en-US"/>
@@ -8738,7 +9040,11 @@
             <a:pPr lvl="2"/>
             <a:r>
               <a:rPr lang="en-US" dirty="0"/>
-              <a:t>We attempt to model a supernova (</a:t>
+              <a:t>We attempt to produce a light curve with Monte Carlo from a simplified model of </a:t>
+            </a:r>
+            <a:r>
+              <a:rPr lang="en-US"/>
+              <a:t>a supernova (</a:t>
             </a:r>
             <a:r>
               <a:rPr lang="en-US" i="1" dirty="0"/>
@@ -8766,36 +9072,6 @@
           <a:p>
             <a:pPr lvl="2"/>
             <a:endParaRPr lang="en-US" sz="500" dirty="0"/>
-          </a:p>
-          <a:p>
-            <a:pPr marL="0" indent="0">
-              <a:buNone/>
-            </a:pPr>
-            <a:r>
-              <a:rPr lang="en-US" dirty="0"/>
-              <a:t>Response Function Variance Reduction Method</a:t>
-            </a:r>
-          </a:p>
-          <a:p>
-            <a:pPr lvl="2"/>
-            <a:r>
-              <a:rPr lang="en-US" dirty="0"/>
-              <a:t>Trace particles, as in NXTEVT estimators, but for problems with high opacities. </a:t>
-            </a:r>
-          </a:p>
-          <a:p>
-            <a:pPr lvl="2"/>
-            <a:r>
-              <a:rPr lang="en-US" dirty="0"/>
-              <a:t>Collect information on how traced particles interact with the material</a:t>
-            </a:r>
-          </a:p>
-          <a:p>
-            <a:pPr lvl="2"/>
-            <a:r>
-              <a:rPr lang="en-US" dirty="0"/>
-              <a:t>Contribute to the tally at birth and every scattering event</a:t>
-            </a:r>
           </a:p>
           <a:p>
             <a:pPr lvl="2"/>
@@ -8911,7 +9187,7 @@
           <a:p>
             <a:fld id="{3BB050BD-D5D4-004B-87E1-382D8D28594F}" type="datetime1">
               <a:rPr lang="en-US" smtClean="0"/>
-              <a:t>8/12/19</a:t>
+              <a:t>8/13/19</a:t>
             </a:fld>
             <a:r>
               <a:rPr lang="en-US"/>
@@ -8987,21 +9263,21 @@
                 </a:pPr>
                 <a:r>
                   <a:rPr lang="en-US" dirty="0"/>
-                  <a:t>Overview</a:t>
+                  <a:t>Response Function Method Overview</a:t>
                 </a:r>
               </a:p>
               <a:p>
                 <a:pPr lvl="2"/>
                 <a:r>
                   <a:rPr lang="en-US" sz="1500" dirty="0"/>
-                  <a:t>Initialize the problem domain</a:t>
+                  <a:t>Run two problems – an inverse and a forward problem:</a:t>
                 </a:r>
               </a:p>
               <a:p>
                 <a:pPr lvl="2"/>
                 <a:r>
                   <a:rPr lang="en-US" sz="1500" dirty="0"/>
-                  <a:t>Run the inverse transport problem to generate the response function value (</a:t>
+                  <a:t>The inverse transport problem generates the response function value (</a:t>
                 </a:r>
                 <a14:m>
                   <m:oMath xmlns:m="http://schemas.openxmlformats.org/officeDocument/2006/math">
@@ -9041,7 +9317,7 @@
                 <a:pPr lvl="2"/>
                 <a:r>
                   <a:rPr lang="en-US" sz="1500" dirty="0"/>
-                  <a:t>Run forward transport problem, using the </a:t>
+                  <a:t>The forward transport problem is run, using the </a:t>
                 </a:r>
                 <a14:m>
                   <m:oMath xmlns:m="http://schemas.openxmlformats.org/officeDocument/2006/math">
@@ -9074,7 +9350,7 @@
                 </a14:m>
                 <a:r>
                   <a:rPr lang="en-US" sz="1500" dirty="0"/>
-                  <a:t> values to tally at a particles birth and every subseq. scatter event</a:t>
+                  <a:t> values to tally at a particle’s birth and every subseq. scatter event</a:t>
                 </a:r>
               </a:p>
               <a:p>
@@ -9277,7 +9553,7 @@
                 <a:ext cx="5673969" cy="4328440"/>
               </a:xfrm>
               <a:blipFill>
-                <a:blip r:embed="rId2"/>
+                <a:blip r:embed="rId3"/>
                 <a:stretch>
                   <a:fillRect l="-893" t="-585"/>
                 </a:stretch>
@@ -9313,7 +9589,7 @@
           <p:nvPr/>
         </p:nvPicPr>
         <p:blipFill>
-          <a:blip r:embed="rId3"/>
+          <a:blip r:embed="rId4"/>
           <a:stretch>
             <a:fillRect/>
           </a:stretch>
@@ -9436,7 +9712,7 @@
                 <a:avLst/>
               </a:prstGeom>
               <a:blipFill>
-                <a:blip r:embed="rId4"/>
+                <a:blip r:embed="rId5"/>
                 <a:stretch>
                   <a:fillRect r="-901" b="-3297"/>
                 </a:stretch>
@@ -9538,7 +9814,7 @@
           <a:p>
             <a:fld id="{3BB050BD-D5D4-004B-87E1-382D8D28594F}" type="datetime1">
               <a:rPr lang="en-US" smtClean="0"/>
-              <a:t>8/12/19</a:t>
+              <a:t>8/13/19</a:t>
             </a:fld>
             <a:r>
               <a:rPr lang="en-US"/>
@@ -10083,7 +10359,7 @@
           <a:p>
             <a:fld id="{3BB050BD-D5D4-004B-87E1-382D8D28594F}" type="datetime1">
               <a:rPr lang="en-US" smtClean="0"/>
-              <a:t>8/12/19</a:t>
+              <a:t>8/13/19</a:t>
             </a:fld>
             <a:r>
               <a:rPr lang="en-US"/>
@@ -10266,7 +10542,7 @@
           <a:p>
             <a:fld id="{3BB050BD-D5D4-004B-87E1-382D8D28594F}" type="datetime1">
               <a:rPr lang="en-US" smtClean="0"/>
-              <a:t>8/12/19</a:t>
+              <a:t>8/13/19</a:t>
             </a:fld>
             <a:r>
               <a:rPr lang="en-US"/>

</xml_diff>

<commit_message>
Completed merging in Kendras comments
</commit_message>
<xml_diff>
--- a/Poster and Presentation/Campbell_Scott_Variance_Reduction.pptx
+++ b/Poster and Presentation/Campbell_Scott_Variance_Reduction.pptx
@@ -1034,14 +1034,14 @@
           </a:ln>
           <a:extLst>
             <a:ext uri="{909E8E84-426E-40dd-AFC4-6F175D3DCCD1}">
-              <a14:hiddenFill xmlns:a14="http://schemas.microsoft.com/office/drawing/2010/main" xmlns="">
+              <a14:hiddenFill xmlns="" xmlns:a14="http://schemas.microsoft.com/office/drawing/2010/main">
                 <a:solidFill>
                   <a:srgbClr val="FFFFFF"/>
                 </a:solidFill>
               </a14:hiddenFill>
             </a:ext>
             <a:ext uri="{91240B29-F687-4f45-9708-019B960494DF}">
-              <a14:hiddenLine xmlns:a14="http://schemas.microsoft.com/office/drawing/2010/main" xmlns="" w="9525">
+              <a14:hiddenLine xmlns="" xmlns:a14="http://schemas.microsoft.com/office/drawing/2010/main" w="9525">
                 <a:solidFill>
                   <a:srgbClr val="000000"/>
                 </a:solidFill>
@@ -1383,14 +1383,14 @@
           </a:ln>
           <a:extLst>
             <a:ext uri="{909E8E84-426E-40dd-AFC4-6F175D3DCCD1}">
-              <a14:hiddenFill xmlns:a14="http://schemas.microsoft.com/office/drawing/2010/main" xmlns="">
+              <a14:hiddenFill xmlns="" xmlns:a14="http://schemas.microsoft.com/office/drawing/2010/main">
                 <a:solidFill>
                   <a:srgbClr val="FFFFFF"/>
                 </a:solidFill>
               </a14:hiddenFill>
             </a:ext>
             <a:ext uri="{91240B29-F687-4f45-9708-019B960494DF}">
-              <a14:hiddenLine xmlns:a14="http://schemas.microsoft.com/office/drawing/2010/main" xmlns="" w="9525">
+              <a14:hiddenLine xmlns="" xmlns:a14="http://schemas.microsoft.com/office/drawing/2010/main" w="9525">
                 <a:solidFill>
                   <a:srgbClr val="000000"/>
                 </a:solidFill>
@@ -2618,14 +2618,14 @@
             </a:ln>
             <a:extLst>
               <a:ext uri="{909E8E84-426E-40dd-AFC4-6F175D3DCCD1}">
-                <a14:hiddenFill xmlns:a14="http://schemas.microsoft.com/office/drawing/2010/main" xmlns="">
+                <a14:hiddenFill xmlns="" xmlns:a14="http://schemas.microsoft.com/office/drawing/2010/main">
                   <a:solidFill>
                     <a:srgbClr val="FFFFFF"/>
                   </a:solidFill>
                 </a14:hiddenFill>
               </a:ext>
               <a:ext uri="{91240B29-F687-4f45-9708-019B960494DF}">
-                <a14:hiddenLine xmlns:a14="http://schemas.microsoft.com/office/drawing/2010/main" xmlns="" w="9525">
+                <a14:hiddenLine xmlns="" xmlns:a14="http://schemas.microsoft.com/office/drawing/2010/main" w="9525">
                   <a:solidFill>
                     <a:srgbClr val="000000"/>
                   </a:solidFill>
@@ -5636,8 +5636,38 @@
         </p:blipFill>
         <p:spPr>
           <a:xfrm>
-            <a:off x="1517210" y="950867"/>
-            <a:ext cx="6109580" cy="4329026"/>
+            <a:off x="4283978" y="1451379"/>
+            <a:ext cx="4696827" cy="3328001"/>
+          </a:xfrm>
+          <a:prstGeom prst="rect">
+            <a:avLst/>
+          </a:prstGeom>
+        </p:spPr>
+      </p:pic>
+      <p:pic>
+        <p:nvPicPr>
+          <p:cNvPr id="7" name="Picture 6">
+            <a:extLst>
+              <a:ext uri="{FF2B5EF4-FFF2-40B4-BE49-F238E27FC236}">
+                <a16:creationId xmlns:a16="http://schemas.microsoft.com/office/drawing/2014/main" id="{1A6ADFA1-8250-D942-9001-6F6250BF2EA9}"/>
+              </a:ext>
+            </a:extLst>
+          </p:cNvPr>
+          <p:cNvPicPr>
+            <a:picLocks noChangeAspect="1"/>
+          </p:cNvPicPr>
+          <p:nvPr/>
+        </p:nvPicPr>
+        <p:blipFill>
+          <a:blip r:embed="rId3"/>
+          <a:stretch>
+            <a:fillRect/>
+          </a:stretch>
+        </p:blipFill>
+        <p:spPr>
+          <a:xfrm>
+            <a:off x="289872" y="1451379"/>
+            <a:ext cx="3789760" cy="3374154"/>
           </a:xfrm>
           <a:prstGeom prst="rect">
             <a:avLst/>

</xml_diff>